<commit_message>
Added more to the powerpoint
</commit_message>
<xml_diff>
--- a/Presentations/Week 2 Pitch.pptx
+++ b/Presentations/Week 2 Pitch.pptx
@@ -5,23 +5,28 @@
     <p:sldMasterId id="2147483783" r:id="rId1"/>
   </p:sldMasterIdLst>
   <p:notesMasterIdLst>
-    <p:notesMasterId r:id="rId16"/>
+    <p:notesMasterId r:id="rId21"/>
   </p:notesMasterIdLst>
   <p:sldIdLst>
     <p:sldId id="256" r:id="rId2"/>
-    <p:sldId id="258" r:id="rId3"/>
-    <p:sldId id="269" r:id="rId4"/>
-    <p:sldId id="259" r:id="rId5"/>
-    <p:sldId id="260" r:id="rId6"/>
-    <p:sldId id="261" r:id="rId7"/>
-    <p:sldId id="257" r:id="rId8"/>
-    <p:sldId id="262" r:id="rId9"/>
-    <p:sldId id="263" r:id="rId10"/>
-    <p:sldId id="264" r:id="rId11"/>
-    <p:sldId id="265" r:id="rId12"/>
-    <p:sldId id="266" r:id="rId13"/>
-    <p:sldId id="267" r:id="rId14"/>
-    <p:sldId id="268" r:id="rId15"/>
+    <p:sldId id="274" r:id="rId3"/>
+    <p:sldId id="258" r:id="rId4"/>
+    <p:sldId id="269" r:id="rId5"/>
+    <p:sldId id="270" r:id="rId6"/>
+    <p:sldId id="259" r:id="rId7"/>
+    <p:sldId id="260" r:id="rId8"/>
+    <p:sldId id="261" r:id="rId9"/>
+    <p:sldId id="257" r:id="rId10"/>
+    <p:sldId id="271" r:id="rId11"/>
+    <p:sldId id="272" r:id="rId12"/>
+    <p:sldId id="273" r:id="rId13"/>
+    <p:sldId id="262" r:id="rId14"/>
+    <p:sldId id="263" r:id="rId15"/>
+    <p:sldId id="264" r:id="rId16"/>
+    <p:sldId id="265" r:id="rId17"/>
+    <p:sldId id="266" r:id="rId18"/>
+    <p:sldId id="267" r:id="rId19"/>
+    <p:sldId id="268" r:id="rId20"/>
   </p:sldIdLst>
   <p:sldSz cx="12192000" cy="6858000"/>
   <p:notesSz cx="6858000" cy="9144000"/>
@@ -128,10 +133,6 @@
 </p:presentation>
 </file>
 
-<file path=ppt/revisionInfo.xml><?xml version="1.0" encoding="utf-8"?>
-<p1510:revInfo xmlns:a="http://schemas.openxmlformats.org/drawingml/2006/main" xmlns:r="http://schemas.openxmlformats.org/officeDocument/2006/relationships" xmlns:p1510="http://schemas.microsoft.com/office/powerpoint/2015/10/main"/>
-</file>
-
 <file path=ppt/notesMasters/notesMaster1.xml><?xml version="1.0" encoding="utf-8"?>
 <p:notesMaster xmlns:a="http://schemas.openxmlformats.org/drawingml/2006/main" xmlns:r="http://schemas.openxmlformats.org/officeDocument/2006/relationships" xmlns:p="http://schemas.openxmlformats.org/presentationml/2006/main">
   <p:cSld>
@@ -214,7 +215,7 @@
           <a:p>
             <a:fld id="{77C6FF30-EFD7-4437-901C-DE7AE577CC7B}" type="datetimeFigureOut">
               <a:rPr lang="en-GB" smtClean="0"/>
-              <a:t>05/02/2018</a:t>
+              <a:t>06/02/2018</a:t>
             </a:fld>
             <a:endParaRPr lang="en-GB"/>
           </a:p>
@@ -547,7 +548,7 @@
           <a:p>
             <a:fld id="{0FA91835-90FF-41E4-AF94-16E4E0C00F06}" type="slidenum">
               <a:rPr lang="en-GB" smtClean="0"/>
-              <a:t>5</a:t>
+              <a:t>7</a:t>
             </a:fld>
             <a:endParaRPr lang="en-GB"/>
           </a:p>
@@ -634,7 +635,7 @@
           <a:p>
             <a:fld id="{0FA91835-90FF-41E4-AF94-16E4E0C00F06}" type="slidenum">
               <a:rPr lang="en-GB" smtClean="0"/>
-              <a:t>9</a:t>
+              <a:t>14</a:t>
             </a:fld>
             <a:endParaRPr lang="en-GB"/>
           </a:p>
@@ -721,7 +722,7 @@
           <a:p>
             <a:fld id="{0FA91835-90FF-41E4-AF94-16E4E0C00F06}" type="slidenum">
               <a:rPr lang="en-GB" smtClean="0"/>
-              <a:t>10</a:t>
+              <a:t>15</a:t>
             </a:fld>
             <a:endParaRPr lang="en-GB"/>
           </a:p>
@@ -828,7 +829,7 @@
           <a:p>
             <a:fld id="{0FA91835-90FF-41E4-AF94-16E4E0C00F06}" type="slidenum">
               <a:rPr lang="en-GB" smtClean="0"/>
-              <a:t>11</a:t>
+              <a:t>16</a:t>
             </a:fld>
             <a:endParaRPr lang="en-GB"/>
           </a:p>
@@ -1033,7 +1034,7 @@
           <a:p>
             <a:fld id="{F9B79F2D-3A05-4848-97F8-7B346024FD0C}" type="datetimeFigureOut">
               <a:rPr lang="en-GB" smtClean="0"/>
-              <a:t>05/02/2018</a:t>
+              <a:t>06/02/2018</a:t>
             </a:fld>
             <a:endParaRPr lang="en-GB"/>
           </a:p>
@@ -1308,7 +1309,7 @@
           <a:p>
             <a:fld id="{F9B79F2D-3A05-4848-97F8-7B346024FD0C}" type="datetimeFigureOut">
               <a:rPr lang="en-GB" smtClean="0"/>
-              <a:t>05/02/2018</a:t>
+              <a:t>06/02/2018</a:t>
             </a:fld>
             <a:endParaRPr lang="en-GB"/>
           </a:p>
@@ -1502,7 +1503,7 @@
           <a:p>
             <a:fld id="{F9B79F2D-3A05-4848-97F8-7B346024FD0C}" type="datetimeFigureOut">
               <a:rPr lang="en-GB" smtClean="0"/>
-              <a:t>05/02/2018</a:t>
+              <a:t>06/02/2018</a:t>
             </a:fld>
             <a:endParaRPr lang="en-GB"/>
           </a:p>
@@ -1775,7 +1776,7 @@
           <a:p>
             <a:fld id="{F9B79F2D-3A05-4848-97F8-7B346024FD0C}" type="datetimeFigureOut">
               <a:rPr lang="en-GB" smtClean="0"/>
-              <a:t>05/02/2018</a:t>
+              <a:t>06/02/2018</a:t>
             </a:fld>
             <a:endParaRPr lang="en-GB"/>
           </a:p>
@@ -2116,7 +2117,7 @@
           <a:p>
             <a:fld id="{F9B79F2D-3A05-4848-97F8-7B346024FD0C}" type="datetimeFigureOut">
               <a:rPr lang="en-GB" smtClean="0"/>
-              <a:t>05/02/2018</a:t>
+              <a:t>06/02/2018</a:t>
             </a:fld>
             <a:endParaRPr lang="en-GB"/>
           </a:p>
@@ -2739,7 +2740,7 @@
           <a:p>
             <a:fld id="{F9B79F2D-3A05-4848-97F8-7B346024FD0C}" type="datetimeFigureOut">
               <a:rPr lang="en-GB" smtClean="0"/>
-              <a:t>05/02/2018</a:t>
+              <a:t>06/02/2018</a:t>
             </a:fld>
             <a:endParaRPr lang="en-GB"/>
           </a:p>
@@ -3599,7 +3600,7 @@
           <a:p>
             <a:fld id="{F9B79F2D-3A05-4848-97F8-7B346024FD0C}" type="datetimeFigureOut">
               <a:rPr lang="en-GB" smtClean="0"/>
-              <a:t>05/02/2018</a:t>
+              <a:t>06/02/2018</a:t>
             </a:fld>
             <a:endParaRPr lang="en-GB"/>
           </a:p>
@@ -3769,7 +3770,7 @@
           <a:p>
             <a:fld id="{F9B79F2D-3A05-4848-97F8-7B346024FD0C}" type="datetimeFigureOut">
               <a:rPr lang="en-GB" smtClean="0"/>
-              <a:t>05/02/2018</a:t>
+              <a:t>06/02/2018</a:t>
             </a:fld>
             <a:endParaRPr lang="en-GB"/>
           </a:p>
@@ -3949,7 +3950,7 @@
           <a:p>
             <a:fld id="{F9B79F2D-3A05-4848-97F8-7B346024FD0C}" type="datetimeFigureOut">
               <a:rPr lang="en-GB" smtClean="0"/>
-              <a:t>05/02/2018</a:t>
+              <a:t>06/02/2018</a:t>
             </a:fld>
             <a:endParaRPr lang="en-GB"/>
           </a:p>
@@ -4119,7 +4120,7 @@
           <a:p>
             <a:fld id="{F9B79F2D-3A05-4848-97F8-7B346024FD0C}" type="datetimeFigureOut">
               <a:rPr lang="en-GB" smtClean="0"/>
-              <a:t>05/02/2018</a:t>
+              <a:t>06/02/2018</a:t>
             </a:fld>
             <a:endParaRPr lang="en-GB"/>
           </a:p>
@@ -4366,7 +4367,7 @@
           <a:p>
             <a:fld id="{F9B79F2D-3A05-4848-97F8-7B346024FD0C}" type="datetimeFigureOut">
               <a:rPr lang="en-GB" smtClean="0"/>
-              <a:t>05/02/2018</a:t>
+              <a:t>06/02/2018</a:t>
             </a:fld>
             <a:endParaRPr lang="en-GB"/>
           </a:p>
@@ -4658,7 +4659,7 @@
           <a:p>
             <a:fld id="{F9B79F2D-3A05-4848-97F8-7B346024FD0C}" type="datetimeFigureOut">
               <a:rPr lang="en-GB" smtClean="0"/>
-              <a:t>05/02/2018</a:t>
+              <a:t>06/02/2018</a:t>
             </a:fld>
             <a:endParaRPr lang="en-GB"/>
           </a:p>
@@ -5102,7 +5103,7 @@
           <a:p>
             <a:fld id="{F9B79F2D-3A05-4848-97F8-7B346024FD0C}" type="datetimeFigureOut">
               <a:rPr lang="en-GB" smtClean="0"/>
-              <a:t>05/02/2018</a:t>
+              <a:t>06/02/2018</a:t>
             </a:fld>
             <a:endParaRPr lang="en-GB"/>
           </a:p>
@@ -5220,7 +5221,7 @@
           <a:p>
             <a:fld id="{F9B79F2D-3A05-4848-97F8-7B346024FD0C}" type="datetimeFigureOut">
               <a:rPr lang="en-GB" smtClean="0"/>
-              <a:t>05/02/2018</a:t>
+              <a:t>06/02/2018</a:t>
             </a:fld>
             <a:endParaRPr lang="en-GB"/>
           </a:p>
@@ -5315,7 +5316,7 @@
           <a:p>
             <a:fld id="{F9B79F2D-3A05-4848-97F8-7B346024FD0C}" type="datetimeFigureOut">
               <a:rPr lang="en-GB" smtClean="0"/>
-              <a:t>05/02/2018</a:t>
+              <a:t>06/02/2018</a:t>
             </a:fld>
             <a:endParaRPr lang="en-GB"/>
           </a:p>
@@ -5594,7 +5595,7 @@
           <a:p>
             <a:fld id="{F9B79F2D-3A05-4848-97F8-7B346024FD0C}" type="datetimeFigureOut">
               <a:rPr lang="en-GB" smtClean="0"/>
-              <a:t>05/02/2018</a:t>
+              <a:t>06/02/2018</a:t>
             </a:fld>
             <a:endParaRPr lang="en-GB"/>
           </a:p>
@@ -5869,7 +5870,7 @@
           <a:p>
             <a:fld id="{F9B79F2D-3A05-4848-97F8-7B346024FD0C}" type="datetimeFigureOut">
               <a:rPr lang="en-GB" smtClean="0"/>
-              <a:t>05/02/2018</a:t>
+              <a:t>06/02/2018</a:t>
             </a:fld>
             <a:endParaRPr lang="en-GB"/>
           </a:p>
@@ -6298,7 +6299,7 @@
           <a:p>
             <a:fld id="{F9B79F2D-3A05-4848-97F8-7B346024FD0C}" type="datetimeFigureOut">
               <a:rPr lang="en-GB" smtClean="0"/>
-              <a:t>05/02/2018</a:t>
+              <a:t>06/02/2018</a:t>
             </a:fld>
             <a:endParaRPr lang="en-GB"/>
           </a:p>
@@ -7883,7 +7884,7 @@
           <p:cNvPr id="2" name="Title 1">
             <a:extLst>
               <a:ext uri="{FF2B5EF4-FFF2-40B4-BE49-F238E27FC236}">
-                <a16:creationId xmlns:a16="http://schemas.microsoft.com/office/drawing/2014/main" id="{672EBB02-FCB7-449D-9D6A-64ED9C5983DF}"/>
+                <a16:creationId xmlns:a16="http://schemas.microsoft.com/office/drawing/2014/main" id="{9EEAEEC4-2374-4C17-B795-21101D3DCD5C}"/>
               </a:ext>
             </a:extLst>
           </p:cNvPr>
@@ -7901,7 +7902,7 @@
           <a:p>
             <a:r>
               <a:rPr lang="en-GB" dirty="0"/>
-              <a:t>To keep things Symmetrical </a:t>
+              <a:t>Screen mock-up</a:t>
             </a:r>
           </a:p>
         </p:txBody>
@@ -7911,7 +7912,7 @@
           <p:cNvPr id="4" name="Content Placeholder 3">
             <a:extLst>
               <a:ext uri="{FF2B5EF4-FFF2-40B4-BE49-F238E27FC236}">
-                <a16:creationId xmlns:a16="http://schemas.microsoft.com/office/drawing/2014/main" id="{28892EEA-ED28-49F1-8732-616C7DFC3093}"/>
+                <a16:creationId xmlns:a16="http://schemas.microsoft.com/office/drawing/2014/main" id="{E5497657-B3DF-45BB-88DA-ADF7520E23D4}"/>
               </a:ext>
             </a:extLst>
           </p:cNvPr>
@@ -7923,121 +7924,25 @@
           </p:nvPr>
         </p:nvPicPr>
         <p:blipFill>
-          <a:blip r:embed="rId3"/>
+          <a:blip r:embed="rId2"/>
           <a:stretch>
             <a:fillRect/>
           </a:stretch>
         </p:blipFill>
         <p:spPr>
           <a:xfrm>
-            <a:off x="2802552" y="1792784"/>
-            <a:ext cx="6586895" cy="4195762"/>
+            <a:off x="2365458" y="2081213"/>
+            <a:ext cx="7461083" cy="4195762"/>
           </a:xfrm>
           <a:prstGeom prst="rect">
             <a:avLst/>
           </a:prstGeom>
         </p:spPr>
       </p:pic>
-      <p:sp>
-        <p:nvSpPr>
-          <p:cNvPr id="5" name="Rectangle 4">
-            <a:extLst>
-              <a:ext uri="{FF2B5EF4-FFF2-40B4-BE49-F238E27FC236}">
-                <a16:creationId xmlns:a16="http://schemas.microsoft.com/office/drawing/2014/main" id="{432E7842-52B2-456C-8D0A-BC10CCCEAFDE}"/>
-              </a:ext>
-            </a:extLst>
-          </p:cNvPr>
-          <p:cNvSpPr/>
-          <p:nvPr/>
-        </p:nvSpPr>
-        <p:spPr>
-          <a:xfrm>
-            <a:off x="147853" y="2967335"/>
-            <a:ext cx="2420406" cy="923330"/>
-          </a:xfrm>
-          <a:prstGeom prst="rect">
-            <a:avLst/>
-          </a:prstGeom>
-          <a:noFill/>
-        </p:spPr>
-        <p:txBody>
-          <a:bodyPr wrap="none" lIns="91440" tIns="45720" rIns="91440" bIns="45720">
-            <a:spAutoFit/>
-          </a:bodyPr>
-          <a:lstStyle/>
-          <a:p>
-            <a:pPr algn="ctr"/>
-            <a:r>
-              <a:rPr lang="en-US" sz="5400" b="0" cap="none" spc="0" dirty="0">
-                <a:ln w="0"/>
-                <a:solidFill>
-                  <a:schemeClr val="tx1"/>
-                </a:solidFill>
-                <a:effectLst>
-                  <a:outerShdw blurRad="38100" dist="19050" dir="2700000" algn="tl" rotWithShape="0">
-                    <a:schemeClr val="dk1">
-                      <a:alpha val="40000"/>
-                    </a:schemeClr>
-                  </a:outerShdw>
-                </a:effectLst>
-              </a:rPr>
-              <a:t>Player 1</a:t>
-            </a:r>
-          </a:p>
-        </p:txBody>
-      </p:sp>
-      <p:sp>
-        <p:nvSpPr>
-          <p:cNvPr id="6" name="Rectangle 5">
-            <a:extLst>
-              <a:ext uri="{FF2B5EF4-FFF2-40B4-BE49-F238E27FC236}">
-                <a16:creationId xmlns:a16="http://schemas.microsoft.com/office/drawing/2014/main" id="{BA4DA330-4127-4639-AF23-007D271219CB}"/>
-              </a:ext>
-            </a:extLst>
-          </p:cNvPr>
-          <p:cNvSpPr/>
-          <p:nvPr/>
-        </p:nvSpPr>
-        <p:spPr>
-          <a:xfrm>
-            <a:off x="9598002" y="2872085"/>
-            <a:ext cx="2420406" cy="923330"/>
-          </a:xfrm>
-          <a:prstGeom prst="rect">
-            <a:avLst/>
-          </a:prstGeom>
-          <a:noFill/>
-        </p:spPr>
-        <p:txBody>
-          <a:bodyPr wrap="none" lIns="91440" tIns="45720" rIns="91440" bIns="45720">
-            <a:spAutoFit/>
-          </a:bodyPr>
-          <a:lstStyle/>
-          <a:p>
-            <a:pPr algn="ctr"/>
-            <a:r>
-              <a:rPr lang="en-US" sz="5400" b="0" cap="none" spc="0" dirty="0">
-                <a:ln w="0"/>
-                <a:solidFill>
-                  <a:schemeClr val="tx1"/>
-                </a:solidFill>
-                <a:effectLst>
-                  <a:outerShdw blurRad="38100" dist="19050" dir="2700000" algn="tl" rotWithShape="0">
-                    <a:schemeClr val="dk1">
-                      <a:alpha val="40000"/>
-                    </a:schemeClr>
-                  </a:outerShdw>
-                </a:effectLst>
-              </a:rPr>
-              <a:t>Player 2</a:t>
-            </a:r>
-          </a:p>
-        </p:txBody>
-      </p:sp>
     </p:spTree>
     <p:extLst>
       <p:ext uri="{BB962C8B-B14F-4D97-AF65-F5344CB8AC3E}">
-        <p14:creationId xmlns:p14="http://schemas.microsoft.com/office/powerpoint/2010/main" val="1943397596"/>
+        <p14:creationId xmlns:p14="http://schemas.microsoft.com/office/powerpoint/2010/main" val="497770595"/>
       </p:ext>
     </p:extLst>
   </p:cSld>
@@ -8069,7 +7974,7 @@
           <p:cNvPr id="2" name="Title 1">
             <a:extLst>
               <a:ext uri="{FF2B5EF4-FFF2-40B4-BE49-F238E27FC236}">
-                <a16:creationId xmlns:a16="http://schemas.microsoft.com/office/drawing/2014/main" id="{672EBB02-FCB7-449D-9D6A-64ED9C5983DF}"/>
+                <a16:creationId xmlns:a16="http://schemas.microsoft.com/office/drawing/2014/main" id="{F2FD2EC3-B22B-4B00-A4EB-A404B3A3C4B6}"/>
               </a:ext>
             </a:extLst>
           </p:cNvPr>
@@ -8087,17 +7992,17 @@
           <a:p>
             <a:r>
               <a:rPr lang="en-GB" dirty="0"/>
-              <a:t>To keep things Symmetrical </a:t>
+              <a:t>Screen mock-up</a:t>
             </a:r>
           </a:p>
         </p:txBody>
       </p:sp>
       <p:pic>
         <p:nvPicPr>
-          <p:cNvPr id="9" name="Content Placeholder 8">
+          <p:cNvPr id="4" name="Content Placeholder 3">
             <a:extLst>
               <a:ext uri="{FF2B5EF4-FFF2-40B4-BE49-F238E27FC236}">
-                <a16:creationId xmlns:a16="http://schemas.microsoft.com/office/drawing/2014/main" id="{45A73B88-1535-4E04-AF47-20EB656284D6}"/>
+                <a16:creationId xmlns:a16="http://schemas.microsoft.com/office/drawing/2014/main" id="{7BABCD96-C056-4C62-A05E-02FA804B599F}"/>
               </a:ext>
             </a:extLst>
           </p:cNvPr>
@@ -8109,121 +8014,25 @@
           </p:nvPr>
         </p:nvPicPr>
         <p:blipFill>
-          <a:blip r:embed="rId3"/>
+          <a:blip r:embed="rId2"/>
           <a:stretch>
             <a:fillRect/>
           </a:stretch>
         </p:blipFill>
         <p:spPr>
           <a:xfrm>
-            <a:off x="2751809" y="1792784"/>
-            <a:ext cx="6688381" cy="4195762"/>
+            <a:off x="2349784" y="2081213"/>
+            <a:ext cx="7492432" cy="4195762"/>
           </a:xfrm>
           <a:prstGeom prst="rect">
             <a:avLst/>
           </a:prstGeom>
         </p:spPr>
       </p:pic>
-      <p:sp>
-        <p:nvSpPr>
-          <p:cNvPr id="5" name="Rectangle 4">
-            <a:extLst>
-              <a:ext uri="{FF2B5EF4-FFF2-40B4-BE49-F238E27FC236}">
-                <a16:creationId xmlns:a16="http://schemas.microsoft.com/office/drawing/2014/main" id="{432E7842-52B2-456C-8D0A-BC10CCCEAFDE}"/>
-              </a:ext>
-            </a:extLst>
-          </p:cNvPr>
-          <p:cNvSpPr/>
-          <p:nvPr/>
-        </p:nvSpPr>
-        <p:spPr>
-          <a:xfrm>
-            <a:off x="157378" y="2967335"/>
-            <a:ext cx="2420406" cy="923330"/>
-          </a:xfrm>
-          <a:prstGeom prst="rect">
-            <a:avLst/>
-          </a:prstGeom>
-          <a:noFill/>
-        </p:spPr>
-        <p:txBody>
-          <a:bodyPr wrap="none" lIns="91440" tIns="45720" rIns="91440" bIns="45720">
-            <a:spAutoFit/>
-          </a:bodyPr>
-          <a:lstStyle/>
-          <a:p>
-            <a:pPr algn="ctr"/>
-            <a:r>
-              <a:rPr lang="en-US" sz="5400" b="0" cap="none" spc="0" dirty="0">
-                <a:ln w="0"/>
-                <a:solidFill>
-                  <a:schemeClr val="tx1"/>
-                </a:solidFill>
-                <a:effectLst>
-                  <a:outerShdw blurRad="38100" dist="19050" dir="2700000" algn="tl" rotWithShape="0">
-                    <a:schemeClr val="dk1">
-                      <a:alpha val="40000"/>
-                    </a:schemeClr>
-                  </a:outerShdw>
-                </a:effectLst>
-              </a:rPr>
-              <a:t>Player 1</a:t>
-            </a:r>
-          </a:p>
-        </p:txBody>
-      </p:sp>
-      <p:sp>
-        <p:nvSpPr>
-          <p:cNvPr id="6" name="Rectangle 5">
-            <a:extLst>
-              <a:ext uri="{FF2B5EF4-FFF2-40B4-BE49-F238E27FC236}">
-                <a16:creationId xmlns:a16="http://schemas.microsoft.com/office/drawing/2014/main" id="{BA4DA330-4127-4639-AF23-007D271219CB}"/>
-              </a:ext>
-            </a:extLst>
-          </p:cNvPr>
-          <p:cNvSpPr/>
-          <p:nvPr/>
-        </p:nvSpPr>
-        <p:spPr>
-          <a:xfrm>
-            <a:off x="9617052" y="2967335"/>
-            <a:ext cx="2420406" cy="923330"/>
-          </a:xfrm>
-          <a:prstGeom prst="rect">
-            <a:avLst/>
-          </a:prstGeom>
-          <a:noFill/>
-        </p:spPr>
-        <p:txBody>
-          <a:bodyPr wrap="none" lIns="91440" tIns="45720" rIns="91440" bIns="45720">
-            <a:spAutoFit/>
-          </a:bodyPr>
-          <a:lstStyle/>
-          <a:p>
-            <a:pPr algn="ctr"/>
-            <a:r>
-              <a:rPr lang="en-US" sz="5400" b="0" cap="none" spc="0" dirty="0">
-                <a:ln w="0"/>
-                <a:solidFill>
-                  <a:schemeClr val="tx1"/>
-                </a:solidFill>
-                <a:effectLst>
-                  <a:outerShdw blurRad="38100" dist="19050" dir="2700000" algn="tl" rotWithShape="0">
-                    <a:schemeClr val="dk1">
-                      <a:alpha val="40000"/>
-                    </a:schemeClr>
-                  </a:outerShdw>
-                </a:effectLst>
-              </a:rPr>
-              <a:t>Player 2</a:t>
-            </a:r>
-          </a:p>
-        </p:txBody>
-      </p:sp>
     </p:spTree>
     <p:extLst>
       <p:ext uri="{BB962C8B-B14F-4D97-AF65-F5344CB8AC3E}">
-        <p14:creationId xmlns:p14="http://schemas.microsoft.com/office/powerpoint/2010/main" val="276089555"/>
+        <p14:creationId xmlns:p14="http://schemas.microsoft.com/office/powerpoint/2010/main" val="10835353"/>
       </p:ext>
     </p:extLst>
   </p:cSld>
@@ -8255,7 +8064,7 @@
           <p:cNvPr id="2" name="Title 1">
             <a:extLst>
               <a:ext uri="{FF2B5EF4-FFF2-40B4-BE49-F238E27FC236}">
-                <a16:creationId xmlns:a16="http://schemas.microsoft.com/office/drawing/2014/main" id="{FE35A943-83D0-4753-AA1C-4A6833FF9B39}"/>
+                <a16:creationId xmlns:a16="http://schemas.microsoft.com/office/drawing/2014/main" id="{74886A99-D5C8-4103-AB7B-AD0EFE873504}"/>
               </a:ext>
             </a:extLst>
           </p:cNvPr>
@@ -8273,67 +8082,47 @@
           <a:p>
             <a:r>
               <a:rPr lang="en-GB" dirty="0"/>
-              <a:t>The player experience</a:t>
-            </a:r>
-          </a:p>
-        </p:txBody>
-      </p:sp>
-      <p:sp>
-        <p:nvSpPr>
-          <p:cNvPr id="3" name="Content Placeholder 2">
+              <a:t>Screen mock-up</a:t>
+            </a:r>
+          </a:p>
+        </p:txBody>
+      </p:sp>
+      <p:pic>
+        <p:nvPicPr>
+          <p:cNvPr id="4" name="Content Placeholder 3">
             <a:extLst>
               <a:ext uri="{FF2B5EF4-FFF2-40B4-BE49-F238E27FC236}">
-                <a16:creationId xmlns:a16="http://schemas.microsoft.com/office/drawing/2014/main" id="{5E33382E-A521-4D39-8DD5-E2DC47E4FE22}"/>
+                <a16:creationId xmlns:a16="http://schemas.microsoft.com/office/drawing/2014/main" id="{E967FF72-1194-4D1F-83BD-6C15E67812F2}"/>
               </a:ext>
             </a:extLst>
           </p:cNvPr>
-          <p:cNvSpPr>
-            <a:spLocks noGrp="1"/>
-          </p:cNvSpPr>
+          <p:cNvPicPr>
+            <a:picLocks noGrp="1" noChangeAspect="1"/>
+          </p:cNvPicPr>
           <p:nvPr>
             <p:ph idx="1"/>
           </p:nvPr>
-        </p:nvSpPr>
-        <p:spPr/>
-        <p:txBody>
-          <a:bodyPr/>
-          <a:lstStyle/>
-          <a:p>
-            <a:r>
-              <a:rPr lang="en-GB" dirty="0"/>
-              <a:t>We want both of the players to experience a sense of hard fun</a:t>
-            </a:r>
-          </a:p>
-          <a:p>
-            <a:pPr lvl="1"/>
-            <a:r>
-              <a:rPr lang="en-GB" dirty="0" err="1"/>
-              <a:t>Fiero</a:t>
-            </a:r>
-            <a:r>
-              <a:rPr lang="en-GB" dirty="0"/>
-              <a:t>, strategy and obstacles</a:t>
-            </a:r>
-          </a:p>
-          <a:p>
-            <a:r>
-              <a:rPr lang="en-GB" dirty="0"/>
-              <a:t>A sense of people fun</a:t>
-            </a:r>
-          </a:p>
-          <a:p>
-            <a:pPr lvl="1"/>
-            <a:r>
-              <a:rPr lang="en-GB" dirty="0"/>
-              <a:t>Amusement and player interaction</a:t>
-            </a:r>
-          </a:p>
-        </p:txBody>
-      </p:sp>
+        </p:nvPicPr>
+        <p:blipFill>
+          <a:blip r:embed="rId2"/>
+          <a:stretch>
+            <a:fillRect/>
+          </a:stretch>
+        </p:blipFill>
+        <p:spPr>
+          <a:xfrm>
+            <a:off x="2363520" y="2052638"/>
+            <a:ext cx="7464959" cy="4195762"/>
+          </a:xfrm>
+          <a:prstGeom prst="rect">
+            <a:avLst/>
+          </a:prstGeom>
+        </p:spPr>
+      </p:pic>
     </p:spTree>
     <p:extLst>
       <p:ext uri="{BB962C8B-B14F-4D97-AF65-F5344CB8AC3E}">
-        <p14:creationId xmlns:p14="http://schemas.microsoft.com/office/powerpoint/2010/main" val="1822042671"/>
+        <p14:creationId xmlns:p14="http://schemas.microsoft.com/office/powerpoint/2010/main" val="565845685"/>
       </p:ext>
     </p:extLst>
   </p:cSld>
@@ -8365,7 +8154,7 @@
           <p:cNvPr id="2" name="Title 1">
             <a:extLst>
               <a:ext uri="{FF2B5EF4-FFF2-40B4-BE49-F238E27FC236}">
-                <a16:creationId xmlns:a16="http://schemas.microsoft.com/office/drawing/2014/main" id="{884D9554-1741-4629-B62D-1C02996DE221}"/>
+                <a16:creationId xmlns:a16="http://schemas.microsoft.com/office/drawing/2014/main" id="{B6FD9CEF-C4EB-4584-B49F-A02E873D6779}"/>
               </a:ext>
             </a:extLst>
           </p:cNvPr>
@@ -8383,7 +8172,7 @@
           <a:p>
             <a:r>
               <a:rPr lang="en-GB" dirty="0"/>
-              <a:t>The following week</a:t>
+              <a:t>First mechanic: shooting/launching</a:t>
             </a:r>
           </a:p>
         </p:txBody>
@@ -8393,7 +8182,7 @@
           <p:cNvPr id="3" name="Content Placeholder 2">
             <a:extLst>
               <a:ext uri="{FF2B5EF4-FFF2-40B4-BE49-F238E27FC236}">
-                <a16:creationId xmlns:a16="http://schemas.microsoft.com/office/drawing/2014/main" id="{5B90EE24-1240-4B7B-8D92-EA4B79F1A4B4}"/>
+                <a16:creationId xmlns:a16="http://schemas.microsoft.com/office/drawing/2014/main" id="{631A7050-10F3-4ED1-991E-B2AA17989DB6}"/>
               </a:ext>
             </a:extLst>
           </p:cNvPr>
@@ -8409,14 +8198,35 @@
           <a:bodyPr/>
           <a:lstStyle/>
           <a:p>
-            <a:endParaRPr lang="en-GB"/>
+            <a:r>
+              <a:rPr lang="en-GB" dirty="0"/>
+              <a:t>The player will tap to set the position of the launcher</a:t>
+            </a:r>
+          </a:p>
+          <a:p>
+            <a:r>
+              <a:rPr lang="en-GB" dirty="0"/>
+              <a:t>The player will tap again to set the power of the shot</a:t>
+            </a:r>
+          </a:p>
+          <a:p>
+            <a:r>
+              <a:rPr lang="en-GB" dirty="0"/>
+              <a:t>The shot will lock in and then the other player will have their go</a:t>
+            </a:r>
+          </a:p>
+          <a:p>
+            <a:r>
+              <a:rPr lang="en-GB" dirty="0"/>
+              <a:t>When both players have aimed and set the power, both shots will go at the same time.</a:t>
+            </a:r>
           </a:p>
         </p:txBody>
       </p:sp>
     </p:spTree>
     <p:extLst>
       <p:ext uri="{BB962C8B-B14F-4D97-AF65-F5344CB8AC3E}">
-        <p14:creationId xmlns:p14="http://schemas.microsoft.com/office/powerpoint/2010/main" val="855245935"/>
+        <p14:creationId xmlns:p14="http://schemas.microsoft.com/office/powerpoint/2010/main" val="345086452"/>
       </p:ext>
     </p:extLst>
   </p:cSld>
@@ -8448,6 +8258,677 @@
           <p:cNvPr id="2" name="Title 1">
             <a:extLst>
               <a:ext uri="{FF2B5EF4-FFF2-40B4-BE49-F238E27FC236}">
+                <a16:creationId xmlns:a16="http://schemas.microsoft.com/office/drawing/2014/main" id="{35615569-7527-4024-836A-239B8A2E3958}"/>
+              </a:ext>
+            </a:extLst>
+          </p:cNvPr>
+          <p:cNvSpPr>
+            <a:spLocks noGrp="1"/>
+          </p:cNvSpPr>
+          <p:nvPr>
+            <p:ph type="title"/>
+          </p:nvPr>
+        </p:nvSpPr>
+        <p:spPr/>
+        <p:txBody>
+          <a:bodyPr/>
+          <a:lstStyle/>
+          <a:p>
+            <a:r>
+              <a:rPr lang="en-GB" dirty="0"/>
+              <a:t>Second mechanic: Wind</a:t>
+            </a:r>
+          </a:p>
+        </p:txBody>
+      </p:sp>
+      <p:sp>
+        <p:nvSpPr>
+          <p:cNvPr id="3" name="Content Placeholder 2">
+            <a:extLst>
+              <a:ext uri="{FF2B5EF4-FFF2-40B4-BE49-F238E27FC236}">
+                <a16:creationId xmlns:a16="http://schemas.microsoft.com/office/drawing/2014/main" id="{99B53FEC-9E9A-4924-B6E3-24FF878B896D}"/>
+              </a:ext>
+            </a:extLst>
+          </p:cNvPr>
+          <p:cNvSpPr>
+            <a:spLocks noGrp="1"/>
+          </p:cNvSpPr>
+          <p:nvPr>
+            <p:ph idx="1"/>
+          </p:nvPr>
+        </p:nvSpPr>
+        <p:spPr/>
+        <p:txBody>
+          <a:bodyPr/>
+          <a:lstStyle/>
+          <a:p>
+            <a:r>
+              <a:rPr lang="en-GB" dirty="0"/>
+              <a:t>There will be a force (wind) that effects the projectile when it is launched.</a:t>
+            </a:r>
+          </a:p>
+          <a:p>
+            <a:r>
+              <a:rPr lang="en-GB" dirty="0"/>
+              <a:t>This will be the same force for each player</a:t>
+            </a:r>
+          </a:p>
+        </p:txBody>
+      </p:sp>
+    </p:spTree>
+    <p:extLst>
+      <p:ext uri="{BB962C8B-B14F-4D97-AF65-F5344CB8AC3E}">
+        <p14:creationId xmlns:p14="http://schemas.microsoft.com/office/powerpoint/2010/main" val="3873638211"/>
+      </p:ext>
+    </p:extLst>
+  </p:cSld>
+  <p:clrMapOvr>
+    <a:masterClrMapping/>
+  </p:clrMapOvr>
+</p:sld>
+</file>
+
+<file path=ppt/slides/slide15.xml><?xml version="1.0" encoding="utf-8"?>
+<p:sld xmlns:a="http://schemas.openxmlformats.org/drawingml/2006/main" xmlns:r="http://schemas.openxmlformats.org/officeDocument/2006/relationships" xmlns:p="http://schemas.openxmlformats.org/presentationml/2006/main">
+  <p:cSld>
+    <p:spTree>
+      <p:nvGrpSpPr>
+        <p:cNvPr id="1" name=""/>
+        <p:cNvGrpSpPr/>
+        <p:nvPr/>
+      </p:nvGrpSpPr>
+      <p:grpSpPr>
+        <a:xfrm>
+          <a:off x="0" y="0"/>
+          <a:ext cx="0" cy="0"/>
+          <a:chOff x="0" y="0"/>
+          <a:chExt cx="0" cy="0"/>
+        </a:xfrm>
+      </p:grpSpPr>
+      <p:sp>
+        <p:nvSpPr>
+          <p:cNvPr id="2" name="Title 1">
+            <a:extLst>
+              <a:ext uri="{FF2B5EF4-FFF2-40B4-BE49-F238E27FC236}">
+                <a16:creationId xmlns:a16="http://schemas.microsoft.com/office/drawing/2014/main" id="{672EBB02-FCB7-449D-9D6A-64ED9C5983DF}"/>
+              </a:ext>
+            </a:extLst>
+          </p:cNvPr>
+          <p:cNvSpPr>
+            <a:spLocks noGrp="1"/>
+          </p:cNvSpPr>
+          <p:nvPr>
+            <p:ph type="title"/>
+          </p:nvPr>
+        </p:nvSpPr>
+        <p:spPr/>
+        <p:txBody>
+          <a:bodyPr/>
+          <a:lstStyle/>
+          <a:p>
+            <a:r>
+              <a:rPr lang="en-GB" dirty="0"/>
+              <a:t>To keep things Symmetrical </a:t>
+            </a:r>
+          </a:p>
+        </p:txBody>
+      </p:sp>
+      <p:pic>
+        <p:nvPicPr>
+          <p:cNvPr id="4" name="Content Placeholder 3">
+            <a:extLst>
+              <a:ext uri="{FF2B5EF4-FFF2-40B4-BE49-F238E27FC236}">
+                <a16:creationId xmlns:a16="http://schemas.microsoft.com/office/drawing/2014/main" id="{28892EEA-ED28-49F1-8732-616C7DFC3093}"/>
+              </a:ext>
+            </a:extLst>
+          </p:cNvPr>
+          <p:cNvPicPr>
+            <a:picLocks noGrp="1" noChangeAspect="1"/>
+          </p:cNvPicPr>
+          <p:nvPr>
+            <p:ph idx="1"/>
+          </p:nvPr>
+        </p:nvPicPr>
+        <p:blipFill>
+          <a:blip r:embed="rId3"/>
+          <a:stretch>
+            <a:fillRect/>
+          </a:stretch>
+        </p:blipFill>
+        <p:spPr>
+          <a:xfrm>
+            <a:off x="2802552" y="1792784"/>
+            <a:ext cx="6586895" cy="4195762"/>
+          </a:xfrm>
+          <a:prstGeom prst="rect">
+            <a:avLst/>
+          </a:prstGeom>
+        </p:spPr>
+      </p:pic>
+      <p:sp>
+        <p:nvSpPr>
+          <p:cNvPr id="5" name="Rectangle 4">
+            <a:extLst>
+              <a:ext uri="{FF2B5EF4-FFF2-40B4-BE49-F238E27FC236}">
+                <a16:creationId xmlns:a16="http://schemas.microsoft.com/office/drawing/2014/main" id="{432E7842-52B2-456C-8D0A-BC10CCCEAFDE}"/>
+              </a:ext>
+            </a:extLst>
+          </p:cNvPr>
+          <p:cNvSpPr/>
+          <p:nvPr/>
+        </p:nvSpPr>
+        <p:spPr>
+          <a:xfrm>
+            <a:off x="147853" y="2967335"/>
+            <a:ext cx="2420406" cy="923330"/>
+          </a:xfrm>
+          <a:prstGeom prst="rect">
+            <a:avLst/>
+          </a:prstGeom>
+          <a:noFill/>
+        </p:spPr>
+        <p:txBody>
+          <a:bodyPr wrap="none" lIns="91440" tIns="45720" rIns="91440" bIns="45720">
+            <a:spAutoFit/>
+          </a:bodyPr>
+          <a:lstStyle/>
+          <a:p>
+            <a:pPr algn="ctr"/>
+            <a:r>
+              <a:rPr lang="en-US" sz="5400" b="0" cap="none" spc="0" dirty="0">
+                <a:ln w="0"/>
+                <a:solidFill>
+                  <a:schemeClr val="tx1"/>
+                </a:solidFill>
+                <a:effectLst>
+                  <a:outerShdw blurRad="38100" dist="19050" dir="2700000" algn="tl" rotWithShape="0">
+                    <a:schemeClr val="dk1">
+                      <a:alpha val="40000"/>
+                    </a:schemeClr>
+                  </a:outerShdw>
+                </a:effectLst>
+              </a:rPr>
+              <a:t>Player 1</a:t>
+            </a:r>
+          </a:p>
+        </p:txBody>
+      </p:sp>
+      <p:sp>
+        <p:nvSpPr>
+          <p:cNvPr id="6" name="Rectangle 5">
+            <a:extLst>
+              <a:ext uri="{FF2B5EF4-FFF2-40B4-BE49-F238E27FC236}">
+                <a16:creationId xmlns:a16="http://schemas.microsoft.com/office/drawing/2014/main" id="{BA4DA330-4127-4639-AF23-007D271219CB}"/>
+              </a:ext>
+            </a:extLst>
+          </p:cNvPr>
+          <p:cNvSpPr/>
+          <p:nvPr/>
+        </p:nvSpPr>
+        <p:spPr>
+          <a:xfrm>
+            <a:off x="9598002" y="2872085"/>
+            <a:ext cx="2420406" cy="923330"/>
+          </a:xfrm>
+          <a:prstGeom prst="rect">
+            <a:avLst/>
+          </a:prstGeom>
+          <a:noFill/>
+        </p:spPr>
+        <p:txBody>
+          <a:bodyPr wrap="none" lIns="91440" tIns="45720" rIns="91440" bIns="45720">
+            <a:spAutoFit/>
+          </a:bodyPr>
+          <a:lstStyle/>
+          <a:p>
+            <a:pPr algn="ctr"/>
+            <a:r>
+              <a:rPr lang="en-US" sz="5400" b="0" cap="none" spc="0" dirty="0">
+                <a:ln w="0"/>
+                <a:solidFill>
+                  <a:schemeClr val="tx1"/>
+                </a:solidFill>
+                <a:effectLst>
+                  <a:outerShdw blurRad="38100" dist="19050" dir="2700000" algn="tl" rotWithShape="0">
+                    <a:schemeClr val="dk1">
+                      <a:alpha val="40000"/>
+                    </a:schemeClr>
+                  </a:outerShdw>
+                </a:effectLst>
+              </a:rPr>
+              <a:t>Player 2</a:t>
+            </a:r>
+          </a:p>
+        </p:txBody>
+      </p:sp>
+    </p:spTree>
+    <p:extLst>
+      <p:ext uri="{BB962C8B-B14F-4D97-AF65-F5344CB8AC3E}">
+        <p14:creationId xmlns:p14="http://schemas.microsoft.com/office/powerpoint/2010/main" val="1943397596"/>
+      </p:ext>
+    </p:extLst>
+  </p:cSld>
+  <p:clrMapOvr>
+    <a:masterClrMapping/>
+  </p:clrMapOvr>
+</p:sld>
+</file>
+
+<file path=ppt/slides/slide16.xml><?xml version="1.0" encoding="utf-8"?>
+<p:sld xmlns:a="http://schemas.openxmlformats.org/drawingml/2006/main" xmlns:r="http://schemas.openxmlformats.org/officeDocument/2006/relationships" xmlns:p="http://schemas.openxmlformats.org/presentationml/2006/main">
+  <p:cSld>
+    <p:spTree>
+      <p:nvGrpSpPr>
+        <p:cNvPr id="1" name=""/>
+        <p:cNvGrpSpPr/>
+        <p:nvPr/>
+      </p:nvGrpSpPr>
+      <p:grpSpPr>
+        <a:xfrm>
+          <a:off x="0" y="0"/>
+          <a:ext cx="0" cy="0"/>
+          <a:chOff x="0" y="0"/>
+          <a:chExt cx="0" cy="0"/>
+        </a:xfrm>
+      </p:grpSpPr>
+      <p:sp>
+        <p:nvSpPr>
+          <p:cNvPr id="2" name="Title 1">
+            <a:extLst>
+              <a:ext uri="{FF2B5EF4-FFF2-40B4-BE49-F238E27FC236}">
+                <a16:creationId xmlns:a16="http://schemas.microsoft.com/office/drawing/2014/main" id="{672EBB02-FCB7-449D-9D6A-64ED9C5983DF}"/>
+              </a:ext>
+            </a:extLst>
+          </p:cNvPr>
+          <p:cNvSpPr>
+            <a:spLocks noGrp="1"/>
+          </p:cNvSpPr>
+          <p:nvPr>
+            <p:ph type="title"/>
+          </p:nvPr>
+        </p:nvSpPr>
+        <p:spPr/>
+        <p:txBody>
+          <a:bodyPr/>
+          <a:lstStyle/>
+          <a:p>
+            <a:r>
+              <a:rPr lang="en-GB" dirty="0"/>
+              <a:t>To keep things Symmetrical </a:t>
+            </a:r>
+          </a:p>
+        </p:txBody>
+      </p:sp>
+      <p:pic>
+        <p:nvPicPr>
+          <p:cNvPr id="9" name="Content Placeholder 8">
+            <a:extLst>
+              <a:ext uri="{FF2B5EF4-FFF2-40B4-BE49-F238E27FC236}">
+                <a16:creationId xmlns:a16="http://schemas.microsoft.com/office/drawing/2014/main" id="{45A73B88-1535-4E04-AF47-20EB656284D6}"/>
+              </a:ext>
+            </a:extLst>
+          </p:cNvPr>
+          <p:cNvPicPr>
+            <a:picLocks noGrp="1" noChangeAspect="1"/>
+          </p:cNvPicPr>
+          <p:nvPr>
+            <p:ph idx="1"/>
+          </p:nvPr>
+        </p:nvPicPr>
+        <p:blipFill>
+          <a:blip r:embed="rId3"/>
+          <a:stretch>
+            <a:fillRect/>
+          </a:stretch>
+        </p:blipFill>
+        <p:spPr>
+          <a:xfrm>
+            <a:off x="2751809" y="1792784"/>
+            <a:ext cx="6688381" cy="4195762"/>
+          </a:xfrm>
+          <a:prstGeom prst="rect">
+            <a:avLst/>
+          </a:prstGeom>
+        </p:spPr>
+      </p:pic>
+      <p:sp>
+        <p:nvSpPr>
+          <p:cNvPr id="5" name="Rectangle 4">
+            <a:extLst>
+              <a:ext uri="{FF2B5EF4-FFF2-40B4-BE49-F238E27FC236}">
+                <a16:creationId xmlns:a16="http://schemas.microsoft.com/office/drawing/2014/main" id="{432E7842-52B2-456C-8D0A-BC10CCCEAFDE}"/>
+              </a:ext>
+            </a:extLst>
+          </p:cNvPr>
+          <p:cNvSpPr/>
+          <p:nvPr/>
+        </p:nvSpPr>
+        <p:spPr>
+          <a:xfrm>
+            <a:off x="157378" y="2967335"/>
+            <a:ext cx="2420406" cy="923330"/>
+          </a:xfrm>
+          <a:prstGeom prst="rect">
+            <a:avLst/>
+          </a:prstGeom>
+          <a:noFill/>
+        </p:spPr>
+        <p:txBody>
+          <a:bodyPr wrap="none" lIns="91440" tIns="45720" rIns="91440" bIns="45720">
+            <a:spAutoFit/>
+          </a:bodyPr>
+          <a:lstStyle/>
+          <a:p>
+            <a:pPr algn="ctr"/>
+            <a:r>
+              <a:rPr lang="en-US" sz="5400" b="0" cap="none" spc="0" dirty="0">
+                <a:ln w="0"/>
+                <a:solidFill>
+                  <a:schemeClr val="tx1"/>
+                </a:solidFill>
+                <a:effectLst>
+                  <a:outerShdw blurRad="38100" dist="19050" dir="2700000" algn="tl" rotWithShape="0">
+                    <a:schemeClr val="dk1">
+                      <a:alpha val="40000"/>
+                    </a:schemeClr>
+                  </a:outerShdw>
+                </a:effectLst>
+              </a:rPr>
+              <a:t>Player 1</a:t>
+            </a:r>
+          </a:p>
+        </p:txBody>
+      </p:sp>
+      <p:sp>
+        <p:nvSpPr>
+          <p:cNvPr id="6" name="Rectangle 5">
+            <a:extLst>
+              <a:ext uri="{FF2B5EF4-FFF2-40B4-BE49-F238E27FC236}">
+                <a16:creationId xmlns:a16="http://schemas.microsoft.com/office/drawing/2014/main" id="{BA4DA330-4127-4639-AF23-007D271219CB}"/>
+              </a:ext>
+            </a:extLst>
+          </p:cNvPr>
+          <p:cNvSpPr/>
+          <p:nvPr/>
+        </p:nvSpPr>
+        <p:spPr>
+          <a:xfrm>
+            <a:off x="9617052" y="2967335"/>
+            <a:ext cx="2420406" cy="923330"/>
+          </a:xfrm>
+          <a:prstGeom prst="rect">
+            <a:avLst/>
+          </a:prstGeom>
+          <a:noFill/>
+        </p:spPr>
+        <p:txBody>
+          <a:bodyPr wrap="none" lIns="91440" tIns="45720" rIns="91440" bIns="45720">
+            <a:spAutoFit/>
+          </a:bodyPr>
+          <a:lstStyle/>
+          <a:p>
+            <a:pPr algn="ctr"/>
+            <a:r>
+              <a:rPr lang="en-US" sz="5400" b="0" cap="none" spc="0" dirty="0">
+                <a:ln w="0"/>
+                <a:solidFill>
+                  <a:schemeClr val="tx1"/>
+                </a:solidFill>
+                <a:effectLst>
+                  <a:outerShdw blurRad="38100" dist="19050" dir="2700000" algn="tl" rotWithShape="0">
+                    <a:schemeClr val="dk1">
+                      <a:alpha val="40000"/>
+                    </a:schemeClr>
+                  </a:outerShdw>
+                </a:effectLst>
+              </a:rPr>
+              <a:t>Player 2</a:t>
+            </a:r>
+          </a:p>
+        </p:txBody>
+      </p:sp>
+    </p:spTree>
+    <p:extLst>
+      <p:ext uri="{BB962C8B-B14F-4D97-AF65-F5344CB8AC3E}">
+        <p14:creationId xmlns:p14="http://schemas.microsoft.com/office/powerpoint/2010/main" val="276089555"/>
+      </p:ext>
+    </p:extLst>
+  </p:cSld>
+  <p:clrMapOvr>
+    <a:masterClrMapping/>
+  </p:clrMapOvr>
+</p:sld>
+</file>
+
+<file path=ppt/slides/slide17.xml><?xml version="1.0" encoding="utf-8"?>
+<p:sld xmlns:a="http://schemas.openxmlformats.org/drawingml/2006/main" xmlns:r="http://schemas.openxmlformats.org/officeDocument/2006/relationships" xmlns:p="http://schemas.openxmlformats.org/presentationml/2006/main">
+  <p:cSld>
+    <p:spTree>
+      <p:nvGrpSpPr>
+        <p:cNvPr id="1" name=""/>
+        <p:cNvGrpSpPr/>
+        <p:nvPr/>
+      </p:nvGrpSpPr>
+      <p:grpSpPr>
+        <a:xfrm>
+          <a:off x="0" y="0"/>
+          <a:ext cx="0" cy="0"/>
+          <a:chOff x="0" y="0"/>
+          <a:chExt cx="0" cy="0"/>
+        </a:xfrm>
+      </p:grpSpPr>
+      <p:sp>
+        <p:nvSpPr>
+          <p:cNvPr id="2" name="Title 1">
+            <a:extLst>
+              <a:ext uri="{FF2B5EF4-FFF2-40B4-BE49-F238E27FC236}">
+                <a16:creationId xmlns:a16="http://schemas.microsoft.com/office/drawing/2014/main" id="{FE35A943-83D0-4753-AA1C-4A6833FF9B39}"/>
+              </a:ext>
+            </a:extLst>
+          </p:cNvPr>
+          <p:cNvSpPr>
+            <a:spLocks noGrp="1"/>
+          </p:cNvSpPr>
+          <p:nvPr>
+            <p:ph type="title"/>
+          </p:nvPr>
+        </p:nvSpPr>
+        <p:spPr/>
+        <p:txBody>
+          <a:bodyPr/>
+          <a:lstStyle/>
+          <a:p>
+            <a:r>
+              <a:rPr lang="en-GB" dirty="0"/>
+              <a:t>The player experience</a:t>
+            </a:r>
+          </a:p>
+        </p:txBody>
+      </p:sp>
+      <p:sp>
+        <p:nvSpPr>
+          <p:cNvPr id="3" name="Content Placeholder 2">
+            <a:extLst>
+              <a:ext uri="{FF2B5EF4-FFF2-40B4-BE49-F238E27FC236}">
+                <a16:creationId xmlns:a16="http://schemas.microsoft.com/office/drawing/2014/main" id="{5E33382E-A521-4D39-8DD5-E2DC47E4FE22}"/>
+              </a:ext>
+            </a:extLst>
+          </p:cNvPr>
+          <p:cNvSpPr>
+            <a:spLocks noGrp="1"/>
+          </p:cNvSpPr>
+          <p:nvPr>
+            <p:ph idx="1"/>
+          </p:nvPr>
+        </p:nvSpPr>
+        <p:spPr/>
+        <p:txBody>
+          <a:bodyPr/>
+          <a:lstStyle/>
+          <a:p>
+            <a:r>
+              <a:rPr lang="en-GB" dirty="0"/>
+              <a:t>We want both of the players to experience a sense of hard fun</a:t>
+            </a:r>
+          </a:p>
+          <a:p>
+            <a:pPr lvl="1"/>
+            <a:r>
+              <a:rPr lang="en-GB" dirty="0" err="1"/>
+              <a:t>Fiero</a:t>
+            </a:r>
+            <a:r>
+              <a:rPr lang="en-GB" dirty="0"/>
+              <a:t>, strategy and obstacles</a:t>
+            </a:r>
+          </a:p>
+          <a:p>
+            <a:r>
+              <a:rPr lang="en-GB" dirty="0"/>
+              <a:t>A sense of people fun</a:t>
+            </a:r>
+          </a:p>
+          <a:p>
+            <a:pPr lvl="1"/>
+            <a:r>
+              <a:rPr lang="en-GB" dirty="0"/>
+              <a:t>Amusement and player interaction</a:t>
+            </a:r>
+          </a:p>
+        </p:txBody>
+      </p:sp>
+    </p:spTree>
+    <p:extLst>
+      <p:ext uri="{BB962C8B-B14F-4D97-AF65-F5344CB8AC3E}">
+        <p14:creationId xmlns:p14="http://schemas.microsoft.com/office/powerpoint/2010/main" val="1822042671"/>
+      </p:ext>
+    </p:extLst>
+  </p:cSld>
+  <p:clrMapOvr>
+    <a:masterClrMapping/>
+  </p:clrMapOvr>
+</p:sld>
+</file>
+
+<file path=ppt/slides/slide18.xml><?xml version="1.0" encoding="utf-8"?>
+<p:sld xmlns:a="http://schemas.openxmlformats.org/drawingml/2006/main" xmlns:r="http://schemas.openxmlformats.org/officeDocument/2006/relationships" xmlns:p="http://schemas.openxmlformats.org/presentationml/2006/main">
+  <p:cSld>
+    <p:spTree>
+      <p:nvGrpSpPr>
+        <p:cNvPr id="1" name=""/>
+        <p:cNvGrpSpPr/>
+        <p:nvPr/>
+      </p:nvGrpSpPr>
+      <p:grpSpPr>
+        <a:xfrm>
+          <a:off x="0" y="0"/>
+          <a:ext cx="0" cy="0"/>
+          <a:chOff x="0" y="0"/>
+          <a:chExt cx="0" cy="0"/>
+        </a:xfrm>
+      </p:grpSpPr>
+      <p:sp>
+        <p:nvSpPr>
+          <p:cNvPr id="2" name="Title 1">
+            <a:extLst>
+              <a:ext uri="{FF2B5EF4-FFF2-40B4-BE49-F238E27FC236}">
+                <a16:creationId xmlns:a16="http://schemas.microsoft.com/office/drawing/2014/main" id="{884D9554-1741-4629-B62D-1C02996DE221}"/>
+              </a:ext>
+            </a:extLst>
+          </p:cNvPr>
+          <p:cNvSpPr>
+            <a:spLocks noGrp="1"/>
+          </p:cNvSpPr>
+          <p:nvPr>
+            <p:ph type="title"/>
+          </p:nvPr>
+        </p:nvSpPr>
+        <p:spPr/>
+        <p:txBody>
+          <a:bodyPr/>
+          <a:lstStyle/>
+          <a:p>
+            <a:r>
+              <a:rPr lang="en-GB" dirty="0"/>
+              <a:t>The following week</a:t>
+            </a:r>
+          </a:p>
+        </p:txBody>
+      </p:sp>
+      <p:sp>
+        <p:nvSpPr>
+          <p:cNvPr id="3" name="Content Placeholder 2">
+            <a:extLst>
+              <a:ext uri="{FF2B5EF4-FFF2-40B4-BE49-F238E27FC236}">
+                <a16:creationId xmlns:a16="http://schemas.microsoft.com/office/drawing/2014/main" id="{5B90EE24-1240-4B7B-8D92-EA4B79F1A4B4}"/>
+              </a:ext>
+            </a:extLst>
+          </p:cNvPr>
+          <p:cNvSpPr>
+            <a:spLocks noGrp="1"/>
+          </p:cNvSpPr>
+          <p:nvPr>
+            <p:ph idx="1"/>
+          </p:nvPr>
+        </p:nvSpPr>
+        <p:spPr/>
+        <p:txBody>
+          <a:bodyPr/>
+          <a:lstStyle/>
+          <a:p>
+            <a:r>
+              <a:rPr lang="en-GB" dirty="0"/>
+              <a:t>Picking a theme</a:t>
+            </a:r>
+          </a:p>
+          <a:p>
+            <a:r>
+              <a:rPr lang="en-GB" dirty="0"/>
+              <a:t>Building a </a:t>
+            </a:r>
+            <a:r>
+              <a:rPr lang="en-GB" dirty="0" err="1"/>
+              <a:t>prtotype</a:t>
+            </a:r>
+            <a:endParaRPr lang="en-GB" dirty="0"/>
+          </a:p>
+        </p:txBody>
+      </p:sp>
+    </p:spTree>
+    <p:extLst>
+      <p:ext uri="{BB962C8B-B14F-4D97-AF65-F5344CB8AC3E}">
+        <p14:creationId xmlns:p14="http://schemas.microsoft.com/office/powerpoint/2010/main" val="855245935"/>
+      </p:ext>
+    </p:extLst>
+  </p:cSld>
+  <p:clrMapOvr>
+    <a:masterClrMapping/>
+  </p:clrMapOvr>
+</p:sld>
+</file>
+
+<file path=ppt/slides/slide19.xml><?xml version="1.0" encoding="utf-8"?>
+<p:sld xmlns:a="http://schemas.openxmlformats.org/drawingml/2006/main" xmlns:r="http://schemas.openxmlformats.org/officeDocument/2006/relationships" xmlns:p="http://schemas.openxmlformats.org/presentationml/2006/main">
+  <p:cSld>
+    <p:spTree>
+      <p:nvGrpSpPr>
+        <p:cNvPr id="1" name=""/>
+        <p:cNvGrpSpPr/>
+        <p:nvPr/>
+      </p:nvGrpSpPr>
+      <p:grpSpPr>
+        <a:xfrm>
+          <a:off x="0" y="0"/>
+          <a:ext cx="0" cy="0"/>
+          <a:chOff x="0" y="0"/>
+          <a:chExt cx="0" cy="0"/>
+        </a:xfrm>
+      </p:grpSpPr>
+      <p:sp>
+        <p:nvSpPr>
+          <p:cNvPr id="2" name="Title 1">
+            <a:extLst>
+              <a:ext uri="{FF2B5EF4-FFF2-40B4-BE49-F238E27FC236}">
                 <a16:creationId xmlns:a16="http://schemas.microsoft.com/office/drawing/2014/main" id="{2AE1F416-5594-4C07-ADDF-FE02BFFE75D1}"/>
               </a:ext>
             </a:extLst>
@@ -8459,40 +8940,21 @@
             <p:ph type="title"/>
           </p:nvPr>
         </p:nvSpPr>
-        <p:spPr/>
+        <p:spPr>
+          <a:xfrm>
+            <a:off x="1393638" y="2728735"/>
+            <a:ext cx="9404723" cy="1400530"/>
+          </a:xfrm>
+        </p:spPr>
         <p:txBody>
           <a:bodyPr/>
           <a:lstStyle/>
           <a:p>
+            <a:pPr algn="ctr"/>
             <a:r>
               <a:rPr lang="en-GB" dirty="0"/>
-              <a:t>Questions</a:t>
-            </a:r>
-          </a:p>
-        </p:txBody>
-      </p:sp>
-      <p:sp>
-        <p:nvSpPr>
-          <p:cNvPr id="3" name="Content Placeholder 2">
-            <a:extLst>
-              <a:ext uri="{FF2B5EF4-FFF2-40B4-BE49-F238E27FC236}">
-                <a16:creationId xmlns:a16="http://schemas.microsoft.com/office/drawing/2014/main" id="{066790EB-256C-4CC7-8DC5-D113E01307C8}"/>
-              </a:ext>
-            </a:extLst>
-          </p:cNvPr>
-          <p:cNvSpPr>
-            <a:spLocks noGrp="1"/>
-          </p:cNvSpPr>
-          <p:nvPr>
-            <p:ph idx="1"/>
-          </p:nvPr>
-        </p:nvSpPr>
-        <p:spPr/>
-        <p:txBody>
-          <a:bodyPr/>
-          <a:lstStyle/>
-          <a:p>
-            <a:endParaRPr lang="en-GB" dirty="0"/>
+              <a:t>Any Questions?</a:t>
+            </a:r>
           </a:p>
         </p:txBody>
       </p:sp>
@@ -8510,6 +8972,122 @@
 </file>
 
 <file path=ppt/slides/slide2.xml><?xml version="1.0" encoding="utf-8"?>
+<p:sld xmlns:a="http://schemas.openxmlformats.org/drawingml/2006/main" xmlns:r="http://schemas.openxmlformats.org/officeDocument/2006/relationships" xmlns:p="http://schemas.openxmlformats.org/presentationml/2006/main">
+  <p:cSld>
+    <p:spTree>
+      <p:nvGrpSpPr>
+        <p:cNvPr id="1" name=""/>
+        <p:cNvGrpSpPr/>
+        <p:nvPr/>
+      </p:nvGrpSpPr>
+      <p:grpSpPr>
+        <a:xfrm>
+          <a:off x="0" y="0"/>
+          <a:ext cx="0" cy="0"/>
+          <a:chOff x="0" y="0"/>
+          <a:chExt cx="0" cy="0"/>
+        </a:xfrm>
+      </p:grpSpPr>
+      <p:sp>
+        <p:nvSpPr>
+          <p:cNvPr id="2" name="Title 1">
+            <a:extLst>
+              <a:ext uri="{FF2B5EF4-FFF2-40B4-BE49-F238E27FC236}">
+                <a16:creationId xmlns:a16="http://schemas.microsoft.com/office/drawing/2014/main" id="{095F9E9F-BD9C-40B1-9490-41C21A7839D0}"/>
+              </a:ext>
+            </a:extLst>
+          </p:cNvPr>
+          <p:cNvSpPr>
+            <a:spLocks noGrp="1"/>
+          </p:cNvSpPr>
+          <p:nvPr>
+            <p:ph type="title"/>
+          </p:nvPr>
+        </p:nvSpPr>
+        <p:spPr/>
+        <p:txBody>
+          <a:bodyPr/>
+          <a:lstStyle/>
+          <a:p>
+            <a:r>
+              <a:rPr lang="en-GB" dirty="0"/>
+              <a:t>How the game fits the brief</a:t>
+            </a:r>
+          </a:p>
+        </p:txBody>
+      </p:sp>
+      <p:sp>
+        <p:nvSpPr>
+          <p:cNvPr id="3" name="Content Placeholder 2">
+            <a:extLst>
+              <a:ext uri="{FF2B5EF4-FFF2-40B4-BE49-F238E27FC236}">
+                <a16:creationId xmlns:a16="http://schemas.microsoft.com/office/drawing/2014/main" id="{35BCE0E4-12ED-4056-BB4E-B3485D3E505F}"/>
+              </a:ext>
+            </a:extLst>
+          </p:cNvPr>
+          <p:cNvSpPr>
+            <a:spLocks noGrp="1"/>
+          </p:cNvSpPr>
+          <p:nvPr>
+            <p:ph idx="1"/>
+          </p:nvPr>
+        </p:nvSpPr>
+        <p:spPr/>
+        <p:txBody>
+          <a:bodyPr/>
+          <a:lstStyle/>
+          <a:p>
+            <a:r>
+              <a:rPr lang="en-GB" dirty="0"/>
+              <a:t>The game is 2d</a:t>
+            </a:r>
+          </a:p>
+          <a:p>
+            <a:r>
+              <a:rPr lang="en-GB" dirty="0"/>
+              <a:t>The only control is tapping</a:t>
+            </a:r>
+          </a:p>
+          <a:p>
+            <a:r>
+              <a:rPr lang="en-GB" dirty="0"/>
+              <a:t>Each player has a turn</a:t>
+            </a:r>
+          </a:p>
+          <a:p>
+            <a:r>
+              <a:rPr lang="en-GB" dirty="0"/>
+              <a:t>The game will be played on one device</a:t>
+            </a:r>
+          </a:p>
+          <a:p>
+            <a:r>
+              <a:rPr lang="en-GB" dirty="0"/>
+              <a:t>The level design is symmetric</a:t>
+            </a:r>
+          </a:p>
+          <a:p>
+            <a:r>
+              <a:rPr lang="en-GB" dirty="0"/>
+              <a:t>There are two controls which make the game simple and intuitive</a:t>
+            </a:r>
+          </a:p>
+        </p:txBody>
+      </p:sp>
+    </p:spTree>
+    <p:extLst>
+      <p:ext uri="{BB962C8B-B14F-4D97-AF65-F5344CB8AC3E}">
+        <p14:creationId xmlns:p14="http://schemas.microsoft.com/office/powerpoint/2010/main" val="2225047168"/>
+      </p:ext>
+    </p:extLst>
+  </p:cSld>
+  <p:clrMapOvr>
+    <a:masterClrMapping/>
+  </p:clrMapOvr>
+</p:sld>
+</file>
+
+<file path=ppt/slides/slide3.xml><?xml version="1.0" encoding="utf-8"?>
 <p:sld xmlns:a="http://schemas.openxmlformats.org/drawingml/2006/main" xmlns:r="http://schemas.openxmlformats.org/officeDocument/2006/relationships" xmlns:p="http://schemas.openxmlformats.org/presentationml/2006/main">
   <p:cSld>
     <p:bg>
@@ -8701,7 +9279,7 @@
 </p:sld>
 </file>
 
-<file path=ppt/slides/slide3.xml><?xml version="1.0" encoding="utf-8"?>
+<file path=ppt/slides/slide4.xml><?xml version="1.0" encoding="utf-8"?>
 <p:sld xmlns:a="http://schemas.openxmlformats.org/drawingml/2006/main" xmlns:r="http://schemas.openxmlformats.org/officeDocument/2006/relationships" xmlns:p="http://schemas.openxmlformats.org/presentationml/2006/main">
   <p:cSld>
     <p:bg>
@@ -9063,7 +9641,7 @@
 </p:sld>
 </file>
 
-<file path=ppt/slides/slide4.xml><?xml version="1.0" encoding="utf-8"?>
+<file path=ppt/slides/slide5.xml><?xml version="1.0" encoding="utf-8"?>
 <p:sld xmlns:a="http://schemas.openxmlformats.org/drawingml/2006/main" xmlns:r="http://schemas.openxmlformats.org/officeDocument/2006/relationships" xmlns:p="http://schemas.openxmlformats.org/presentationml/2006/main">
   <p:cSld>
     <p:spTree>
@@ -9085,6 +9663,89 @@
           <p:cNvPr id="2" name="Title 1">
             <a:extLst>
               <a:ext uri="{FF2B5EF4-FFF2-40B4-BE49-F238E27FC236}">
+                <a16:creationId xmlns:a16="http://schemas.microsoft.com/office/drawing/2014/main" id="{2036735B-D95D-4C6E-97E3-979A377C30B2}"/>
+              </a:ext>
+            </a:extLst>
+          </p:cNvPr>
+          <p:cNvSpPr>
+            <a:spLocks noGrp="1"/>
+          </p:cNvSpPr>
+          <p:nvPr>
+            <p:ph type="title"/>
+          </p:nvPr>
+        </p:nvSpPr>
+        <p:spPr/>
+        <p:txBody>
+          <a:bodyPr/>
+          <a:lstStyle/>
+          <a:p>
+            <a:r>
+              <a:rPr lang="en-GB" dirty="0"/>
+              <a:t>Games we looked at</a:t>
+            </a:r>
+          </a:p>
+        </p:txBody>
+      </p:sp>
+      <p:sp>
+        <p:nvSpPr>
+          <p:cNvPr id="3" name="Content Placeholder 2">
+            <a:extLst>
+              <a:ext uri="{FF2B5EF4-FFF2-40B4-BE49-F238E27FC236}">
+                <a16:creationId xmlns:a16="http://schemas.microsoft.com/office/drawing/2014/main" id="{DF94013C-0F2A-4DFF-95E3-4F0A1E6FD97E}"/>
+              </a:ext>
+            </a:extLst>
+          </p:cNvPr>
+          <p:cNvSpPr>
+            <a:spLocks noGrp="1"/>
+          </p:cNvSpPr>
+          <p:nvPr>
+            <p:ph idx="1"/>
+          </p:nvPr>
+        </p:nvSpPr>
+        <p:spPr/>
+        <p:txBody>
+          <a:bodyPr/>
+          <a:lstStyle/>
+          <a:p>
+            <a:endParaRPr lang="en-GB"/>
+          </a:p>
+        </p:txBody>
+      </p:sp>
+    </p:spTree>
+    <p:extLst>
+      <p:ext uri="{BB962C8B-B14F-4D97-AF65-F5344CB8AC3E}">
+        <p14:creationId xmlns:p14="http://schemas.microsoft.com/office/powerpoint/2010/main" val="1314822043"/>
+      </p:ext>
+    </p:extLst>
+  </p:cSld>
+  <p:clrMapOvr>
+    <a:masterClrMapping/>
+  </p:clrMapOvr>
+</p:sld>
+</file>
+
+<file path=ppt/slides/slide6.xml><?xml version="1.0" encoding="utf-8"?>
+<p:sld xmlns:a="http://schemas.openxmlformats.org/drawingml/2006/main" xmlns:r="http://schemas.openxmlformats.org/officeDocument/2006/relationships" xmlns:p="http://schemas.openxmlformats.org/presentationml/2006/main">
+  <p:cSld>
+    <p:spTree>
+      <p:nvGrpSpPr>
+        <p:cNvPr id="1" name=""/>
+        <p:cNvGrpSpPr/>
+        <p:nvPr/>
+      </p:nvGrpSpPr>
+      <p:grpSpPr>
+        <a:xfrm>
+          <a:off x="0" y="0"/>
+          <a:ext cx="0" cy="0"/>
+          <a:chOff x="0" y="0"/>
+          <a:chExt cx="0" cy="0"/>
+        </a:xfrm>
+      </p:grpSpPr>
+      <p:sp>
+        <p:nvSpPr>
+          <p:cNvPr id="2" name="Title 1">
+            <a:extLst>
+              <a:ext uri="{FF2B5EF4-FFF2-40B4-BE49-F238E27FC236}">
                 <a16:creationId xmlns:a16="http://schemas.microsoft.com/office/drawing/2014/main" id="{B800E62F-782F-4ACF-883E-C01DCFC56AA2}"/>
               </a:ext>
             </a:extLst>
@@ -9167,7 +9828,7 @@
 </p:sld>
 </file>
 
-<file path=ppt/slides/slide5.xml><?xml version="1.0" encoding="utf-8"?>
+<file path=ppt/slides/slide7.xml><?xml version="1.0" encoding="utf-8"?>
 <p:sld xmlns:a="http://schemas.openxmlformats.org/drawingml/2006/main" xmlns:r="http://schemas.openxmlformats.org/officeDocument/2006/relationships" xmlns:p="http://schemas.openxmlformats.org/presentationml/2006/main">
   <p:cSld>
     <p:spTree>
@@ -9763,201 +10424,6 @@
 </p:sld>
 </file>
 
-<file path=ppt/slides/slide6.xml><?xml version="1.0" encoding="utf-8"?>
-<p:sld xmlns:a="http://schemas.openxmlformats.org/drawingml/2006/main" xmlns:r="http://schemas.openxmlformats.org/officeDocument/2006/relationships" xmlns:p="http://schemas.openxmlformats.org/presentationml/2006/main">
-  <p:cSld>
-    <p:spTree>
-      <p:nvGrpSpPr>
-        <p:cNvPr id="1" name=""/>
-        <p:cNvGrpSpPr/>
-        <p:nvPr/>
-      </p:nvGrpSpPr>
-      <p:grpSpPr>
-        <a:xfrm>
-          <a:off x="0" y="0"/>
-          <a:ext cx="0" cy="0"/>
-          <a:chOff x="0" y="0"/>
-          <a:chExt cx="0" cy="0"/>
-        </a:xfrm>
-      </p:grpSpPr>
-      <p:sp>
-        <p:nvSpPr>
-          <p:cNvPr id="2" name="Title 1">
-            <a:extLst>
-              <a:ext uri="{FF2B5EF4-FFF2-40B4-BE49-F238E27FC236}">
-                <a16:creationId xmlns:a16="http://schemas.microsoft.com/office/drawing/2014/main" id="{2A6C51B4-F8AB-4319-8469-886E389188DE}"/>
-              </a:ext>
-            </a:extLst>
-          </p:cNvPr>
-          <p:cNvSpPr>
-            <a:spLocks noGrp="1"/>
-          </p:cNvSpPr>
-          <p:nvPr>
-            <p:ph type="title"/>
-          </p:nvPr>
-        </p:nvSpPr>
-        <p:spPr/>
-        <p:txBody>
-          <a:bodyPr/>
-          <a:lstStyle/>
-          <a:p>
-            <a:r>
-              <a:rPr lang="en-GB" dirty="0"/>
-              <a:t>What does the player do?</a:t>
-            </a:r>
-          </a:p>
-        </p:txBody>
-      </p:sp>
-      <p:sp>
-        <p:nvSpPr>
-          <p:cNvPr id="3" name="Content Placeholder 2">
-            <a:extLst>
-              <a:ext uri="{FF2B5EF4-FFF2-40B4-BE49-F238E27FC236}">
-                <a16:creationId xmlns:a16="http://schemas.microsoft.com/office/drawing/2014/main" id="{F592138A-5065-4B76-9944-5BE34C8C0BA5}"/>
-              </a:ext>
-            </a:extLst>
-          </p:cNvPr>
-          <p:cNvSpPr>
-            <a:spLocks noGrp="1"/>
-          </p:cNvSpPr>
-          <p:nvPr>
-            <p:ph idx="1"/>
-          </p:nvPr>
-        </p:nvSpPr>
-        <p:spPr/>
-        <p:txBody>
-          <a:bodyPr>
-            <a:normAutofit/>
-          </a:bodyPr>
-          <a:lstStyle/>
-          <a:p>
-            <a:r>
-              <a:rPr lang="en-GB" dirty="0"/>
-              <a:t>Players will take turns in firing projectiles at each other.</a:t>
-            </a:r>
-          </a:p>
-          <a:p>
-            <a:r>
-              <a:rPr lang="en-GB" dirty="0"/>
-              <a:t>The angle of the launcher will be changing until the player taps, at this point it will lock into place. </a:t>
-            </a:r>
-          </a:p>
-          <a:p>
-            <a:r>
-              <a:rPr lang="en-GB" dirty="0"/>
-              <a:t>The shot power will be changing until the player taps.</a:t>
-            </a:r>
-          </a:p>
-          <a:p>
-            <a:r>
-              <a:rPr lang="en-GB" dirty="0"/>
-              <a:t>When both players have selected their shot angle and power the projectiles will fire.</a:t>
-            </a:r>
-          </a:p>
-          <a:p>
-            <a:r>
-              <a:rPr lang="en-GB" dirty="0"/>
-              <a:t>The end goal will be for one player to get the other persons health to zero. </a:t>
-            </a:r>
-          </a:p>
-        </p:txBody>
-      </p:sp>
-    </p:spTree>
-    <p:extLst>
-      <p:ext uri="{BB962C8B-B14F-4D97-AF65-F5344CB8AC3E}">
-        <p14:creationId xmlns:p14="http://schemas.microsoft.com/office/powerpoint/2010/main" val="2234175574"/>
-      </p:ext>
-    </p:extLst>
-  </p:cSld>
-  <p:clrMapOvr>
-    <a:masterClrMapping/>
-  </p:clrMapOvr>
-</p:sld>
-</file>
-
-<file path=ppt/slides/slide7.xml><?xml version="1.0" encoding="utf-8"?>
-<p:sld xmlns:a="http://schemas.openxmlformats.org/drawingml/2006/main" xmlns:r="http://schemas.openxmlformats.org/officeDocument/2006/relationships" xmlns:p="http://schemas.openxmlformats.org/presentationml/2006/main">
-  <p:cSld>
-    <p:spTree>
-      <p:nvGrpSpPr>
-        <p:cNvPr id="1" name=""/>
-        <p:cNvGrpSpPr/>
-        <p:nvPr/>
-      </p:nvGrpSpPr>
-      <p:grpSpPr>
-        <a:xfrm>
-          <a:off x="0" y="0"/>
-          <a:ext cx="0" cy="0"/>
-          <a:chOff x="0" y="0"/>
-          <a:chExt cx="0" cy="0"/>
-        </a:xfrm>
-      </p:grpSpPr>
-      <p:sp>
-        <p:nvSpPr>
-          <p:cNvPr id="2" name="Title 1">
-            <a:extLst>
-              <a:ext uri="{FF2B5EF4-FFF2-40B4-BE49-F238E27FC236}">
-                <a16:creationId xmlns:a16="http://schemas.microsoft.com/office/drawing/2014/main" id="{28E2D705-D5C3-4C74-A24E-2CAFC9876DB2}"/>
-              </a:ext>
-            </a:extLst>
-          </p:cNvPr>
-          <p:cNvSpPr>
-            <a:spLocks noGrp="1"/>
-          </p:cNvSpPr>
-          <p:nvPr>
-            <p:ph type="title"/>
-          </p:nvPr>
-        </p:nvSpPr>
-        <p:spPr/>
-        <p:txBody>
-          <a:bodyPr/>
-          <a:lstStyle/>
-          <a:p>
-            <a:r>
-              <a:rPr lang="en-GB" dirty="0"/>
-              <a:t>Concept art</a:t>
-            </a:r>
-          </a:p>
-        </p:txBody>
-      </p:sp>
-      <p:sp>
-        <p:nvSpPr>
-          <p:cNvPr id="3" name="Content Placeholder 2">
-            <a:extLst>
-              <a:ext uri="{FF2B5EF4-FFF2-40B4-BE49-F238E27FC236}">
-                <a16:creationId xmlns:a16="http://schemas.microsoft.com/office/drawing/2014/main" id="{3520E1A7-717E-4CC9-AD88-7AB756E76A49}"/>
-              </a:ext>
-            </a:extLst>
-          </p:cNvPr>
-          <p:cNvSpPr>
-            <a:spLocks noGrp="1"/>
-          </p:cNvSpPr>
-          <p:nvPr>
-            <p:ph idx="1"/>
-          </p:nvPr>
-        </p:nvSpPr>
-        <p:spPr/>
-        <p:txBody>
-          <a:bodyPr/>
-          <a:lstStyle/>
-          <a:p>
-            <a:endParaRPr lang="en-GB" dirty="0"/>
-          </a:p>
-        </p:txBody>
-      </p:sp>
-    </p:spTree>
-    <p:extLst>
-      <p:ext uri="{BB962C8B-B14F-4D97-AF65-F5344CB8AC3E}">
-        <p14:creationId xmlns:p14="http://schemas.microsoft.com/office/powerpoint/2010/main" val="4030202453"/>
-      </p:ext>
-    </p:extLst>
-  </p:cSld>
-  <p:clrMapOvr>
-    <a:masterClrMapping/>
-  </p:clrMapOvr>
-</p:sld>
-</file>
-
 <file path=ppt/slides/slide8.xml><?xml version="1.0" encoding="utf-8"?>
 <p:sld xmlns:a="http://schemas.openxmlformats.org/drawingml/2006/main" xmlns:r="http://schemas.openxmlformats.org/officeDocument/2006/relationships" xmlns:p="http://schemas.openxmlformats.org/presentationml/2006/main">
   <p:cSld>
@@ -9980,7 +10446,7 @@
           <p:cNvPr id="2" name="Title 1">
             <a:extLst>
               <a:ext uri="{FF2B5EF4-FFF2-40B4-BE49-F238E27FC236}">
-                <a16:creationId xmlns:a16="http://schemas.microsoft.com/office/drawing/2014/main" id="{B6FD9CEF-C4EB-4584-B49F-A02E873D6779}"/>
+                <a16:creationId xmlns:a16="http://schemas.microsoft.com/office/drawing/2014/main" id="{2A6C51B4-F8AB-4319-8469-886E389188DE}"/>
               </a:ext>
             </a:extLst>
           </p:cNvPr>
@@ -9998,7 +10464,7 @@
           <a:p>
             <a:r>
               <a:rPr lang="en-GB" dirty="0"/>
-              <a:t>First mechanic: shooting/launching</a:t>
+              <a:t>What does the player do?</a:t>
             </a:r>
           </a:p>
         </p:txBody>
@@ -10008,7 +10474,7 @@
           <p:cNvPr id="3" name="Content Placeholder 2">
             <a:extLst>
               <a:ext uri="{FF2B5EF4-FFF2-40B4-BE49-F238E27FC236}">
-                <a16:creationId xmlns:a16="http://schemas.microsoft.com/office/drawing/2014/main" id="{631A7050-10F3-4ED1-991E-B2AA17989DB6}"/>
+                <a16:creationId xmlns:a16="http://schemas.microsoft.com/office/drawing/2014/main" id="{F592138A-5065-4B76-9944-5BE34C8C0BA5}"/>
               </a:ext>
             </a:extLst>
           </p:cNvPr>
@@ -10021,30 +10487,38 @@
         </p:nvSpPr>
         <p:spPr/>
         <p:txBody>
-          <a:bodyPr/>
+          <a:bodyPr>
+            <a:normAutofit/>
+          </a:bodyPr>
           <a:lstStyle/>
           <a:p>
             <a:r>
               <a:rPr lang="en-GB" dirty="0"/>
-              <a:t>The player will tap to set the position of the launcher</a:t>
+              <a:t>Players will take turns in firing projectiles at each other.</a:t>
             </a:r>
           </a:p>
           <a:p>
             <a:r>
               <a:rPr lang="en-GB" dirty="0"/>
-              <a:t>The player will tap again to set the power of the shot</a:t>
+              <a:t>The angle of the launcher will be changing until the player taps, at this point it will lock into place. </a:t>
             </a:r>
           </a:p>
           <a:p>
             <a:r>
               <a:rPr lang="en-GB" dirty="0"/>
-              <a:t>The shot will lock in and then the other player will have their go</a:t>
+              <a:t>The shot power will be changing until the player taps.</a:t>
             </a:r>
           </a:p>
           <a:p>
             <a:r>
               <a:rPr lang="en-GB" dirty="0"/>
-              <a:t>When both players have aimed and set the power, both shots will go at the same time.</a:t>
+              <a:t>When both players have selected their shot angle and power the projectiles will fire.</a:t>
+            </a:r>
+          </a:p>
+          <a:p>
+            <a:r>
+              <a:rPr lang="en-GB" dirty="0"/>
+              <a:t>The end goal will be for one player to get the other persons health to zero. </a:t>
             </a:r>
           </a:p>
         </p:txBody>
@@ -10052,7 +10526,7 @@
     </p:spTree>
     <p:extLst>
       <p:ext uri="{BB962C8B-B14F-4D97-AF65-F5344CB8AC3E}">
-        <p14:creationId xmlns:p14="http://schemas.microsoft.com/office/powerpoint/2010/main" val="345086452"/>
+        <p14:creationId xmlns:p14="http://schemas.microsoft.com/office/powerpoint/2010/main" val="2234175574"/>
       </p:ext>
     </p:extLst>
   </p:cSld>
@@ -10084,7 +10558,7 @@
           <p:cNvPr id="2" name="Title 1">
             <a:extLst>
               <a:ext uri="{FF2B5EF4-FFF2-40B4-BE49-F238E27FC236}">
-                <a16:creationId xmlns:a16="http://schemas.microsoft.com/office/drawing/2014/main" id="{35615569-7527-4024-836A-239B8A2E3958}"/>
+                <a16:creationId xmlns:a16="http://schemas.microsoft.com/office/drawing/2014/main" id="{28E2D705-D5C3-4C74-A24E-2CAFC9876DB2}"/>
               </a:ext>
             </a:extLst>
           </p:cNvPr>
@@ -10102,49 +10576,47 @@
           <a:p>
             <a:r>
               <a:rPr lang="en-GB" dirty="0"/>
-              <a:t>Second mechanic: Wind</a:t>
-            </a:r>
-          </a:p>
-        </p:txBody>
-      </p:sp>
-      <p:sp>
-        <p:nvSpPr>
-          <p:cNvPr id="3" name="Content Placeholder 2">
+              <a:t>Screen mock-up</a:t>
+            </a:r>
+          </a:p>
+        </p:txBody>
+      </p:sp>
+      <p:pic>
+        <p:nvPicPr>
+          <p:cNvPr id="4" name="Content Placeholder 3">
             <a:extLst>
               <a:ext uri="{FF2B5EF4-FFF2-40B4-BE49-F238E27FC236}">
-                <a16:creationId xmlns:a16="http://schemas.microsoft.com/office/drawing/2014/main" id="{99B53FEC-9E9A-4924-B6E3-24FF878B896D}"/>
+                <a16:creationId xmlns:a16="http://schemas.microsoft.com/office/drawing/2014/main" id="{78EDFCD9-ADF2-454E-9282-4233E59417F0}"/>
               </a:ext>
             </a:extLst>
           </p:cNvPr>
-          <p:cNvSpPr>
-            <a:spLocks noGrp="1"/>
-          </p:cNvSpPr>
+          <p:cNvPicPr>
+            <a:picLocks noGrp="1" noChangeAspect="1"/>
+          </p:cNvPicPr>
           <p:nvPr>
             <p:ph idx="1"/>
           </p:nvPr>
-        </p:nvSpPr>
-        <p:spPr/>
-        <p:txBody>
-          <a:bodyPr/>
-          <a:lstStyle/>
-          <a:p>
-            <a:r>
-              <a:rPr lang="en-GB" dirty="0"/>
-              <a:t>There will be a force (wind) that effects the projectile when it is launched.</a:t>
-            </a:r>
-          </a:p>
-          <a:p>
-            <a:r>
-              <a:rPr lang="en-GB" dirty="0"/>
-              <a:t>This will be the same force for each player</a:t>
-            </a:r>
-          </a:p>
-        </p:txBody>
-      </p:sp>
+        </p:nvPicPr>
+        <p:blipFill>
+          <a:blip r:embed="rId2"/>
+          <a:stretch>
+            <a:fillRect/>
+          </a:stretch>
+        </p:blipFill>
+        <p:spPr>
+          <a:xfrm>
+            <a:off x="2379008" y="2081213"/>
+            <a:ext cx="7433984" cy="4195762"/>
+          </a:xfrm>
+          <a:prstGeom prst="rect">
+            <a:avLst/>
+          </a:prstGeom>
+        </p:spPr>
+      </p:pic>
     </p:spTree>
     <p:extLst>
       <p:ext uri="{BB962C8B-B14F-4D97-AF65-F5344CB8AC3E}">
-        <p14:creationId xmlns:p14="http://schemas.microsoft.com/office/powerpoint/2010/main" val="3873638211"/>
+        <p14:creationId xmlns:p14="http://schemas.microsoft.com/office/powerpoint/2010/main" val="4030202453"/>
       </p:ext>
     </p:extLst>
   </p:cSld>

</xml_diff>

<commit_message>
Added final slides to the power point
</commit_message>
<xml_diff>
--- a/Presentations/Week 2 Pitch.pptx
+++ b/Presentations/Week 2 Pitch.pptx
@@ -5,7 +5,7 @@
     <p:sldMasterId id="2147483783" r:id="rId1"/>
   </p:sldMasterIdLst>
   <p:notesMasterIdLst>
-    <p:notesMasterId r:id="rId21"/>
+    <p:notesMasterId r:id="rId22"/>
   </p:notesMasterIdLst>
   <p:sldIdLst>
     <p:sldId id="256" r:id="rId2"/>
@@ -13,20 +13,21 @@
     <p:sldId id="258" r:id="rId4"/>
     <p:sldId id="269" r:id="rId5"/>
     <p:sldId id="270" r:id="rId6"/>
-    <p:sldId id="259" r:id="rId7"/>
-    <p:sldId id="260" r:id="rId8"/>
-    <p:sldId id="261" r:id="rId9"/>
-    <p:sldId id="257" r:id="rId10"/>
-    <p:sldId id="271" r:id="rId11"/>
-    <p:sldId id="272" r:id="rId12"/>
-    <p:sldId id="273" r:id="rId13"/>
-    <p:sldId id="262" r:id="rId14"/>
-    <p:sldId id="263" r:id="rId15"/>
-    <p:sldId id="264" r:id="rId16"/>
-    <p:sldId id="265" r:id="rId17"/>
-    <p:sldId id="266" r:id="rId18"/>
-    <p:sldId id="267" r:id="rId19"/>
-    <p:sldId id="268" r:id="rId20"/>
+    <p:sldId id="275" r:id="rId7"/>
+    <p:sldId id="259" r:id="rId8"/>
+    <p:sldId id="260" r:id="rId9"/>
+    <p:sldId id="261" r:id="rId10"/>
+    <p:sldId id="257" r:id="rId11"/>
+    <p:sldId id="271" r:id="rId12"/>
+    <p:sldId id="272" r:id="rId13"/>
+    <p:sldId id="273" r:id="rId14"/>
+    <p:sldId id="262" r:id="rId15"/>
+    <p:sldId id="263" r:id="rId16"/>
+    <p:sldId id="264" r:id="rId17"/>
+    <p:sldId id="265" r:id="rId18"/>
+    <p:sldId id="266" r:id="rId19"/>
+    <p:sldId id="267" r:id="rId20"/>
+    <p:sldId id="268" r:id="rId21"/>
   </p:sldIdLst>
   <p:sldSz cx="12192000" cy="6858000"/>
   <p:notesSz cx="6858000" cy="9144000"/>
@@ -215,7 +216,7 @@
           <a:p>
             <a:fld id="{77C6FF30-EFD7-4437-901C-DE7AE577CC7B}" type="datetimeFigureOut">
               <a:rPr lang="en-GB" smtClean="0"/>
-              <a:t>06/02/2018</a:t>
+              <a:t>07/02/2018</a:t>
             </a:fld>
             <a:endParaRPr lang="en-GB"/>
           </a:p>
@@ -527,7 +528,10 @@
           <a:bodyPr/>
           <a:lstStyle/>
           <a:p>
-            <a:endParaRPr lang="en-GB" dirty="0"/>
+            <a:r>
+              <a:rPr lang="en-GB" dirty="0"/>
+              <a:t>https://play.google.com/store/apps/details?id=com.shareddreams.twelveminibattles&amp;hl=en</a:t>
+            </a:r>
           </a:p>
         </p:txBody>
       </p:sp>
@@ -548,7 +552,7 @@
           <a:p>
             <a:fld id="{0FA91835-90FF-41E4-AF94-16E4E0C00F06}" type="slidenum">
               <a:rPr lang="en-GB" smtClean="0"/>
-              <a:t>7</a:t>
+              <a:t>5</a:t>
             </a:fld>
             <a:endParaRPr lang="en-GB"/>
           </a:p>
@@ -557,7 +561,7 @@
     </p:spTree>
     <p:extLst>
       <p:ext uri="{BB962C8B-B14F-4D97-AF65-F5344CB8AC3E}">
-        <p14:creationId xmlns:p14="http://schemas.microsoft.com/office/powerpoint/2010/main" val="272035921"/>
+        <p14:creationId xmlns:p14="http://schemas.microsoft.com/office/powerpoint/2010/main" val="3054193152"/>
       </p:ext>
     </p:extLst>
   </p:cSld>
@@ -613,7 +617,7 @@
           <a:p>
             <a:r>
               <a:rPr lang="en-GB" dirty="0"/>
-              <a:t>On some turns there will be wind that can affect the projectile. to make sure that this is fair for each player, the same force will be applied for both shots.</a:t>
+              <a:t>https://play.google.com/store/apps/details?id=com.shareddreams.twelveminibattles&amp;hl=en</a:t>
             </a:r>
           </a:p>
         </p:txBody>
@@ -635,7 +639,7 @@
           <a:p>
             <a:fld id="{0FA91835-90FF-41E4-AF94-16E4E0C00F06}" type="slidenum">
               <a:rPr lang="en-GB" smtClean="0"/>
-              <a:t>14</a:t>
+              <a:t>6</a:t>
             </a:fld>
             <a:endParaRPr lang="en-GB"/>
           </a:p>
@@ -644,7 +648,7 @@
     </p:spTree>
     <p:extLst>
       <p:ext uri="{BB962C8B-B14F-4D97-AF65-F5344CB8AC3E}">
-        <p14:creationId xmlns:p14="http://schemas.microsoft.com/office/powerpoint/2010/main" val="280356946"/>
+        <p14:creationId xmlns:p14="http://schemas.microsoft.com/office/powerpoint/2010/main" val="805180551"/>
       </p:ext>
     </p:extLst>
   </p:cSld>
@@ -698,10 +702,7 @@
           <a:bodyPr/>
           <a:lstStyle/>
           <a:p>
-            <a:r>
-              <a:rPr lang="en-GB" dirty="0"/>
-              <a:t>The same force will be applied to each of the players turns to keep things symmetrical </a:t>
-            </a:r>
+            <a:endParaRPr lang="en-GB" dirty="0"/>
           </a:p>
         </p:txBody>
       </p:sp>
@@ -722,7 +723,7 @@
           <a:p>
             <a:fld id="{0FA91835-90FF-41E4-AF94-16E4E0C00F06}" type="slidenum">
               <a:rPr lang="en-GB" smtClean="0"/>
-              <a:t>15</a:t>
+              <a:t>8</a:t>
             </a:fld>
             <a:endParaRPr lang="en-GB"/>
           </a:p>
@@ -731,7 +732,7 @@
     </p:spTree>
     <p:extLst>
       <p:ext uri="{BB962C8B-B14F-4D97-AF65-F5344CB8AC3E}">
-        <p14:creationId xmlns:p14="http://schemas.microsoft.com/office/powerpoint/2010/main" val="1484155728"/>
+        <p14:creationId xmlns:p14="http://schemas.microsoft.com/office/powerpoint/2010/main" val="272035921"/>
       </p:ext>
     </p:extLst>
   </p:cSld>
@@ -785,6 +786,180 @@
           <a:bodyPr/>
           <a:lstStyle/>
           <a:p>
+            <a:r>
+              <a:rPr lang="en-GB" dirty="0"/>
+              <a:t>On some turns there will be wind that can affect the projectile. to make sure that this is fair for each player, the same force will be applied for both shots.</a:t>
+            </a:r>
+          </a:p>
+        </p:txBody>
+      </p:sp>
+      <p:sp>
+        <p:nvSpPr>
+          <p:cNvPr id="4" name="Slide Number Placeholder 3"/>
+          <p:cNvSpPr>
+            <a:spLocks noGrp="1"/>
+          </p:cNvSpPr>
+          <p:nvPr>
+            <p:ph type="sldNum" sz="quarter" idx="10"/>
+          </p:nvPr>
+        </p:nvSpPr>
+        <p:spPr/>
+        <p:txBody>
+          <a:bodyPr/>
+          <a:lstStyle/>
+          <a:p>
+            <a:fld id="{0FA91835-90FF-41E4-AF94-16E4E0C00F06}" type="slidenum">
+              <a:rPr lang="en-GB" smtClean="0"/>
+              <a:t>15</a:t>
+            </a:fld>
+            <a:endParaRPr lang="en-GB"/>
+          </a:p>
+        </p:txBody>
+      </p:sp>
+    </p:spTree>
+    <p:extLst>
+      <p:ext uri="{BB962C8B-B14F-4D97-AF65-F5344CB8AC3E}">
+        <p14:creationId xmlns:p14="http://schemas.microsoft.com/office/powerpoint/2010/main" val="280356946"/>
+      </p:ext>
+    </p:extLst>
+  </p:cSld>
+  <p:clrMapOvr>
+    <a:masterClrMapping/>
+  </p:clrMapOvr>
+</p:notes>
+</file>
+
+<file path=ppt/notesSlides/notesSlide5.xml><?xml version="1.0" encoding="utf-8"?>
+<p:notes xmlns:a="http://schemas.openxmlformats.org/drawingml/2006/main" xmlns:r="http://schemas.openxmlformats.org/officeDocument/2006/relationships" xmlns:p="http://schemas.openxmlformats.org/presentationml/2006/main">
+  <p:cSld>
+    <p:spTree>
+      <p:nvGrpSpPr>
+        <p:cNvPr id="1" name=""/>
+        <p:cNvGrpSpPr/>
+        <p:nvPr/>
+      </p:nvGrpSpPr>
+      <p:grpSpPr>
+        <a:xfrm>
+          <a:off x="0" y="0"/>
+          <a:ext cx="0" cy="0"/>
+          <a:chOff x="0" y="0"/>
+          <a:chExt cx="0" cy="0"/>
+        </a:xfrm>
+      </p:grpSpPr>
+      <p:sp>
+        <p:nvSpPr>
+          <p:cNvPr id="2" name="Slide Image Placeholder 1"/>
+          <p:cNvSpPr>
+            <a:spLocks noGrp="1" noRot="1" noChangeAspect="1"/>
+          </p:cNvSpPr>
+          <p:nvPr>
+            <p:ph type="sldImg"/>
+          </p:nvPr>
+        </p:nvSpPr>
+        <p:spPr/>
+      </p:sp>
+      <p:sp>
+        <p:nvSpPr>
+          <p:cNvPr id="3" name="Notes Placeholder 2"/>
+          <p:cNvSpPr>
+            <a:spLocks noGrp="1"/>
+          </p:cNvSpPr>
+          <p:nvPr>
+            <p:ph type="body" idx="1"/>
+          </p:nvPr>
+        </p:nvSpPr>
+        <p:spPr/>
+        <p:txBody>
+          <a:bodyPr/>
+          <a:lstStyle/>
+          <a:p>
+            <a:r>
+              <a:rPr lang="en-GB" dirty="0"/>
+              <a:t>The same force will be applied to each of the players turns to keep things symmetrical </a:t>
+            </a:r>
+          </a:p>
+        </p:txBody>
+      </p:sp>
+      <p:sp>
+        <p:nvSpPr>
+          <p:cNvPr id="4" name="Slide Number Placeholder 3"/>
+          <p:cNvSpPr>
+            <a:spLocks noGrp="1"/>
+          </p:cNvSpPr>
+          <p:nvPr>
+            <p:ph type="sldNum" sz="quarter" idx="10"/>
+          </p:nvPr>
+        </p:nvSpPr>
+        <p:spPr/>
+        <p:txBody>
+          <a:bodyPr/>
+          <a:lstStyle/>
+          <a:p>
+            <a:fld id="{0FA91835-90FF-41E4-AF94-16E4E0C00F06}" type="slidenum">
+              <a:rPr lang="en-GB" smtClean="0"/>
+              <a:t>16</a:t>
+            </a:fld>
+            <a:endParaRPr lang="en-GB"/>
+          </a:p>
+        </p:txBody>
+      </p:sp>
+    </p:spTree>
+    <p:extLst>
+      <p:ext uri="{BB962C8B-B14F-4D97-AF65-F5344CB8AC3E}">
+        <p14:creationId xmlns:p14="http://schemas.microsoft.com/office/powerpoint/2010/main" val="1484155728"/>
+      </p:ext>
+    </p:extLst>
+  </p:cSld>
+  <p:clrMapOvr>
+    <a:masterClrMapping/>
+  </p:clrMapOvr>
+</p:notes>
+</file>
+
+<file path=ppt/notesSlides/notesSlide6.xml><?xml version="1.0" encoding="utf-8"?>
+<p:notes xmlns:a="http://schemas.openxmlformats.org/drawingml/2006/main" xmlns:r="http://schemas.openxmlformats.org/officeDocument/2006/relationships" xmlns:p="http://schemas.openxmlformats.org/presentationml/2006/main">
+  <p:cSld>
+    <p:spTree>
+      <p:nvGrpSpPr>
+        <p:cNvPr id="1" name=""/>
+        <p:cNvGrpSpPr/>
+        <p:nvPr/>
+      </p:nvGrpSpPr>
+      <p:grpSpPr>
+        <a:xfrm>
+          <a:off x="0" y="0"/>
+          <a:ext cx="0" cy="0"/>
+          <a:chOff x="0" y="0"/>
+          <a:chExt cx="0" cy="0"/>
+        </a:xfrm>
+      </p:grpSpPr>
+      <p:sp>
+        <p:nvSpPr>
+          <p:cNvPr id="2" name="Slide Image Placeholder 1"/>
+          <p:cNvSpPr>
+            <a:spLocks noGrp="1" noRot="1" noChangeAspect="1"/>
+          </p:cNvSpPr>
+          <p:nvPr>
+            <p:ph type="sldImg"/>
+          </p:nvPr>
+        </p:nvSpPr>
+        <p:spPr/>
+      </p:sp>
+      <p:sp>
+        <p:nvSpPr>
+          <p:cNvPr id="3" name="Notes Placeholder 2"/>
+          <p:cNvSpPr>
+            <a:spLocks noGrp="1"/>
+          </p:cNvSpPr>
+          <p:nvPr>
+            <p:ph type="body" idx="1"/>
+          </p:nvPr>
+        </p:nvSpPr>
+        <p:spPr/>
+        <p:txBody>
+          <a:bodyPr/>
+          <a:lstStyle/>
+          <a:p>
             <a:pPr marL="0" marR="0" lvl="0" indent="0" algn="l" defTabSz="914400" rtl="0" eaLnBrk="1" fontAlgn="auto" latinLnBrk="0" hangingPunct="1">
               <a:lnSpc>
                 <a:spcPct val="100000"/>
@@ -829,7 +1004,7 @@
           <a:p>
             <a:fld id="{0FA91835-90FF-41E4-AF94-16E4E0C00F06}" type="slidenum">
               <a:rPr lang="en-GB" smtClean="0"/>
-              <a:t>16</a:t>
+              <a:t>17</a:t>
             </a:fld>
             <a:endParaRPr lang="en-GB"/>
           </a:p>
@@ -1034,7 +1209,7 @@
           <a:p>
             <a:fld id="{F9B79F2D-3A05-4848-97F8-7B346024FD0C}" type="datetimeFigureOut">
               <a:rPr lang="en-GB" smtClean="0"/>
-              <a:t>06/02/2018</a:t>
+              <a:t>07/02/2018</a:t>
             </a:fld>
             <a:endParaRPr lang="en-GB"/>
           </a:p>
@@ -1309,7 +1484,7 @@
           <a:p>
             <a:fld id="{F9B79F2D-3A05-4848-97F8-7B346024FD0C}" type="datetimeFigureOut">
               <a:rPr lang="en-GB" smtClean="0"/>
-              <a:t>06/02/2018</a:t>
+              <a:t>07/02/2018</a:t>
             </a:fld>
             <a:endParaRPr lang="en-GB"/>
           </a:p>
@@ -1503,7 +1678,7 @@
           <a:p>
             <a:fld id="{F9B79F2D-3A05-4848-97F8-7B346024FD0C}" type="datetimeFigureOut">
               <a:rPr lang="en-GB" smtClean="0"/>
-              <a:t>06/02/2018</a:t>
+              <a:t>07/02/2018</a:t>
             </a:fld>
             <a:endParaRPr lang="en-GB"/>
           </a:p>
@@ -1776,7 +1951,7 @@
           <a:p>
             <a:fld id="{F9B79F2D-3A05-4848-97F8-7B346024FD0C}" type="datetimeFigureOut">
               <a:rPr lang="en-GB" smtClean="0"/>
-              <a:t>06/02/2018</a:t>
+              <a:t>07/02/2018</a:t>
             </a:fld>
             <a:endParaRPr lang="en-GB"/>
           </a:p>
@@ -2117,7 +2292,7 @@
           <a:p>
             <a:fld id="{F9B79F2D-3A05-4848-97F8-7B346024FD0C}" type="datetimeFigureOut">
               <a:rPr lang="en-GB" smtClean="0"/>
-              <a:t>06/02/2018</a:t>
+              <a:t>07/02/2018</a:t>
             </a:fld>
             <a:endParaRPr lang="en-GB"/>
           </a:p>
@@ -2740,7 +2915,7 @@
           <a:p>
             <a:fld id="{F9B79F2D-3A05-4848-97F8-7B346024FD0C}" type="datetimeFigureOut">
               <a:rPr lang="en-GB" smtClean="0"/>
-              <a:t>06/02/2018</a:t>
+              <a:t>07/02/2018</a:t>
             </a:fld>
             <a:endParaRPr lang="en-GB"/>
           </a:p>
@@ -3600,7 +3775,7 @@
           <a:p>
             <a:fld id="{F9B79F2D-3A05-4848-97F8-7B346024FD0C}" type="datetimeFigureOut">
               <a:rPr lang="en-GB" smtClean="0"/>
-              <a:t>06/02/2018</a:t>
+              <a:t>07/02/2018</a:t>
             </a:fld>
             <a:endParaRPr lang="en-GB"/>
           </a:p>
@@ -3770,7 +3945,7 @@
           <a:p>
             <a:fld id="{F9B79F2D-3A05-4848-97F8-7B346024FD0C}" type="datetimeFigureOut">
               <a:rPr lang="en-GB" smtClean="0"/>
-              <a:t>06/02/2018</a:t>
+              <a:t>07/02/2018</a:t>
             </a:fld>
             <a:endParaRPr lang="en-GB"/>
           </a:p>
@@ -3950,7 +4125,7 @@
           <a:p>
             <a:fld id="{F9B79F2D-3A05-4848-97F8-7B346024FD0C}" type="datetimeFigureOut">
               <a:rPr lang="en-GB" smtClean="0"/>
-              <a:t>06/02/2018</a:t>
+              <a:t>07/02/2018</a:t>
             </a:fld>
             <a:endParaRPr lang="en-GB"/>
           </a:p>
@@ -4120,7 +4295,7 @@
           <a:p>
             <a:fld id="{F9B79F2D-3A05-4848-97F8-7B346024FD0C}" type="datetimeFigureOut">
               <a:rPr lang="en-GB" smtClean="0"/>
-              <a:t>06/02/2018</a:t>
+              <a:t>07/02/2018</a:t>
             </a:fld>
             <a:endParaRPr lang="en-GB"/>
           </a:p>
@@ -4367,7 +4542,7 @@
           <a:p>
             <a:fld id="{F9B79F2D-3A05-4848-97F8-7B346024FD0C}" type="datetimeFigureOut">
               <a:rPr lang="en-GB" smtClean="0"/>
-              <a:t>06/02/2018</a:t>
+              <a:t>07/02/2018</a:t>
             </a:fld>
             <a:endParaRPr lang="en-GB"/>
           </a:p>
@@ -4659,7 +4834,7 @@
           <a:p>
             <a:fld id="{F9B79F2D-3A05-4848-97F8-7B346024FD0C}" type="datetimeFigureOut">
               <a:rPr lang="en-GB" smtClean="0"/>
-              <a:t>06/02/2018</a:t>
+              <a:t>07/02/2018</a:t>
             </a:fld>
             <a:endParaRPr lang="en-GB"/>
           </a:p>
@@ -5103,7 +5278,7 @@
           <a:p>
             <a:fld id="{F9B79F2D-3A05-4848-97F8-7B346024FD0C}" type="datetimeFigureOut">
               <a:rPr lang="en-GB" smtClean="0"/>
-              <a:t>06/02/2018</a:t>
+              <a:t>07/02/2018</a:t>
             </a:fld>
             <a:endParaRPr lang="en-GB"/>
           </a:p>
@@ -5221,7 +5396,7 @@
           <a:p>
             <a:fld id="{F9B79F2D-3A05-4848-97F8-7B346024FD0C}" type="datetimeFigureOut">
               <a:rPr lang="en-GB" smtClean="0"/>
-              <a:t>06/02/2018</a:t>
+              <a:t>07/02/2018</a:t>
             </a:fld>
             <a:endParaRPr lang="en-GB"/>
           </a:p>
@@ -5316,7 +5491,7 @@
           <a:p>
             <a:fld id="{F9B79F2D-3A05-4848-97F8-7B346024FD0C}" type="datetimeFigureOut">
               <a:rPr lang="en-GB" smtClean="0"/>
-              <a:t>06/02/2018</a:t>
+              <a:t>07/02/2018</a:t>
             </a:fld>
             <a:endParaRPr lang="en-GB"/>
           </a:p>
@@ -5595,7 +5770,7 @@
           <a:p>
             <a:fld id="{F9B79F2D-3A05-4848-97F8-7B346024FD0C}" type="datetimeFigureOut">
               <a:rPr lang="en-GB" smtClean="0"/>
-              <a:t>06/02/2018</a:t>
+              <a:t>07/02/2018</a:t>
             </a:fld>
             <a:endParaRPr lang="en-GB"/>
           </a:p>
@@ -5870,7 +6045,7 @@
           <a:p>
             <a:fld id="{F9B79F2D-3A05-4848-97F8-7B346024FD0C}" type="datetimeFigureOut">
               <a:rPr lang="en-GB" smtClean="0"/>
-              <a:t>06/02/2018</a:t>
+              <a:t>07/02/2018</a:t>
             </a:fld>
             <a:endParaRPr lang="en-GB"/>
           </a:p>
@@ -6299,7 +6474,7 @@
           <a:p>
             <a:fld id="{F9B79F2D-3A05-4848-97F8-7B346024FD0C}" type="datetimeFigureOut">
               <a:rPr lang="en-GB" smtClean="0"/>
-              <a:t>06/02/2018</a:t>
+              <a:t>07/02/2018</a:t>
             </a:fld>
             <a:endParaRPr lang="en-GB"/>
           </a:p>
@@ -7884,6 +8059,96 @@
           <p:cNvPr id="2" name="Title 1">
             <a:extLst>
               <a:ext uri="{FF2B5EF4-FFF2-40B4-BE49-F238E27FC236}">
+                <a16:creationId xmlns:a16="http://schemas.microsoft.com/office/drawing/2014/main" id="{28E2D705-D5C3-4C74-A24E-2CAFC9876DB2}"/>
+              </a:ext>
+            </a:extLst>
+          </p:cNvPr>
+          <p:cNvSpPr>
+            <a:spLocks noGrp="1"/>
+          </p:cNvSpPr>
+          <p:nvPr>
+            <p:ph type="title"/>
+          </p:nvPr>
+        </p:nvSpPr>
+        <p:spPr/>
+        <p:txBody>
+          <a:bodyPr/>
+          <a:lstStyle/>
+          <a:p>
+            <a:r>
+              <a:rPr lang="en-GB" dirty="0"/>
+              <a:t>Screen mock-up</a:t>
+            </a:r>
+          </a:p>
+        </p:txBody>
+      </p:sp>
+      <p:pic>
+        <p:nvPicPr>
+          <p:cNvPr id="4" name="Content Placeholder 3">
+            <a:extLst>
+              <a:ext uri="{FF2B5EF4-FFF2-40B4-BE49-F238E27FC236}">
+                <a16:creationId xmlns:a16="http://schemas.microsoft.com/office/drawing/2014/main" id="{78EDFCD9-ADF2-454E-9282-4233E59417F0}"/>
+              </a:ext>
+            </a:extLst>
+          </p:cNvPr>
+          <p:cNvPicPr>
+            <a:picLocks noGrp="1" noChangeAspect="1"/>
+          </p:cNvPicPr>
+          <p:nvPr>
+            <p:ph idx="1"/>
+          </p:nvPr>
+        </p:nvPicPr>
+        <p:blipFill>
+          <a:blip r:embed="rId2"/>
+          <a:stretch>
+            <a:fillRect/>
+          </a:stretch>
+        </p:blipFill>
+        <p:spPr>
+          <a:xfrm>
+            <a:off x="2379008" y="2081213"/>
+            <a:ext cx="7433984" cy="4195762"/>
+          </a:xfrm>
+          <a:prstGeom prst="rect">
+            <a:avLst/>
+          </a:prstGeom>
+        </p:spPr>
+      </p:pic>
+    </p:spTree>
+    <p:extLst>
+      <p:ext uri="{BB962C8B-B14F-4D97-AF65-F5344CB8AC3E}">
+        <p14:creationId xmlns:p14="http://schemas.microsoft.com/office/powerpoint/2010/main" val="4030202453"/>
+      </p:ext>
+    </p:extLst>
+  </p:cSld>
+  <p:clrMapOvr>
+    <a:masterClrMapping/>
+  </p:clrMapOvr>
+</p:sld>
+</file>
+
+<file path=ppt/slides/slide11.xml><?xml version="1.0" encoding="utf-8"?>
+<p:sld xmlns:a="http://schemas.openxmlformats.org/drawingml/2006/main" xmlns:r="http://schemas.openxmlformats.org/officeDocument/2006/relationships" xmlns:p="http://schemas.openxmlformats.org/presentationml/2006/main">
+  <p:cSld>
+    <p:spTree>
+      <p:nvGrpSpPr>
+        <p:cNvPr id="1" name=""/>
+        <p:cNvGrpSpPr/>
+        <p:nvPr/>
+      </p:nvGrpSpPr>
+      <p:grpSpPr>
+        <a:xfrm>
+          <a:off x="0" y="0"/>
+          <a:ext cx="0" cy="0"/>
+          <a:chOff x="0" y="0"/>
+          <a:chExt cx="0" cy="0"/>
+        </a:xfrm>
+      </p:grpSpPr>
+      <p:sp>
+        <p:nvSpPr>
+          <p:cNvPr id="2" name="Title 1">
+            <a:extLst>
+              <a:ext uri="{FF2B5EF4-FFF2-40B4-BE49-F238E27FC236}">
                 <a16:creationId xmlns:a16="http://schemas.microsoft.com/office/drawing/2014/main" id="{9EEAEEC4-2374-4C17-B795-21101D3DCD5C}"/>
               </a:ext>
             </a:extLst>
@@ -7952,7 +8217,7 @@
 </p:sld>
 </file>
 
-<file path=ppt/slides/slide11.xml><?xml version="1.0" encoding="utf-8"?>
+<file path=ppt/slides/slide12.xml><?xml version="1.0" encoding="utf-8"?>
 <p:sld xmlns:a="http://schemas.openxmlformats.org/drawingml/2006/main" xmlns:r="http://schemas.openxmlformats.org/officeDocument/2006/relationships" xmlns:p="http://schemas.openxmlformats.org/presentationml/2006/main">
   <p:cSld>
     <p:spTree>
@@ -8042,7 +8307,7 @@
 </p:sld>
 </file>
 
-<file path=ppt/slides/slide12.xml><?xml version="1.0" encoding="utf-8"?>
+<file path=ppt/slides/slide13.xml><?xml version="1.0" encoding="utf-8"?>
 <p:sld xmlns:a="http://schemas.openxmlformats.org/drawingml/2006/main" xmlns:r="http://schemas.openxmlformats.org/officeDocument/2006/relationships" xmlns:p="http://schemas.openxmlformats.org/presentationml/2006/main">
   <p:cSld>
     <p:spTree>
@@ -8132,110 +8397,6 @@
 </p:sld>
 </file>
 
-<file path=ppt/slides/slide13.xml><?xml version="1.0" encoding="utf-8"?>
-<p:sld xmlns:a="http://schemas.openxmlformats.org/drawingml/2006/main" xmlns:r="http://schemas.openxmlformats.org/officeDocument/2006/relationships" xmlns:p="http://schemas.openxmlformats.org/presentationml/2006/main">
-  <p:cSld>
-    <p:spTree>
-      <p:nvGrpSpPr>
-        <p:cNvPr id="1" name=""/>
-        <p:cNvGrpSpPr/>
-        <p:nvPr/>
-      </p:nvGrpSpPr>
-      <p:grpSpPr>
-        <a:xfrm>
-          <a:off x="0" y="0"/>
-          <a:ext cx="0" cy="0"/>
-          <a:chOff x="0" y="0"/>
-          <a:chExt cx="0" cy="0"/>
-        </a:xfrm>
-      </p:grpSpPr>
-      <p:sp>
-        <p:nvSpPr>
-          <p:cNvPr id="2" name="Title 1">
-            <a:extLst>
-              <a:ext uri="{FF2B5EF4-FFF2-40B4-BE49-F238E27FC236}">
-                <a16:creationId xmlns:a16="http://schemas.microsoft.com/office/drawing/2014/main" id="{B6FD9CEF-C4EB-4584-B49F-A02E873D6779}"/>
-              </a:ext>
-            </a:extLst>
-          </p:cNvPr>
-          <p:cNvSpPr>
-            <a:spLocks noGrp="1"/>
-          </p:cNvSpPr>
-          <p:nvPr>
-            <p:ph type="title"/>
-          </p:nvPr>
-        </p:nvSpPr>
-        <p:spPr/>
-        <p:txBody>
-          <a:bodyPr/>
-          <a:lstStyle/>
-          <a:p>
-            <a:r>
-              <a:rPr lang="en-GB" dirty="0"/>
-              <a:t>First mechanic: shooting/launching</a:t>
-            </a:r>
-          </a:p>
-        </p:txBody>
-      </p:sp>
-      <p:sp>
-        <p:nvSpPr>
-          <p:cNvPr id="3" name="Content Placeholder 2">
-            <a:extLst>
-              <a:ext uri="{FF2B5EF4-FFF2-40B4-BE49-F238E27FC236}">
-                <a16:creationId xmlns:a16="http://schemas.microsoft.com/office/drawing/2014/main" id="{631A7050-10F3-4ED1-991E-B2AA17989DB6}"/>
-              </a:ext>
-            </a:extLst>
-          </p:cNvPr>
-          <p:cNvSpPr>
-            <a:spLocks noGrp="1"/>
-          </p:cNvSpPr>
-          <p:nvPr>
-            <p:ph idx="1"/>
-          </p:nvPr>
-        </p:nvSpPr>
-        <p:spPr/>
-        <p:txBody>
-          <a:bodyPr/>
-          <a:lstStyle/>
-          <a:p>
-            <a:r>
-              <a:rPr lang="en-GB" dirty="0"/>
-              <a:t>The player will tap to set the position of the launcher</a:t>
-            </a:r>
-          </a:p>
-          <a:p>
-            <a:r>
-              <a:rPr lang="en-GB" dirty="0"/>
-              <a:t>The player will tap again to set the power of the shot</a:t>
-            </a:r>
-          </a:p>
-          <a:p>
-            <a:r>
-              <a:rPr lang="en-GB" dirty="0"/>
-              <a:t>The shot will lock in and then the other player will have their go</a:t>
-            </a:r>
-          </a:p>
-          <a:p>
-            <a:r>
-              <a:rPr lang="en-GB" dirty="0"/>
-              <a:t>When both players have aimed and set the power, both shots will go at the same time.</a:t>
-            </a:r>
-          </a:p>
-        </p:txBody>
-      </p:sp>
-    </p:spTree>
-    <p:extLst>
-      <p:ext uri="{BB962C8B-B14F-4D97-AF65-F5344CB8AC3E}">
-        <p14:creationId xmlns:p14="http://schemas.microsoft.com/office/powerpoint/2010/main" val="345086452"/>
-      </p:ext>
-    </p:extLst>
-  </p:cSld>
-  <p:clrMapOvr>
-    <a:masterClrMapping/>
-  </p:clrMapOvr>
-</p:sld>
-</file>
-
 <file path=ppt/slides/slide14.xml><?xml version="1.0" encoding="utf-8"?>
 <p:sld xmlns:a="http://schemas.openxmlformats.org/drawingml/2006/main" xmlns:r="http://schemas.openxmlformats.org/officeDocument/2006/relationships" xmlns:p="http://schemas.openxmlformats.org/presentationml/2006/main">
   <p:cSld>
@@ -8258,7 +8419,7 @@
           <p:cNvPr id="2" name="Title 1">
             <a:extLst>
               <a:ext uri="{FF2B5EF4-FFF2-40B4-BE49-F238E27FC236}">
-                <a16:creationId xmlns:a16="http://schemas.microsoft.com/office/drawing/2014/main" id="{35615569-7527-4024-836A-239B8A2E3958}"/>
+                <a16:creationId xmlns:a16="http://schemas.microsoft.com/office/drawing/2014/main" id="{B6FD9CEF-C4EB-4584-B49F-A02E873D6779}"/>
               </a:ext>
             </a:extLst>
           </p:cNvPr>
@@ -8276,7 +8437,7 @@
           <a:p>
             <a:r>
               <a:rPr lang="en-GB" dirty="0"/>
-              <a:t>Second mechanic: Wind</a:t>
+              <a:t>First mechanic: shooting/launching</a:t>
             </a:r>
           </a:p>
         </p:txBody>
@@ -8286,7 +8447,7 @@
           <p:cNvPr id="3" name="Content Placeholder 2">
             <a:extLst>
               <a:ext uri="{FF2B5EF4-FFF2-40B4-BE49-F238E27FC236}">
-                <a16:creationId xmlns:a16="http://schemas.microsoft.com/office/drawing/2014/main" id="{99B53FEC-9E9A-4924-B6E3-24FF878B896D}"/>
+                <a16:creationId xmlns:a16="http://schemas.microsoft.com/office/drawing/2014/main" id="{631A7050-10F3-4ED1-991E-B2AA17989DB6}"/>
               </a:ext>
             </a:extLst>
           </p:cNvPr>
@@ -8304,13 +8465,25 @@
           <a:p>
             <a:r>
               <a:rPr lang="en-GB" dirty="0"/>
-              <a:t>There will be a force (wind) that effects the projectile when it is launched.</a:t>
+              <a:t>The player will tap to set the position of the launcher</a:t>
             </a:r>
           </a:p>
           <a:p>
             <a:r>
               <a:rPr lang="en-GB" dirty="0"/>
-              <a:t>This will be the same force for each player</a:t>
+              <a:t>The player will tap again to set the power of the shot</a:t>
+            </a:r>
+          </a:p>
+          <a:p>
+            <a:r>
+              <a:rPr lang="en-GB" dirty="0"/>
+              <a:t>The shot will lock in and then the other player will have their go</a:t>
+            </a:r>
+          </a:p>
+          <a:p>
+            <a:r>
+              <a:rPr lang="en-GB" dirty="0"/>
+              <a:t>When both players have aimed and set the power, both shots will go at the same time.</a:t>
             </a:r>
           </a:p>
         </p:txBody>
@@ -8318,7 +8491,7 @@
     </p:spTree>
     <p:extLst>
       <p:ext uri="{BB962C8B-B14F-4D97-AF65-F5344CB8AC3E}">
-        <p14:creationId xmlns:p14="http://schemas.microsoft.com/office/powerpoint/2010/main" val="3873638211"/>
+        <p14:creationId xmlns:p14="http://schemas.microsoft.com/office/powerpoint/2010/main" val="345086452"/>
       </p:ext>
     </p:extLst>
   </p:cSld>
@@ -8350,7 +8523,7 @@
           <p:cNvPr id="2" name="Title 1">
             <a:extLst>
               <a:ext uri="{FF2B5EF4-FFF2-40B4-BE49-F238E27FC236}">
-                <a16:creationId xmlns:a16="http://schemas.microsoft.com/office/drawing/2014/main" id="{672EBB02-FCB7-449D-9D6A-64ED9C5983DF}"/>
+                <a16:creationId xmlns:a16="http://schemas.microsoft.com/office/drawing/2014/main" id="{35615569-7527-4024-836A-239B8A2E3958}"/>
               </a:ext>
             </a:extLst>
           </p:cNvPr>
@@ -8368,135 +8541,41 @@
           <a:p>
             <a:r>
               <a:rPr lang="en-GB" dirty="0"/>
-              <a:t>To keep things Symmetrical </a:t>
-            </a:r>
-          </a:p>
-        </p:txBody>
-      </p:sp>
-      <p:pic>
-        <p:nvPicPr>
-          <p:cNvPr id="4" name="Content Placeholder 3">
+              <a:t>Second mechanic: Wind</a:t>
+            </a:r>
+          </a:p>
+        </p:txBody>
+      </p:sp>
+      <p:sp>
+        <p:nvSpPr>
+          <p:cNvPr id="3" name="Content Placeholder 2">
             <a:extLst>
               <a:ext uri="{FF2B5EF4-FFF2-40B4-BE49-F238E27FC236}">
-                <a16:creationId xmlns:a16="http://schemas.microsoft.com/office/drawing/2014/main" id="{28892EEA-ED28-49F1-8732-616C7DFC3093}"/>
+                <a16:creationId xmlns:a16="http://schemas.microsoft.com/office/drawing/2014/main" id="{99B53FEC-9E9A-4924-B6E3-24FF878B896D}"/>
               </a:ext>
             </a:extLst>
           </p:cNvPr>
-          <p:cNvPicPr>
-            <a:picLocks noGrp="1" noChangeAspect="1"/>
-          </p:cNvPicPr>
+          <p:cNvSpPr>
+            <a:spLocks noGrp="1"/>
+          </p:cNvSpPr>
           <p:nvPr>
             <p:ph idx="1"/>
           </p:nvPr>
-        </p:nvPicPr>
-        <p:blipFill>
-          <a:blip r:embed="rId3"/>
-          <a:stretch>
-            <a:fillRect/>
-          </a:stretch>
-        </p:blipFill>
-        <p:spPr>
-          <a:xfrm>
-            <a:off x="2802552" y="1792784"/>
-            <a:ext cx="6586895" cy="4195762"/>
-          </a:xfrm>
-          <a:prstGeom prst="rect">
-            <a:avLst/>
-          </a:prstGeom>
-        </p:spPr>
-      </p:pic>
-      <p:sp>
-        <p:nvSpPr>
-          <p:cNvPr id="5" name="Rectangle 4">
-            <a:extLst>
-              <a:ext uri="{FF2B5EF4-FFF2-40B4-BE49-F238E27FC236}">
-                <a16:creationId xmlns:a16="http://schemas.microsoft.com/office/drawing/2014/main" id="{432E7842-52B2-456C-8D0A-BC10CCCEAFDE}"/>
-              </a:ext>
-            </a:extLst>
-          </p:cNvPr>
-          <p:cNvSpPr/>
-          <p:nvPr/>
-        </p:nvSpPr>
-        <p:spPr>
-          <a:xfrm>
-            <a:off x="147853" y="2967335"/>
-            <a:ext cx="2420406" cy="923330"/>
-          </a:xfrm>
-          <a:prstGeom prst="rect">
-            <a:avLst/>
-          </a:prstGeom>
-          <a:noFill/>
-        </p:spPr>
-        <p:txBody>
-          <a:bodyPr wrap="none" lIns="91440" tIns="45720" rIns="91440" bIns="45720">
-            <a:spAutoFit/>
-          </a:bodyPr>
-          <a:lstStyle/>
-          <a:p>
-            <a:pPr algn="ctr"/>
-            <a:r>
-              <a:rPr lang="en-US" sz="5400" b="0" cap="none" spc="0" dirty="0">
-                <a:ln w="0"/>
-                <a:solidFill>
-                  <a:schemeClr val="tx1"/>
-                </a:solidFill>
-                <a:effectLst>
-                  <a:outerShdw blurRad="38100" dist="19050" dir="2700000" algn="tl" rotWithShape="0">
-                    <a:schemeClr val="dk1">
-                      <a:alpha val="40000"/>
-                    </a:schemeClr>
-                  </a:outerShdw>
-                </a:effectLst>
-              </a:rPr>
-              <a:t>Player 1</a:t>
-            </a:r>
-          </a:p>
-        </p:txBody>
-      </p:sp>
-      <p:sp>
-        <p:nvSpPr>
-          <p:cNvPr id="6" name="Rectangle 5">
-            <a:extLst>
-              <a:ext uri="{FF2B5EF4-FFF2-40B4-BE49-F238E27FC236}">
-                <a16:creationId xmlns:a16="http://schemas.microsoft.com/office/drawing/2014/main" id="{BA4DA330-4127-4639-AF23-007D271219CB}"/>
-              </a:ext>
-            </a:extLst>
-          </p:cNvPr>
-          <p:cNvSpPr/>
-          <p:nvPr/>
-        </p:nvSpPr>
-        <p:spPr>
-          <a:xfrm>
-            <a:off x="9598002" y="2872085"/>
-            <a:ext cx="2420406" cy="923330"/>
-          </a:xfrm>
-          <a:prstGeom prst="rect">
-            <a:avLst/>
-          </a:prstGeom>
-          <a:noFill/>
-        </p:spPr>
-        <p:txBody>
-          <a:bodyPr wrap="none" lIns="91440" tIns="45720" rIns="91440" bIns="45720">
-            <a:spAutoFit/>
-          </a:bodyPr>
-          <a:lstStyle/>
-          <a:p>
-            <a:pPr algn="ctr"/>
-            <a:r>
-              <a:rPr lang="en-US" sz="5400" b="0" cap="none" spc="0" dirty="0">
-                <a:ln w="0"/>
-                <a:solidFill>
-                  <a:schemeClr val="tx1"/>
-                </a:solidFill>
-                <a:effectLst>
-                  <a:outerShdw blurRad="38100" dist="19050" dir="2700000" algn="tl" rotWithShape="0">
-                    <a:schemeClr val="dk1">
-                      <a:alpha val="40000"/>
-                    </a:schemeClr>
-                  </a:outerShdw>
-                </a:effectLst>
-              </a:rPr>
-              <a:t>Player 2</a:t>
+        </p:nvSpPr>
+        <p:spPr/>
+        <p:txBody>
+          <a:bodyPr/>
+          <a:lstStyle/>
+          <a:p>
+            <a:r>
+              <a:rPr lang="en-GB" dirty="0"/>
+              <a:t>There will be a force (wind) that effects the projectile when it is launched.</a:t>
+            </a:r>
+          </a:p>
+          <a:p>
+            <a:r>
+              <a:rPr lang="en-GB" dirty="0"/>
+              <a:t>This will be the same force for each player</a:t>
             </a:r>
           </a:p>
         </p:txBody>
@@ -8504,7 +8583,7 @@
     </p:spTree>
     <p:extLst>
       <p:ext uri="{BB962C8B-B14F-4D97-AF65-F5344CB8AC3E}">
-        <p14:creationId xmlns:p14="http://schemas.microsoft.com/office/powerpoint/2010/main" val="1943397596"/>
+        <p14:creationId xmlns:p14="http://schemas.microsoft.com/office/powerpoint/2010/main" val="3873638211"/>
       </p:ext>
     </p:extLst>
   </p:cSld>
@@ -8561,10 +8640,10 @@
       </p:sp>
       <p:pic>
         <p:nvPicPr>
-          <p:cNvPr id="9" name="Content Placeholder 8">
+          <p:cNvPr id="4" name="Content Placeholder 3">
             <a:extLst>
               <a:ext uri="{FF2B5EF4-FFF2-40B4-BE49-F238E27FC236}">
-                <a16:creationId xmlns:a16="http://schemas.microsoft.com/office/drawing/2014/main" id="{45A73B88-1535-4E04-AF47-20EB656284D6}"/>
+                <a16:creationId xmlns:a16="http://schemas.microsoft.com/office/drawing/2014/main" id="{28892EEA-ED28-49F1-8732-616C7DFC3093}"/>
               </a:ext>
             </a:extLst>
           </p:cNvPr>
@@ -8583,8 +8662,8 @@
         </p:blipFill>
         <p:spPr>
           <a:xfrm>
-            <a:off x="2751809" y="1792784"/>
-            <a:ext cx="6688381" cy="4195762"/>
+            <a:off x="2802552" y="1792784"/>
+            <a:ext cx="6586895" cy="4195762"/>
           </a:xfrm>
           <a:prstGeom prst="rect">
             <a:avLst/>
@@ -8605,7 +8684,7 @@
         </p:nvSpPr>
         <p:spPr>
           <a:xfrm>
-            <a:off x="157378" y="2967335"/>
+            <a:off x="147853" y="2967335"/>
             <a:ext cx="2420406" cy="923330"/>
           </a:xfrm>
           <a:prstGeom prst="rect">
@@ -8653,7 +8732,7 @@
         </p:nvSpPr>
         <p:spPr>
           <a:xfrm>
-            <a:off x="9617052" y="2967335"/>
+            <a:off x="9598002" y="2872085"/>
             <a:ext cx="2420406" cy="923330"/>
           </a:xfrm>
           <a:prstGeom prst="rect">
@@ -8690,7 +8769,7 @@
     </p:spTree>
     <p:extLst>
       <p:ext uri="{BB962C8B-B14F-4D97-AF65-F5344CB8AC3E}">
-        <p14:creationId xmlns:p14="http://schemas.microsoft.com/office/powerpoint/2010/main" val="276089555"/>
+        <p14:creationId xmlns:p14="http://schemas.microsoft.com/office/powerpoint/2010/main" val="1943397596"/>
       </p:ext>
     </p:extLst>
   </p:cSld>
@@ -8722,7 +8801,7 @@
           <p:cNvPr id="2" name="Title 1">
             <a:extLst>
               <a:ext uri="{FF2B5EF4-FFF2-40B4-BE49-F238E27FC236}">
-                <a16:creationId xmlns:a16="http://schemas.microsoft.com/office/drawing/2014/main" id="{FE35A943-83D0-4753-AA1C-4A6833FF9B39}"/>
+                <a16:creationId xmlns:a16="http://schemas.microsoft.com/office/drawing/2014/main" id="{672EBB02-FCB7-449D-9D6A-64ED9C5983DF}"/>
               </a:ext>
             </a:extLst>
           </p:cNvPr>
@@ -8740,59 +8819,135 @@
           <a:p>
             <a:r>
               <a:rPr lang="en-GB" dirty="0"/>
-              <a:t>The player experience</a:t>
-            </a:r>
-          </a:p>
-        </p:txBody>
-      </p:sp>
-      <p:sp>
-        <p:nvSpPr>
-          <p:cNvPr id="3" name="Content Placeholder 2">
+              <a:t>To keep things Symmetrical </a:t>
+            </a:r>
+          </a:p>
+        </p:txBody>
+      </p:sp>
+      <p:pic>
+        <p:nvPicPr>
+          <p:cNvPr id="9" name="Content Placeholder 8">
             <a:extLst>
               <a:ext uri="{FF2B5EF4-FFF2-40B4-BE49-F238E27FC236}">
-                <a16:creationId xmlns:a16="http://schemas.microsoft.com/office/drawing/2014/main" id="{5E33382E-A521-4D39-8DD5-E2DC47E4FE22}"/>
+                <a16:creationId xmlns:a16="http://schemas.microsoft.com/office/drawing/2014/main" id="{45A73B88-1535-4E04-AF47-20EB656284D6}"/>
               </a:ext>
             </a:extLst>
           </p:cNvPr>
-          <p:cNvSpPr>
-            <a:spLocks noGrp="1"/>
-          </p:cNvSpPr>
+          <p:cNvPicPr>
+            <a:picLocks noGrp="1" noChangeAspect="1"/>
+          </p:cNvPicPr>
           <p:nvPr>
             <p:ph idx="1"/>
           </p:nvPr>
-        </p:nvSpPr>
-        <p:spPr/>
-        <p:txBody>
-          <a:bodyPr/>
-          <a:lstStyle/>
-          <a:p>
-            <a:r>
-              <a:rPr lang="en-GB" dirty="0"/>
-              <a:t>We want both of the players to experience a sense of hard fun</a:t>
-            </a:r>
-          </a:p>
-          <a:p>
-            <a:pPr lvl="1"/>
-            <a:r>
-              <a:rPr lang="en-GB" dirty="0" err="1"/>
-              <a:t>Fiero</a:t>
-            </a:r>
-            <a:r>
-              <a:rPr lang="en-GB" dirty="0"/>
-              <a:t>, strategy and obstacles</a:t>
-            </a:r>
-          </a:p>
-          <a:p>
-            <a:r>
-              <a:rPr lang="en-GB" dirty="0"/>
-              <a:t>A sense of people fun</a:t>
-            </a:r>
-          </a:p>
-          <a:p>
-            <a:pPr lvl="1"/>
-            <a:r>
-              <a:rPr lang="en-GB" dirty="0"/>
-              <a:t>Amusement and player interaction</a:t>
+        </p:nvPicPr>
+        <p:blipFill>
+          <a:blip r:embed="rId3"/>
+          <a:stretch>
+            <a:fillRect/>
+          </a:stretch>
+        </p:blipFill>
+        <p:spPr>
+          <a:xfrm>
+            <a:off x="2751809" y="1792784"/>
+            <a:ext cx="6688381" cy="4195762"/>
+          </a:xfrm>
+          <a:prstGeom prst="rect">
+            <a:avLst/>
+          </a:prstGeom>
+        </p:spPr>
+      </p:pic>
+      <p:sp>
+        <p:nvSpPr>
+          <p:cNvPr id="5" name="Rectangle 4">
+            <a:extLst>
+              <a:ext uri="{FF2B5EF4-FFF2-40B4-BE49-F238E27FC236}">
+                <a16:creationId xmlns:a16="http://schemas.microsoft.com/office/drawing/2014/main" id="{432E7842-52B2-456C-8D0A-BC10CCCEAFDE}"/>
+              </a:ext>
+            </a:extLst>
+          </p:cNvPr>
+          <p:cNvSpPr/>
+          <p:nvPr/>
+        </p:nvSpPr>
+        <p:spPr>
+          <a:xfrm>
+            <a:off x="157378" y="2967335"/>
+            <a:ext cx="2420406" cy="923330"/>
+          </a:xfrm>
+          <a:prstGeom prst="rect">
+            <a:avLst/>
+          </a:prstGeom>
+          <a:noFill/>
+        </p:spPr>
+        <p:txBody>
+          <a:bodyPr wrap="none" lIns="91440" tIns="45720" rIns="91440" bIns="45720">
+            <a:spAutoFit/>
+          </a:bodyPr>
+          <a:lstStyle/>
+          <a:p>
+            <a:pPr algn="ctr"/>
+            <a:r>
+              <a:rPr lang="en-US" sz="5400" b="0" cap="none" spc="0" dirty="0">
+                <a:ln w="0"/>
+                <a:solidFill>
+                  <a:schemeClr val="tx1"/>
+                </a:solidFill>
+                <a:effectLst>
+                  <a:outerShdw blurRad="38100" dist="19050" dir="2700000" algn="tl" rotWithShape="0">
+                    <a:schemeClr val="dk1">
+                      <a:alpha val="40000"/>
+                    </a:schemeClr>
+                  </a:outerShdw>
+                </a:effectLst>
+              </a:rPr>
+              <a:t>Player 1</a:t>
+            </a:r>
+          </a:p>
+        </p:txBody>
+      </p:sp>
+      <p:sp>
+        <p:nvSpPr>
+          <p:cNvPr id="6" name="Rectangle 5">
+            <a:extLst>
+              <a:ext uri="{FF2B5EF4-FFF2-40B4-BE49-F238E27FC236}">
+                <a16:creationId xmlns:a16="http://schemas.microsoft.com/office/drawing/2014/main" id="{BA4DA330-4127-4639-AF23-007D271219CB}"/>
+              </a:ext>
+            </a:extLst>
+          </p:cNvPr>
+          <p:cNvSpPr/>
+          <p:nvPr/>
+        </p:nvSpPr>
+        <p:spPr>
+          <a:xfrm>
+            <a:off x="9617052" y="2967335"/>
+            <a:ext cx="2420406" cy="923330"/>
+          </a:xfrm>
+          <a:prstGeom prst="rect">
+            <a:avLst/>
+          </a:prstGeom>
+          <a:noFill/>
+        </p:spPr>
+        <p:txBody>
+          <a:bodyPr wrap="none" lIns="91440" tIns="45720" rIns="91440" bIns="45720">
+            <a:spAutoFit/>
+          </a:bodyPr>
+          <a:lstStyle/>
+          <a:p>
+            <a:pPr algn="ctr"/>
+            <a:r>
+              <a:rPr lang="en-US" sz="5400" b="0" cap="none" spc="0" dirty="0">
+                <a:ln w="0"/>
+                <a:solidFill>
+                  <a:schemeClr val="tx1"/>
+                </a:solidFill>
+                <a:effectLst>
+                  <a:outerShdw blurRad="38100" dist="19050" dir="2700000" algn="tl" rotWithShape="0">
+                    <a:schemeClr val="dk1">
+                      <a:alpha val="40000"/>
+                    </a:schemeClr>
+                  </a:outerShdw>
+                </a:effectLst>
+              </a:rPr>
+              <a:t>Player 2</a:t>
             </a:r>
           </a:p>
         </p:txBody>
@@ -8800,7 +8955,7 @@
     </p:spTree>
     <p:extLst>
       <p:ext uri="{BB962C8B-B14F-4D97-AF65-F5344CB8AC3E}">
-        <p14:creationId xmlns:p14="http://schemas.microsoft.com/office/powerpoint/2010/main" val="1822042671"/>
+        <p14:creationId xmlns:p14="http://schemas.microsoft.com/office/powerpoint/2010/main" val="276089555"/>
       </p:ext>
     </p:extLst>
   </p:cSld>
@@ -8832,7 +8987,7 @@
           <p:cNvPr id="2" name="Title 1">
             <a:extLst>
               <a:ext uri="{FF2B5EF4-FFF2-40B4-BE49-F238E27FC236}">
-                <a16:creationId xmlns:a16="http://schemas.microsoft.com/office/drawing/2014/main" id="{884D9554-1741-4629-B62D-1C02996DE221}"/>
+                <a16:creationId xmlns:a16="http://schemas.microsoft.com/office/drawing/2014/main" id="{FE35A943-83D0-4753-AA1C-4A6833FF9B39}"/>
               </a:ext>
             </a:extLst>
           </p:cNvPr>
@@ -8850,7 +9005,7 @@
           <a:p>
             <a:r>
               <a:rPr lang="en-GB" dirty="0"/>
-              <a:t>The following week</a:t>
+              <a:t>The player experience</a:t>
             </a:r>
           </a:p>
         </p:txBody>
@@ -8860,7 +9015,7 @@
           <p:cNvPr id="3" name="Content Placeholder 2">
             <a:extLst>
               <a:ext uri="{FF2B5EF4-FFF2-40B4-BE49-F238E27FC236}">
-                <a16:creationId xmlns:a16="http://schemas.microsoft.com/office/drawing/2014/main" id="{5B90EE24-1240-4B7B-8D92-EA4B79F1A4B4}"/>
+                <a16:creationId xmlns:a16="http://schemas.microsoft.com/office/drawing/2014/main" id="{5E33382E-A521-4D39-8DD5-E2DC47E4FE22}"/>
               </a:ext>
             </a:extLst>
           </p:cNvPr>
@@ -8878,26 +9033,39 @@
           <a:p>
             <a:r>
               <a:rPr lang="en-GB" dirty="0"/>
-              <a:t>Picking a theme</a:t>
-            </a:r>
-          </a:p>
-          <a:p>
+              <a:t>We want both of the players to experience a sense of hard fun</a:t>
+            </a:r>
+          </a:p>
+          <a:p>
+            <a:pPr lvl="1"/>
+            <a:r>
+              <a:rPr lang="en-GB" dirty="0" err="1"/>
+              <a:t>Fiero</a:t>
+            </a:r>
             <a:r>
               <a:rPr lang="en-GB" dirty="0"/>
-              <a:t>Building a </a:t>
-            </a:r>
-            <a:r>
-              <a:rPr lang="en-GB" dirty="0" err="1"/>
-              <a:t>prtotype</a:t>
-            </a:r>
-            <a:endParaRPr lang="en-GB" dirty="0"/>
+              <a:t>, strategy and obstacles</a:t>
+            </a:r>
+          </a:p>
+          <a:p>
+            <a:r>
+              <a:rPr lang="en-GB" dirty="0"/>
+              <a:t>A sense of people fun</a:t>
+            </a:r>
+          </a:p>
+          <a:p>
+            <a:pPr lvl="1"/>
+            <a:r>
+              <a:rPr lang="en-GB" dirty="0"/>
+              <a:t>Amusement and player interaction</a:t>
+            </a:r>
           </a:p>
         </p:txBody>
       </p:sp>
     </p:spTree>
     <p:extLst>
       <p:ext uri="{BB962C8B-B14F-4D97-AF65-F5344CB8AC3E}">
-        <p14:creationId xmlns:p14="http://schemas.microsoft.com/office/powerpoint/2010/main" val="855245935"/>
+        <p14:creationId xmlns:p14="http://schemas.microsoft.com/office/powerpoint/2010/main" val="1822042671"/>
       </p:ext>
     </p:extLst>
   </p:cSld>
@@ -8929,7 +9097,7 @@
           <p:cNvPr id="2" name="Title 1">
             <a:extLst>
               <a:ext uri="{FF2B5EF4-FFF2-40B4-BE49-F238E27FC236}">
-                <a16:creationId xmlns:a16="http://schemas.microsoft.com/office/drawing/2014/main" id="{2AE1F416-5594-4C07-ADDF-FE02BFFE75D1}"/>
+                <a16:creationId xmlns:a16="http://schemas.microsoft.com/office/drawing/2014/main" id="{884D9554-1741-4629-B62D-1C02996DE221}"/>
               </a:ext>
             </a:extLst>
           </p:cNvPr>
@@ -8940,28 +9108,61 @@
             <p:ph type="title"/>
           </p:nvPr>
         </p:nvSpPr>
-        <p:spPr>
-          <a:xfrm>
-            <a:off x="1393638" y="2728735"/>
-            <a:ext cx="9404723" cy="1400530"/>
-          </a:xfrm>
-        </p:spPr>
+        <p:spPr/>
         <p:txBody>
           <a:bodyPr/>
           <a:lstStyle/>
           <a:p>
-            <a:pPr algn="ctr"/>
             <a:r>
               <a:rPr lang="en-GB" dirty="0"/>
-              <a:t>Any Questions?</a:t>
-            </a:r>
+              <a:t>The following week</a:t>
+            </a:r>
+          </a:p>
+        </p:txBody>
+      </p:sp>
+      <p:sp>
+        <p:nvSpPr>
+          <p:cNvPr id="3" name="Content Placeholder 2">
+            <a:extLst>
+              <a:ext uri="{FF2B5EF4-FFF2-40B4-BE49-F238E27FC236}">
+                <a16:creationId xmlns:a16="http://schemas.microsoft.com/office/drawing/2014/main" id="{5B90EE24-1240-4B7B-8D92-EA4B79F1A4B4}"/>
+              </a:ext>
+            </a:extLst>
+          </p:cNvPr>
+          <p:cNvSpPr>
+            <a:spLocks noGrp="1"/>
+          </p:cNvSpPr>
+          <p:nvPr>
+            <p:ph idx="1"/>
+          </p:nvPr>
+        </p:nvSpPr>
+        <p:spPr/>
+        <p:txBody>
+          <a:bodyPr/>
+          <a:lstStyle/>
+          <a:p>
+            <a:r>
+              <a:rPr lang="en-GB" dirty="0"/>
+              <a:t>Picking a theme</a:t>
+            </a:r>
+          </a:p>
+          <a:p>
+            <a:r>
+              <a:rPr lang="en-GB" dirty="0"/>
+              <a:t>Building a </a:t>
+            </a:r>
+            <a:r>
+              <a:rPr lang="en-GB" dirty="0" err="1"/>
+              <a:t>prtotype</a:t>
+            </a:r>
+            <a:endParaRPr lang="en-GB" dirty="0"/>
           </a:p>
         </p:txBody>
       </p:sp>
     </p:spTree>
     <p:extLst>
       <p:ext uri="{BB962C8B-B14F-4D97-AF65-F5344CB8AC3E}">
-        <p14:creationId xmlns:p14="http://schemas.microsoft.com/office/powerpoint/2010/main" val="4207036878"/>
+        <p14:creationId xmlns:p14="http://schemas.microsoft.com/office/powerpoint/2010/main" val="855245935"/>
       </p:ext>
     </p:extLst>
   </p:cSld>
@@ -9078,6 +9279,70 @@
     <p:extLst>
       <p:ext uri="{BB962C8B-B14F-4D97-AF65-F5344CB8AC3E}">
         <p14:creationId xmlns:p14="http://schemas.microsoft.com/office/powerpoint/2010/main" val="2225047168"/>
+      </p:ext>
+    </p:extLst>
+  </p:cSld>
+  <p:clrMapOvr>
+    <a:masterClrMapping/>
+  </p:clrMapOvr>
+</p:sld>
+</file>
+
+<file path=ppt/slides/slide20.xml><?xml version="1.0" encoding="utf-8"?>
+<p:sld xmlns:a="http://schemas.openxmlformats.org/drawingml/2006/main" xmlns:r="http://schemas.openxmlformats.org/officeDocument/2006/relationships" xmlns:p="http://schemas.openxmlformats.org/presentationml/2006/main">
+  <p:cSld>
+    <p:spTree>
+      <p:nvGrpSpPr>
+        <p:cNvPr id="1" name=""/>
+        <p:cNvGrpSpPr/>
+        <p:nvPr/>
+      </p:nvGrpSpPr>
+      <p:grpSpPr>
+        <a:xfrm>
+          <a:off x="0" y="0"/>
+          <a:ext cx="0" cy="0"/>
+          <a:chOff x="0" y="0"/>
+          <a:chExt cx="0" cy="0"/>
+        </a:xfrm>
+      </p:grpSpPr>
+      <p:sp>
+        <p:nvSpPr>
+          <p:cNvPr id="2" name="Title 1">
+            <a:extLst>
+              <a:ext uri="{FF2B5EF4-FFF2-40B4-BE49-F238E27FC236}">
+                <a16:creationId xmlns:a16="http://schemas.microsoft.com/office/drawing/2014/main" id="{2AE1F416-5594-4C07-ADDF-FE02BFFE75D1}"/>
+              </a:ext>
+            </a:extLst>
+          </p:cNvPr>
+          <p:cNvSpPr>
+            <a:spLocks noGrp="1"/>
+          </p:cNvSpPr>
+          <p:nvPr>
+            <p:ph type="title"/>
+          </p:nvPr>
+        </p:nvSpPr>
+        <p:spPr>
+          <a:xfrm>
+            <a:off x="1393638" y="2728735"/>
+            <a:ext cx="9404723" cy="1400530"/>
+          </a:xfrm>
+        </p:spPr>
+        <p:txBody>
+          <a:bodyPr/>
+          <a:lstStyle/>
+          <a:p>
+            <a:pPr algn="ctr"/>
+            <a:r>
+              <a:rPr lang="en-GB" dirty="0"/>
+              <a:t>Any Questions?</a:t>
+            </a:r>
+          </a:p>
+        </p:txBody>
+      </p:sp>
+    </p:spTree>
+    <p:extLst>
+      <p:ext uri="{BB962C8B-B14F-4D97-AF65-F5344CB8AC3E}">
+        <p14:creationId xmlns:p14="http://schemas.microsoft.com/office/powerpoint/2010/main" val="4207036878"/>
       </p:ext>
     </p:extLst>
   </p:cSld>
@@ -9644,6 +9909,31 @@
 <file path=ppt/slides/slide5.xml><?xml version="1.0" encoding="utf-8"?>
 <p:sld xmlns:a="http://schemas.openxmlformats.org/drawingml/2006/main" xmlns:r="http://schemas.openxmlformats.org/officeDocument/2006/relationships" xmlns:p="http://schemas.openxmlformats.org/presentationml/2006/main">
   <p:cSld>
+    <p:bg>
+      <p:bgPr>
+        <a:blipFill rotWithShape="1">
+          <a:blip r:embed="rId3">
+            <a:duotone>
+              <a:schemeClr val="bg2">
+                <a:shade val="69000"/>
+                <a:hueMod val="108000"/>
+                <a:satMod val="164000"/>
+                <a:lumMod val="74000"/>
+              </a:schemeClr>
+              <a:schemeClr val="bg2">
+                <a:tint val="96000"/>
+                <a:hueMod val="88000"/>
+                <a:satMod val="140000"/>
+                <a:lumMod val="132000"/>
+              </a:schemeClr>
+            </a:duotone>
+            <a:extLst/>
+          </a:blip>
+          <a:stretch/>
+        </a:blipFill>
+        <a:effectLst/>
+      </p:bgPr>
+    </p:bg>
     <p:spTree>
       <p:nvGrpSpPr>
         <p:cNvPr id="1" name=""/>
@@ -9658,6 +9948,43 @@
           <a:chExt cx="0" cy="0"/>
         </a:xfrm>
       </p:grpSpPr>
+      <p:pic>
+        <p:nvPicPr>
+          <p:cNvPr id="7" name="Picture 6" descr="A picture containing indoor&#10;&#10;Description generated with high confidence">
+            <a:extLst>
+              <a:ext uri="{FF2B5EF4-FFF2-40B4-BE49-F238E27FC236}">
+                <a16:creationId xmlns:a16="http://schemas.microsoft.com/office/drawing/2014/main" id="{11CDF87D-612A-4B07-BB78-6E56A181D806}"/>
+              </a:ext>
+            </a:extLst>
+          </p:cNvPr>
+          <p:cNvPicPr>
+            <a:picLocks noChangeAspect="1"/>
+          </p:cNvPicPr>
+          <p:nvPr/>
+        </p:nvPicPr>
+        <p:blipFill>
+          <a:blip r:embed="rId4"/>
+          <a:stretch>
+            <a:fillRect/>
+          </a:stretch>
+        </p:blipFill>
+        <p:spPr>
+          <a:xfrm>
+            <a:off x="6091916" y="2623850"/>
+            <a:ext cx="5451627" cy="3052911"/>
+          </a:xfrm>
+          <a:prstGeom prst="rect">
+            <a:avLst/>
+          </a:prstGeom>
+          <a:effectLst>
+            <a:outerShdw blurRad="50800" dist="38100" dir="5400000" algn="t" rotWithShape="0">
+              <a:prstClr val="black">
+                <a:alpha val="43000"/>
+              </a:prstClr>
+            </a:outerShdw>
+          </a:effectLst>
+        </p:spPr>
+      </p:pic>
       <p:sp>
         <p:nvSpPr>
           <p:cNvPr id="2" name="Title 1">
@@ -9674,15 +10001,26 @@
             <p:ph type="title"/>
           </p:nvPr>
         </p:nvSpPr>
-        <p:spPr/>
-        <p:txBody>
-          <a:bodyPr/>
+        <p:spPr>
+          <a:xfrm>
+            <a:off x="648930" y="629266"/>
+            <a:ext cx="9252154" cy="1223983"/>
+          </a:xfrm>
+        </p:spPr>
+        <p:txBody>
+          <a:bodyPr>
+            <a:normAutofit fontScale="90000"/>
+          </a:bodyPr>
           <a:lstStyle/>
           <a:p>
             <a:r>
               <a:rPr lang="en-GB" dirty="0"/>
-              <a:t>Games we looked at</a:t>
-            </a:r>
+              <a:t>Games we looked at: Mini Battles</a:t>
+            </a:r>
+            <a:br>
+              <a:rPr lang="en-GB" dirty="0"/>
+            </a:br>
+            <a:endParaRPr lang="en-GB" dirty="0"/>
           </a:p>
         </p:txBody>
       </p:sp>
@@ -9702,12 +10040,34 @@
             <p:ph idx="1"/>
           </p:nvPr>
         </p:nvSpPr>
-        <p:spPr/>
-        <p:txBody>
-          <a:bodyPr/>
-          <a:lstStyle/>
-          <a:p>
-            <a:endParaRPr lang="en-GB"/>
+        <p:spPr>
+          <a:xfrm>
+            <a:off x="1103311" y="2052214"/>
+            <a:ext cx="4338409" cy="4196185"/>
+          </a:xfrm>
+        </p:spPr>
+        <p:txBody>
+          <a:bodyPr>
+            <a:normAutofit/>
+          </a:bodyPr>
+          <a:lstStyle/>
+          <a:p>
+            <a:r>
+              <a:rPr lang="en-GB" dirty="0"/>
+              <a:t>Viking mini game</a:t>
+            </a:r>
+          </a:p>
+          <a:p>
+            <a:pPr lvl="1"/>
+            <a:r>
+              <a:rPr lang="en-US" dirty="0"/>
+              <a:t>In this mini game two players are spawned on a moving platform and the throw axes at each other trying to avoid hitting the obstacles that are between them. When the axe is on cooldown you can tap to jump instead so you can dodge the opponent’s axe.</a:t>
+            </a:r>
+            <a:endParaRPr lang="en-GB" dirty="0"/>
+          </a:p>
+          <a:p>
+            <a:pPr lvl="1"/>
+            <a:endParaRPr lang="en-GB" dirty="0"/>
           </a:p>
         </p:txBody>
       </p:sp>
@@ -9727,6 +10087,31 @@
 <file path=ppt/slides/slide6.xml><?xml version="1.0" encoding="utf-8"?>
 <p:sld xmlns:a="http://schemas.openxmlformats.org/drawingml/2006/main" xmlns:r="http://schemas.openxmlformats.org/officeDocument/2006/relationships" xmlns:p="http://schemas.openxmlformats.org/presentationml/2006/main">
   <p:cSld>
+    <p:bg>
+      <p:bgPr>
+        <a:blipFill rotWithShape="1">
+          <a:blip r:embed="rId3">
+            <a:duotone>
+              <a:schemeClr val="bg2">
+                <a:shade val="69000"/>
+                <a:hueMod val="108000"/>
+                <a:satMod val="164000"/>
+                <a:lumMod val="74000"/>
+              </a:schemeClr>
+              <a:schemeClr val="bg2">
+                <a:tint val="96000"/>
+                <a:hueMod val="88000"/>
+                <a:satMod val="140000"/>
+                <a:lumMod val="132000"/>
+              </a:schemeClr>
+            </a:duotone>
+            <a:extLst/>
+          </a:blip>
+          <a:stretch/>
+        </a:blipFill>
+        <a:effectLst/>
+      </p:bgPr>
+    </p:bg>
     <p:spTree>
       <p:nvGrpSpPr>
         <p:cNvPr id="1" name=""/>
@@ -9741,6 +10126,169 @@
           <a:chExt cx="0" cy="0"/>
         </a:xfrm>
       </p:grpSpPr>
+      <p:pic>
+        <p:nvPicPr>
+          <p:cNvPr id="4" name="Picture 3">
+            <a:extLst>
+              <a:ext uri="{FF2B5EF4-FFF2-40B4-BE49-F238E27FC236}">
+                <a16:creationId xmlns:a16="http://schemas.microsoft.com/office/drawing/2014/main" id="{C2BFAA14-4860-4E4A-8C24-212DAB77262B}"/>
+              </a:ext>
+            </a:extLst>
+          </p:cNvPr>
+          <p:cNvPicPr>
+            <a:picLocks noChangeAspect="1"/>
+          </p:cNvPicPr>
+          <p:nvPr/>
+        </p:nvPicPr>
+        <p:blipFill>
+          <a:blip r:embed="rId4"/>
+          <a:stretch>
+            <a:fillRect/>
+          </a:stretch>
+        </p:blipFill>
+        <p:spPr>
+          <a:xfrm>
+            <a:off x="6096000" y="2613530"/>
+            <a:ext cx="5451627" cy="3052502"/>
+          </a:xfrm>
+          <a:prstGeom prst="rect">
+            <a:avLst/>
+          </a:prstGeom>
+        </p:spPr>
+      </p:pic>
+      <p:sp>
+        <p:nvSpPr>
+          <p:cNvPr id="2" name="Title 1">
+            <a:extLst>
+              <a:ext uri="{FF2B5EF4-FFF2-40B4-BE49-F238E27FC236}">
+                <a16:creationId xmlns:a16="http://schemas.microsoft.com/office/drawing/2014/main" id="{2036735B-D95D-4C6E-97E3-979A377C30B2}"/>
+              </a:ext>
+            </a:extLst>
+          </p:cNvPr>
+          <p:cNvSpPr>
+            <a:spLocks noGrp="1"/>
+          </p:cNvSpPr>
+          <p:nvPr>
+            <p:ph type="title"/>
+          </p:nvPr>
+        </p:nvSpPr>
+        <p:spPr>
+          <a:xfrm>
+            <a:off x="648930" y="629266"/>
+            <a:ext cx="9252154" cy="1223983"/>
+          </a:xfrm>
+        </p:spPr>
+        <p:txBody>
+          <a:bodyPr>
+            <a:normAutofit fontScale="90000"/>
+          </a:bodyPr>
+          <a:lstStyle/>
+          <a:p>
+            <a:r>
+              <a:rPr lang="en-GB" dirty="0"/>
+              <a:t>Games we looked at: Mini Battles</a:t>
+            </a:r>
+            <a:br>
+              <a:rPr lang="en-GB" dirty="0"/>
+            </a:br>
+            <a:endParaRPr lang="en-GB" dirty="0"/>
+          </a:p>
+        </p:txBody>
+      </p:sp>
+      <p:sp>
+        <p:nvSpPr>
+          <p:cNvPr id="3" name="Content Placeholder 2">
+            <a:extLst>
+              <a:ext uri="{FF2B5EF4-FFF2-40B4-BE49-F238E27FC236}">
+                <a16:creationId xmlns:a16="http://schemas.microsoft.com/office/drawing/2014/main" id="{DF94013C-0F2A-4DFF-95E3-4F0A1E6FD97E}"/>
+              </a:ext>
+            </a:extLst>
+          </p:cNvPr>
+          <p:cNvSpPr>
+            <a:spLocks noGrp="1"/>
+          </p:cNvSpPr>
+          <p:nvPr>
+            <p:ph idx="1"/>
+          </p:nvPr>
+        </p:nvSpPr>
+        <p:spPr>
+          <a:xfrm>
+            <a:off x="1103311" y="2052214"/>
+            <a:ext cx="4338409" cy="4196185"/>
+          </a:xfrm>
+        </p:spPr>
+        <p:txBody>
+          <a:bodyPr>
+            <a:normAutofit/>
+          </a:bodyPr>
+          <a:lstStyle/>
+          <a:p>
+            <a:r>
+              <a:rPr lang="en-GB" dirty="0"/>
+              <a:t>Cowboy mini game</a:t>
+            </a:r>
+          </a:p>
+          <a:p>
+            <a:pPr lvl="1"/>
+            <a:r>
+              <a:rPr lang="en-US" dirty="0"/>
+              <a:t>Another interesting mini-game is Cowboy. The two players are moving up and down and are shooting at each other every couple of seconds. Between the players are obstacles/powerups that can: </a:t>
+            </a:r>
+          </a:p>
+          <a:p>
+            <a:pPr lvl="1"/>
+            <a:r>
+              <a:rPr lang="en-US" dirty="0"/>
+              <a:t>Bounce the bullet back.</a:t>
+            </a:r>
+          </a:p>
+          <a:p>
+            <a:pPr lvl="1"/>
+            <a:r>
+              <a:rPr lang="en-US" dirty="0"/>
+              <a:t>Make the bullet speed lower.</a:t>
+            </a:r>
+          </a:p>
+          <a:p>
+            <a:pPr lvl="1"/>
+            <a:r>
+              <a:rPr lang="en-US" dirty="0"/>
+              <a:t>Spawn additional bullets.</a:t>
+            </a:r>
+            <a:endParaRPr lang="en-GB" dirty="0"/>
+          </a:p>
+        </p:txBody>
+      </p:sp>
+    </p:spTree>
+    <p:extLst>
+      <p:ext uri="{BB962C8B-B14F-4D97-AF65-F5344CB8AC3E}">
+        <p14:creationId xmlns:p14="http://schemas.microsoft.com/office/powerpoint/2010/main" val="1408356817"/>
+      </p:ext>
+    </p:extLst>
+  </p:cSld>
+  <p:clrMapOvr>
+    <a:masterClrMapping/>
+  </p:clrMapOvr>
+</p:sld>
+</file>
+
+<file path=ppt/slides/slide7.xml><?xml version="1.0" encoding="utf-8"?>
+<p:sld xmlns:a="http://schemas.openxmlformats.org/drawingml/2006/main" xmlns:r="http://schemas.openxmlformats.org/officeDocument/2006/relationships" xmlns:p="http://schemas.openxmlformats.org/presentationml/2006/main">
+  <p:cSld>
+    <p:spTree>
+      <p:nvGrpSpPr>
+        <p:cNvPr id="1" name=""/>
+        <p:cNvGrpSpPr/>
+        <p:nvPr/>
+      </p:nvGrpSpPr>
+      <p:grpSpPr>
+        <a:xfrm>
+          <a:off x="0" y="0"/>
+          <a:ext cx="0" cy="0"/>
+          <a:chOff x="0" y="0"/>
+          <a:chExt cx="0" cy="0"/>
+        </a:xfrm>
+      </p:grpSpPr>
       <p:sp>
         <p:nvSpPr>
           <p:cNvPr id="2" name="Title 1">
@@ -9828,7 +10376,7 @@
 </p:sld>
 </file>
 
-<file path=ppt/slides/slide7.xml><?xml version="1.0" encoding="utf-8"?>
+<file path=ppt/slides/slide8.xml><?xml version="1.0" encoding="utf-8"?>
 <p:sld xmlns:a="http://schemas.openxmlformats.org/drawingml/2006/main" xmlns:r="http://schemas.openxmlformats.org/officeDocument/2006/relationships" xmlns:p="http://schemas.openxmlformats.org/presentationml/2006/main">
   <p:cSld>
     <p:spTree>
@@ -10424,118 +10972,6 @@
 </p:sld>
 </file>
 
-<file path=ppt/slides/slide8.xml><?xml version="1.0" encoding="utf-8"?>
-<p:sld xmlns:a="http://schemas.openxmlformats.org/drawingml/2006/main" xmlns:r="http://schemas.openxmlformats.org/officeDocument/2006/relationships" xmlns:p="http://schemas.openxmlformats.org/presentationml/2006/main">
-  <p:cSld>
-    <p:spTree>
-      <p:nvGrpSpPr>
-        <p:cNvPr id="1" name=""/>
-        <p:cNvGrpSpPr/>
-        <p:nvPr/>
-      </p:nvGrpSpPr>
-      <p:grpSpPr>
-        <a:xfrm>
-          <a:off x="0" y="0"/>
-          <a:ext cx="0" cy="0"/>
-          <a:chOff x="0" y="0"/>
-          <a:chExt cx="0" cy="0"/>
-        </a:xfrm>
-      </p:grpSpPr>
-      <p:sp>
-        <p:nvSpPr>
-          <p:cNvPr id="2" name="Title 1">
-            <a:extLst>
-              <a:ext uri="{FF2B5EF4-FFF2-40B4-BE49-F238E27FC236}">
-                <a16:creationId xmlns:a16="http://schemas.microsoft.com/office/drawing/2014/main" id="{2A6C51B4-F8AB-4319-8469-886E389188DE}"/>
-              </a:ext>
-            </a:extLst>
-          </p:cNvPr>
-          <p:cNvSpPr>
-            <a:spLocks noGrp="1"/>
-          </p:cNvSpPr>
-          <p:nvPr>
-            <p:ph type="title"/>
-          </p:nvPr>
-        </p:nvSpPr>
-        <p:spPr/>
-        <p:txBody>
-          <a:bodyPr/>
-          <a:lstStyle/>
-          <a:p>
-            <a:r>
-              <a:rPr lang="en-GB" dirty="0"/>
-              <a:t>What does the player do?</a:t>
-            </a:r>
-          </a:p>
-        </p:txBody>
-      </p:sp>
-      <p:sp>
-        <p:nvSpPr>
-          <p:cNvPr id="3" name="Content Placeholder 2">
-            <a:extLst>
-              <a:ext uri="{FF2B5EF4-FFF2-40B4-BE49-F238E27FC236}">
-                <a16:creationId xmlns:a16="http://schemas.microsoft.com/office/drawing/2014/main" id="{F592138A-5065-4B76-9944-5BE34C8C0BA5}"/>
-              </a:ext>
-            </a:extLst>
-          </p:cNvPr>
-          <p:cNvSpPr>
-            <a:spLocks noGrp="1"/>
-          </p:cNvSpPr>
-          <p:nvPr>
-            <p:ph idx="1"/>
-          </p:nvPr>
-        </p:nvSpPr>
-        <p:spPr/>
-        <p:txBody>
-          <a:bodyPr>
-            <a:normAutofit/>
-          </a:bodyPr>
-          <a:lstStyle/>
-          <a:p>
-            <a:r>
-              <a:rPr lang="en-GB" dirty="0"/>
-              <a:t>Players will take turns in firing projectiles at each other.</a:t>
-            </a:r>
-          </a:p>
-          <a:p>
-            <a:r>
-              <a:rPr lang="en-GB" dirty="0"/>
-              <a:t>The angle of the launcher will be changing until the player taps, at this point it will lock into place. </a:t>
-            </a:r>
-          </a:p>
-          <a:p>
-            <a:r>
-              <a:rPr lang="en-GB" dirty="0"/>
-              <a:t>The shot power will be changing until the player taps.</a:t>
-            </a:r>
-          </a:p>
-          <a:p>
-            <a:r>
-              <a:rPr lang="en-GB" dirty="0"/>
-              <a:t>When both players have selected their shot angle and power the projectiles will fire.</a:t>
-            </a:r>
-          </a:p>
-          <a:p>
-            <a:r>
-              <a:rPr lang="en-GB" dirty="0"/>
-              <a:t>The end goal will be for one player to get the other persons health to zero. </a:t>
-            </a:r>
-          </a:p>
-        </p:txBody>
-      </p:sp>
-    </p:spTree>
-    <p:extLst>
-      <p:ext uri="{BB962C8B-B14F-4D97-AF65-F5344CB8AC3E}">
-        <p14:creationId xmlns:p14="http://schemas.microsoft.com/office/powerpoint/2010/main" val="2234175574"/>
-      </p:ext>
-    </p:extLst>
-  </p:cSld>
-  <p:clrMapOvr>
-    <a:masterClrMapping/>
-  </p:clrMapOvr>
-</p:sld>
-</file>
-
 <file path=ppt/slides/slide9.xml><?xml version="1.0" encoding="utf-8"?>
 <p:sld xmlns:a="http://schemas.openxmlformats.org/drawingml/2006/main" xmlns:r="http://schemas.openxmlformats.org/officeDocument/2006/relationships" xmlns:p="http://schemas.openxmlformats.org/presentationml/2006/main">
   <p:cSld>
@@ -10558,7 +10994,7 @@
           <p:cNvPr id="2" name="Title 1">
             <a:extLst>
               <a:ext uri="{FF2B5EF4-FFF2-40B4-BE49-F238E27FC236}">
-                <a16:creationId xmlns:a16="http://schemas.microsoft.com/office/drawing/2014/main" id="{28E2D705-D5C3-4C74-A24E-2CAFC9876DB2}"/>
+                <a16:creationId xmlns:a16="http://schemas.microsoft.com/office/drawing/2014/main" id="{2A6C51B4-F8AB-4319-8469-886E389188DE}"/>
               </a:ext>
             </a:extLst>
           </p:cNvPr>
@@ -10576,47 +11012,69 @@
           <a:p>
             <a:r>
               <a:rPr lang="en-GB" dirty="0"/>
-              <a:t>Screen mock-up</a:t>
-            </a:r>
-          </a:p>
-        </p:txBody>
-      </p:sp>
-      <p:pic>
-        <p:nvPicPr>
-          <p:cNvPr id="4" name="Content Placeholder 3">
+              <a:t>What does the player do?</a:t>
+            </a:r>
+          </a:p>
+        </p:txBody>
+      </p:sp>
+      <p:sp>
+        <p:nvSpPr>
+          <p:cNvPr id="3" name="Content Placeholder 2">
             <a:extLst>
               <a:ext uri="{FF2B5EF4-FFF2-40B4-BE49-F238E27FC236}">
-                <a16:creationId xmlns:a16="http://schemas.microsoft.com/office/drawing/2014/main" id="{78EDFCD9-ADF2-454E-9282-4233E59417F0}"/>
+                <a16:creationId xmlns:a16="http://schemas.microsoft.com/office/drawing/2014/main" id="{F592138A-5065-4B76-9944-5BE34C8C0BA5}"/>
               </a:ext>
             </a:extLst>
           </p:cNvPr>
-          <p:cNvPicPr>
-            <a:picLocks noGrp="1" noChangeAspect="1"/>
-          </p:cNvPicPr>
+          <p:cNvSpPr>
+            <a:spLocks noGrp="1"/>
+          </p:cNvSpPr>
           <p:nvPr>
             <p:ph idx="1"/>
           </p:nvPr>
-        </p:nvPicPr>
-        <p:blipFill>
-          <a:blip r:embed="rId2"/>
-          <a:stretch>
-            <a:fillRect/>
-          </a:stretch>
-        </p:blipFill>
-        <p:spPr>
-          <a:xfrm>
-            <a:off x="2379008" y="2081213"/>
-            <a:ext cx="7433984" cy="4195762"/>
-          </a:xfrm>
-          <a:prstGeom prst="rect">
-            <a:avLst/>
-          </a:prstGeom>
-        </p:spPr>
-      </p:pic>
+        </p:nvSpPr>
+        <p:spPr/>
+        <p:txBody>
+          <a:bodyPr>
+            <a:normAutofit/>
+          </a:bodyPr>
+          <a:lstStyle/>
+          <a:p>
+            <a:r>
+              <a:rPr lang="en-GB" dirty="0"/>
+              <a:t>Players will take turns in firing projectiles at each other.</a:t>
+            </a:r>
+          </a:p>
+          <a:p>
+            <a:r>
+              <a:rPr lang="en-GB" dirty="0"/>
+              <a:t>The angle of the launcher will be changing until the player taps, at this point it will lock into place. </a:t>
+            </a:r>
+          </a:p>
+          <a:p>
+            <a:r>
+              <a:rPr lang="en-GB" dirty="0"/>
+              <a:t>The shot power will be changing until the player taps.</a:t>
+            </a:r>
+          </a:p>
+          <a:p>
+            <a:r>
+              <a:rPr lang="en-GB" dirty="0"/>
+              <a:t>When both players have selected their shot angle and power the projectiles will fire.</a:t>
+            </a:r>
+          </a:p>
+          <a:p>
+            <a:r>
+              <a:rPr lang="en-GB" dirty="0"/>
+              <a:t>The end goal will be for one player to get the other persons health to zero. </a:t>
+            </a:r>
+          </a:p>
+        </p:txBody>
+      </p:sp>
     </p:spTree>
     <p:extLst>
       <p:ext uri="{BB962C8B-B14F-4D97-AF65-F5344CB8AC3E}">
-        <p14:creationId xmlns:p14="http://schemas.microsoft.com/office/powerpoint/2010/main" val="4030202453"/>
+        <p14:creationId xmlns:p14="http://schemas.microsoft.com/office/powerpoint/2010/main" val="2234175574"/>
       </p:ext>
     </p:extLst>
   </p:cSld>

</xml_diff>

<commit_message>
Started work on the prototype for the game
</commit_message>
<xml_diff>
--- a/Presentations/Week 2 Pitch.pptx
+++ b/Presentations/Week 2 Pitch.pptx
@@ -5,7 +5,7 @@
     <p:sldMasterId id="2147483783" r:id="rId1"/>
   </p:sldMasterIdLst>
   <p:notesMasterIdLst>
-    <p:notesMasterId r:id="rId22"/>
+    <p:notesMasterId r:id="rId19"/>
   </p:notesMasterIdLst>
   <p:sldIdLst>
     <p:sldId id="256" r:id="rId2"/>
@@ -18,16 +18,13 @@
     <p:sldId id="260" r:id="rId9"/>
     <p:sldId id="261" r:id="rId10"/>
     <p:sldId id="257" r:id="rId11"/>
-    <p:sldId id="271" r:id="rId12"/>
-    <p:sldId id="272" r:id="rId13"/>
-    <p:sldId id="273" r:id="rId14"/>
-    <p:sldId id="262" r:id="rId15"/>
-    <p:sldId id="263" r:id="rId16"/>
-    <p:sldId id="264" r:id="rId17"/>
-    <p:sldId id="265" r:id="rId18"/>
-    <p:sldId id="266" r:id="rId19"/>
-    <p:sldId id="267" r:id="rId20"/>
-    <p:sldId id="268" r:id="rId21"/>
+    <p:sldId id="262" r:id="rId12"/>
+    <p:sldId id="263" r:id="rId13"/>
+    <p:sldId id="264" r:id="rId14"/>
+    <p:sldId id="265" r:id="rId15"/>
+    <p:sldId id="266" r:id="rId16"/>
+    <p:sldId id="267" r:id="rId17"/>
+    <p:sldId id="268" r:id="rId18"/>
   </p:sldIdLst>
   <p:sldSz cx="12192000" cy="6858000"/>
   <p:notesSz cx="6858000" cy="9144000"/>
@@ -530,7 +527,7 @@
           <a:p>
             <a:r>
               <a:rPr lang="en-GB" dirty="0"/>
-              <a:t>https://play.google.com/store/apps/details?id=com.shareddreams.twelveminibattles&amp;hl=en</a:t>
+              <a:t>Ethan</a:t>
             </a:r>
           </a:p>
         </p:txBody>
@@ -552,7 +549,7 @@
           <a:p>
             <a:fld id="{0FA91835-90FF-41E4-AF94-16E4E0C00F06}" type="slidenum">
               <a:rPr lang="en-GB" smtClean="0"/>
-              <a:t>5</a:t>
+              <a:t>2</a:t>
             </a:fld>
             <a:endParaRPr lang="en-GB"/>
           </a:p>
@@ -561,7 +558,552 @@
     </p:spTree>
     <p:extLst>
       <p:ext uri="{BB962C8B-B14F-4D97-AF65-F5344CB8AC3E}">
-        <p14:creationId xmlns:p14="http://schemas.microsoft.com/office/powerpoint/2010/main" val="3054193152"/>
+        <p14:creationId xmlns:p14="http://schemas.microsoft.com/office/powerpoint/2010/main" val="2835724571"/>
+      </p:ext>
+    </p:extLst>
+  </p:cSld>
+  <p:clrMapOvr>
+    <a:masterClrMapping/>
+  </p:clrMapOvr>
+</p:notes>
+</file>
+
+<file path=ppt/notesSlides/notesSlide10.xml><?xml version="1.0" encoding="utf-8"?>
+<p:notes xmlns:a="http://schemas.openxmlformats.org/drawingml/2006/main" xmlns:r="http://schemas.openxmlformats.org/officeDocument/2006/relationships" xmlns:p="http://schemas.openxmlformats.org/presentationml/2006/main">
+  <p:cSld>
+    <p:spTree>
+      <p:nvGrpSpPr>
+        <p:cNvPr id="1" name=""/>
+        <p:cNvGrpSpPr/>
+        <p:nvPr/>
+      </p:nvGrpSpPr>
+      <p:grpSpPr>
+        <a:xfrm>
+          <a:off x="0" y="0"/>
+          <a:ext cx="0" cy="0"/>
+          <a:chOff x="0" y="0"/>
+          <a:chExt cx="0" cy="0"/>
+        </a:xfrm>
+      </p:grpSpPr>
+      <p:sp>
+        <p:nvSpPr>
+          <p:cNvPr id="2" name="Slide Image Placeholder 1"/>
+          <p:cNvSpPr>
+            <a:spLocks noGrp="1" noRot="1" noChangeAspect="1"/>
+          </p:cNvSpPr>
+          <p:nvPr>
+            <p:ph type="sldImg"/>
+          </p:nvPr>
+        </p:nvSpPr>
+        <p:spPr/>
+      </p:sp>
+      <p:sp>
+        <p:nvSpPr>
+          <p:cNvPr id="3" name="Notes Placeholder 2"/>
+          <p:cNvSpPr>
+            <a:spLocks noGrp="1"/>
+          </p:cNvSpPr>
+          <p:nvPr>
+            <p:ph type="body" idx="1"/>
+          </p:nvPr>
+        </p:nvSpPr>
+        <p:spPr/>
+        <p:txBody>
+          <a:bodyPr/>
+          <a:lstStyle/>
+          <a:p>
+            <a:r>
+              <a:rPr lang="en-GB" dirty="0"/>
+              <a:t>On some turns there will be wind that can affect the projectile. to make sure that this is fair for each player, the same force will be applied for both shots.</a:t>
+            </a:r>
+          </a:p>
+          <a:p>
+            <a:r>
+              <a:rPr lang="en-GB" dirty="0"/>
+              <a:t>Ethan</a:t>
+            </a:r>
+          </a:p>
+        </p:txBody>
+      </p:sp>
+      <p:sp>
+        <p:nvSpPr>
+          <p:cNvPr id="4" name="Slide Number Placeholder 3"/>
+          <p:cNvSpPr>
+            <a:spLocks noGrp="1"/>
+          </p:cNvSpPr>
+          <p:nvPr>
+            <p:ph type="sldNum" sz="quarter" idx="10"/>
+          </p:nvPr>
+        </p:nvSpPr>
+        <p:spPr/>
+        <p:txBody>
+          <a:bodyPr/>
+          <a:lstStyle/>
+          <a:p>
+            <a:fld id="{0FA91835-90FF-41E4-AF94-16E4E0C00F06}" type="slidenum">
+              <a:rPr lang="en-GB" smtClean="0"/>
+              <a:t>12</a:t>
+            </a:fld>
+            <a:endParaRPr lang="en-GB"/>
+          </a:p>
+        </p:txBody>
+      </p:sp>
+    </p:spTree>
+    <p:extLst>
+      <p:ext uri="{BB962C8B-B14F-4D97-AF65-F5344CB8AC3E}">
+        <p14:creationId xmlns:p14="http://schemas.microsoft.com/office/powerpoint/2010/main" val="280356946"/>
+      </p:ext>
+    </p:extLst>
+  </p:cSld>
+  <p:clrMapOvr>
+    <a:masterClrMapping/>
+  </p:clrMapOvr>
+</p:notes>
+</file>
+
+<file path=ppt/notesSlides/notesSlide11.xml><?xml version="1.0" encoding="utf-8"?>
+<p:notes xmlns:a="http://schemas.openxmlformats.org/drawingml/2006/main" xmlns:r="http://schemas.openxmlformats.org/officeDocument/2006/relationships" xmlns:p="http://schemas.openxmlformats.org/presentationml/2006/main">
+  <p:cSld>
+    <p:spTree>
+      <p:nvGrpSpPr>
+        <p:cNvPr id="1" name=""/>
+        <p:cNvGrpSpPr/>
+        <p:nvPr/>
+      </p:nvGrpSpPr>
+      <p:grpSpPr>
+        <a:xfrm>
+          <a:off x="0" y="0"/>
+          <a:ext cx="0" cy="0"/>
+          <a:chOff x="0" y="0"/>
+          <a:chExt cx="0" cy="0"/>
+        </a:xfrm>
+      </p:grpSpPr>
+      <p:sp>
+        <p:nvSpPr>
+          <p:cNvPr id="2" name="Slide Image Placeholder 1"/>
+          <p:cNvSpPr>
+            <a:spLocks noGrp="1" noRot="1" noChangeAspect="1"/>
+          </p:cNvSpPr>
+          <p:nvPr>
+            <p:ph type="sldImg"/>
+          </p:nvPr>
+        </p:nvSpPr>
+        <p:spPr/>
+      </p:sp>
+      <p:sp>
+        <p:nvSpPr>
+          <p:cNvPr id="3" name="Notes Placeholder 2"/>
+          <p:cNvSpPr>
+            <a:spLocks noGrp="1"/>
+          </p:cNvSpPr>
+          <p:nvPr>
+            <p:ph type="body" idx="1"/>
+          </p:nvPr>
+        </p:nvSpPr>
+        <p:spPr/>
+        <p:txBody>
+          <a:bodyPr/>
+          <a:lstStyle/>
+          <a:p>
+            <a:r>
+              <a:rPr lang="en-GB" dirty="0"/>
+              <a:t>The same force will be applied to each of the players turns to keep things symmetrical </a:t>
+            </a:r>
+          </a:p>
+        </p:txBody>
+      </p:sp>
+      <p:sp>
+        <p:nvSpPr>
+          <p:cNvPr id="4" name="Slide Number Placeholder 3"/>
+          <p:cNvSpPr>
+            <a:spLocks noGrp="1"/>
+          </p:cNvSpPr>
+          <p:nvPr>
+            <p:ph type="sldNum" sz="quarter" idx="10"/>
+          </p:nvPr>
+        </p:nvSpPr>
+        <p:spPr/>
+        <p:txBody>
+          <a:bodyPr/>
+          <a:lstStyle/>
+          <a:p>
+            <a:fld id="{0FA91835-90FF-41E4-AF94-16E4E0C00F06}" type="slidenum">
+              <a:rPr lang="en-GB" smtClean="0"/>
+              <a:t>13</a:t>
+            </a:fld>
+            <a:endParaRPr lang="en-GB"/>
+          </a:p>
+        </p:txBody>
+      </p:sp>
+    </p:spTree>
+    <p:extLst>
+      <p:ext uri="{BB962C8B-B14F-4D97-AF65-F5344CB8AC3E}">
+        <p14:creationId xmlns:p14="http://schemas.microsoft.com/office/powerpoint/2010/main" val="1484155728"/>
+      </p:ext>
+    </p:extLst>
+  </p:cSld>
+  <p:clrMapOvr>
+    <a:masterClrMapping/>
+  </p:clrMapOvr>
+</p:notes>
+</file>
+
+<file path=ppt/notesSlides/notesSlide12.xml><?xml version="1.0" encoding="utf-8"?>
+<p:notes xmlns:a="http://schemas.openxmlformats.org/drawingml/2006/main" xmlns:r="http://schemas.openxmlformats.org/officeDocument/2006/relationships" xmlns:p="http://schemas.openxmlformats.org/presentationml/2006/main">
+  <p:cSld>
+    <p:spTree>
+      <p:nvGrpSpPr>
+        <p:cNvPr id="1" name=""/>
+        <p:cNvGrpSpPr/>
+        <p:nvPr/>
+      </p:nvGrpSpPr>
+      <p:grpSpPr>
+        <a:xfrm>
+          <a:off x="0" y="0"/>
+          <a:ext cx="0" cy="0"/>
+          <a:chOff x="0" y="0"/>
+          <a:chExt cx="0" cy="0"/>
+        </a:xfrm>
+      </p:grpSpPr>
+      <p:sp>
+        <p:nvSpPr>
+          <p:cNvPr id="2" name="Slide Image Placeholder 1"/>
+          <p:cNvSpPr>
+            <a:spLocks noGrp="1" noRot="1" noChangeAspect="1"/>
+          </p:cNvSpPr>
+          <p:nvPr>
+            <p:ph type="sldImg"/>
+          </p:nvPr>
+        </p:nvSpPr>
+        <p:spPr/>
+      </p:sp>
+      <p:sp>
+        <p:nvSpPr>
+          <p:cNvPr id="3" name="Notes Placeholder 2"/>
+          <p:cNvSpPr>
+            <a:spLocks noGrp="1"/>
+          </p:cNvSpPr>
+          <p:nvPr>
+            <p:ph type="body" idx="1"/>
+          </p:nvPr>
+        </p:nvSpPr>
+        <p:spPr/>
+        <p:txBody>
+          <a:bodyPr/>
+          <a:lstStyle/>
+          <a:p>
+            <a:pPr marL="0" marR="0" lvl="0" indent="0" algn="l" defTabSz="914400" rtl="0" eaLnBrk="1" fontAlgn="auto" latinLnBrk="0" hangingPunct="1">
+              <a:lnSpc>
+                <a:spcPct val="100000"/>
+              </a:lnSpc>
+              <a:spcBef>
+                <a:spcPts val="0"/>
+              </a:spcBef>
+              <a:spcAft>
+                <a:spcPts val="0"/>
+              </a:spcAft>
+              <a:buClrTx/>
+              <a:buSzTx/>
+              <a:buFontTx/>
+              <a:buNone/>
+              <a:tabLst/>
+              <a:defRPr/>
+            </a:pPr>
+            <a:r>
+              <a:rPr lang="en-GB" dirty="0"/>
+              <a:t>The same force will be applied to each of the players turns to keep things symmetrical </a:t>
+            </a:r>
+          </a:p>
+          <a:p>
+            <a:endParaRPr lang="en-GB" dirty="0"/>
+          </a:p>
+        </p:txBody>
+      </p:sp>
+      <p:sp>
+        <p:nvSpPr>
+          <p:cNvPr id="4" name="Slide Number Placeholder 3"/>
+          <p:cNvSpPr>
+            <a:spLocks noGrp="1"/>
+          </p:cNvSpPr>
+          <p:nvPr>
+            <p:ph type="sldNum" sz="quarter" idx="10"/>
+          </p:nvPr>
+        </p:nvSpPr>
+        <p:spPr/>
+        <p:txBody>
+          <a:bodyPr/>
+          <a:lstStyle/>
+          <a:p>
+            <a:fld id="{0FA91835-90FF-41E4-AF94-16E4E0C00F06}" type="slidenum">
+              <a:rPr lang="en-GB" smtClean="0"/>
+              <a:t>14</a:t>
+            </a:fld>
+            <a:endParaRPr lang="en-GB"/>
+          </a:p>
+        </p:txBody>
+      </p:sp>
+    </p:spTree>
+    <p:extLst>
+      <p:ext uri="{BB962C8B-B14F-4D97-AF65-F5344CB8AC3E}">
+        <p14:creationId xmlns:p14="http://schemas.microsoft.com/office/powerpoint/2010/main" val="370727118"/>
+      </p:ext>
+    </p:extLst>
+  </p:cSld>
+  <p:clrMapOvr>
+    <a:masterClrMapping/>
+  </p:clrMapOvr>
+</p:notes>
+</file>
+
+<file path=ppt/notesSlides/notesSlide13.xml><?xml version="1.0" encoding="utf-8"?>
+<p:notes xmlns:a="http://schemas.openxmlformats.org/drawingml/2006/main" xmlns:r="http://schemas.openxmlformats.org/officeDocument/2006/relationships" xmlns:p="http://schemas.openxmlformats.org/presentationml/2006/main">
+  <p:cSld>
+    <p:spTree>
+      <p:nvGrpSpPr>
+        <p:cNvPr id="1" name=""/>
+        <p:cNvGrpSpPr/>
+        <p:nvPr/>
+      </p:nvGrpSpPr>
+      <p:grpSpPr>
+        <a:xfrm>
+          <a:off x="0" y="0"/>
+          <a:ext cx="0" cy="0"/>
+          <a:chOff x="0" y="0"/>
+          <a:chExt cx="0" cy="0"/>
+        </a:xfrm>
+      </p:grpSpPr>
+      <p:sp>
+        <p:nvSpPr>
+          <p:cNvPr id="2" name="Slide Image Placeholder 1"/>
+          <p:cNvSpPr>
+            <a:spLocks noGrp="1" noRot="1" noChangeAspect="1"/>
+          </p:cNvSpPr>
+          <p:nvPr>
+            <p:ph type="sldImg"/>
+          </p:nvPr>
+        </p:nvSpPr>
+        <p:spPr/>
+      </p:sp>
+      <p:sp>
+        <p:nvSpPr>
+          <p:cNvPr id="3" name="Notes Placeholder 2"/>
+          <p:cNvSpPr>
+            <a:spLocks noGrp="1"/>
+          </p:cNvSpPr>
+          <p:nvPr>
+            <p:ph type="body" idx="1"/>
+          </p:nvPr>
+        </p:nvSpPr>
+        <p:spPr/>
+        <p:txBody>
+          <a:bodyPr/>
+          <a:lstStyle/>
+          <a:p>
+            <a:r>
+              <a:rPr lang="en-GB" dirty="0"/>
+              <a:t>Toby</a:t>
+            </a:r>
+          </a:p>
+        </p:txBody>
+      </p:sp>
+      <p:sp>
+        <p:nvSpPr>
+          <p:cNvPr id="4" name="Slide Number Placeholder 3"/>
+          <p:cNvSpPr>
+            <a:spLocks noGrp="1"/>
+          </p:cNvSpPr>
+          <p:nvPr>
+            <p:ph type="sldNum" sz="quarter" idx="10"/>
+          </p:nvPr>
+        </p:nvSpPr>
+        <p:spPr/>
+        <p:txBody>
+          <a:bodyPr/>
+          <a:lstStyle/>
+          <a:p>
+            <a:fld id="{0FA91835-90FF-41E4-AF94-16E4E0C00F06}" type="slidenum">
+              <a:rPr lang="en-GB" smtClean="0"/>
+              <a:t>15</a:t>
+            </a:fld>
+            <a:endParaRPr lang="en-GB"/>
+          </a:p>
+        </p:txBody>
+      </p:sp>
+    </p:spTree>
+    <p:extLst>
+      <p:ext uri="{BB962C8B-B14F-4D97-AF65-F5344CB8AC3E}">
+        <p14:creationId xmlns:p14="http://schemas.microsoft.com/office/powerpoint/2010/main" val="905025154"/>
+      </p:ext>
+    </p:extLst>
+  </p:cSld>
+  <p:clrMapOvr>
+    <a:masterClrMapping/>
+  </p:clrMapOvr>
+</p:notes>
+</file>
+
+<file path=ppt/notesSlides/notesSlide14.xml><?xml version="1.0" encoding="utf-8"?>
+<p:notes xmlns:a="http://schemas.openxmlformats.org/drawingml/2006/main" xmlns:r="http://schemas.openxmlformats.org/officeDocument/2006/relationships" xmlns:p="http://schemas.openxmlformats.org/presentationml/2006/main">
+  <p:cSld>
+    <p:spTree>
+      <p:nvGrpSpPr>
+        <p:cNvPr id="1" name=""/>
+        <p:cNvGrpSpPr/>
+        <p:nvPr/>
+      </p:nvGrpSpPr>
+      <p:grpSpPr>
+        <a:xfrm>
+          <a:off x="0" y="0"/>
+          <a:ext cx="0" cy="0"/>
+          <a:chOff x="0" y="0"/>
+          <a:chExt cx="0" cy="0"/>
+        </a:xfrm>
+      </p:grpSpPr>
+      <p:sp>
+        <p:nvSpPr>
+          <p:cNvPr id="2" name="Slide Image Placeholder 1"/>
+          <p:cNvSpPr>
+            <a:spLocks noGrp="1" noRot="1" noChangeAspect="1"/>
+          </p:cNvSpPr>
+          <p:nvPr>
+            <p:ph type="sldImg"/>
+          </p:nvPr>
+        </p:nvSpPr>
+        <p:spPr/>
+      </p:sp>
+      <p:sp>
+        <p:nvSpPr>
+          <p:cNvPr id="3" name="Notes Placeholder 2"/>
+          <p:cNvSpPr>
+            <a:spLocks noGrp="1"/>
+          </p:cNvSpPr>
+          <p:nvPr>
+            <p:ph type="body" idx="1"/>
+          </p:nvPr>
+        </p:nvSpPr>
+        <p:spPr/>
+        <p:txBody>
+          <a:bodyPr/>
+          <a:lstStyle/>
+          <a:p>
+            <a:r>
+              <a:rPr lang="en-GB" dirty="0"/>
+              <a:t>Ethan</a:t>
+            </a:r>
+          </a:p>
+        </p:txBody>
+      </p:sp>
+      <p:sp>
+        <p:nvSpPr>
+          <p:cNvPr id="4" name="Slide Number Placeholder 3"/>
+          <p:cNvSpPr>
+            <a:spLocks noGrp="1"/>
+          </p:cNvSpPr>
+          <p:nvPr>
+            <p:ph type="sldNum" sz="quarter" idx="10"/>
+          </p:nvPr>
+        </p:nvSpPr>
+        <p:spPr/>
+        <p:txBody>
+          <a:bodyPr/>
+          <a:lstStyle/>
+          <a:p>
+            <a:fld id="{0FA91835-90FF-41E4-AF94-16E4E0C00F06}" type="slidenum">
+              <a:rPr lang="en-GB" smtClean="0"/>
+              <a:t>16</a:t>
+            </a:fld>
+            <a:endParaRPr lang="en-GB"/>
+          </a:p>
+        </p:txBody>
+      </p:sp>
+    </p:spTree>
+    <p:extLst>
+      <p:ext uri="{BB962C8B-B14F-4D97-AF65-F5344CB8AC3E}">
+        <p14:creationId xmlns:p14="http://schemas.microsoft.com/office/powerpoint/2010/main" val="4242832113"/>
+      </p:ext>
+    </p:extLst>
+  </p:cSld>
+  <p:clrMapOvr>
+    <a:masterClrMapping/>
+  </p:clrMapOvr>
+</p:notes>
+</file>
+
+<file path=ppt/notesSlides/notesSlide15.xml><?xml version="1.0" encoding="utf-8"?>
+<p:notes xmlns:a="http://schemas.openxmlformats.org/drawingml/2006/main" xmlns:r="http://schemas.openxmlformats.org/officeDocument/2006/relationships" xmlns:p="http://schemas.openxmlformats.org/presentationml/2006/main">
+  <p:cSld>
+    <p:spTree>
+      <p:nvGrpSpPr>
+        <p:cNvPr id="1" name=""/>
+        <p:cNvGrpSpPr/>
+        <p:nvPr/>
+      </p:nvGrpSpPr>
+      <p:grpSpPr>
+        <a:xfrm>
+          <a:off x="0" y="0"/>
+          <a:ext cx="0" cy="0"/>
+          <a:chOff x="0" y="0"/>
+          <a:chExt cx="0" cy="0"/>
+        </a:xfrm>
+      </p:grpSpPr>
+      <p:sp>
+        <p:nvSpPr>
+          <p:cNvPr id="2" name="Slide Image Placeholder 1"/>
+          <p:cNvSpPr>
+            <a:spLocks noGrp="1" noRot="1" noChangeAspect="1"/>
+          </p:cNvSpPr>
+          <p:nvPr>
+            <p:ph type="sldImg"/>
+          </p:nvPr>
+        </p:nvSpPr>
+        <p:spPr/>
+      </p:sp>
+      <p:sp>
+        <p:nvSpPr>
+          <p:cNvPr id="3" name="Notes Placeholder 2"/>
+          <p:cNvSpPr>
+            <a:spLocks noGrp="1"/>
+          </p:cNvSpPr>
+          <p:nvPr>
+            <p:ph type="body" idx="1"/>
+          </p:nvPr>
+        </p:nvSpPr>
+        <p:spPr/>
+        <p:txBody>
+          <a:bodyPr/>
+          <a:lstStyle/>
+          <a:p>
+            <a:endParaRPr lang="en-GB" dirty="0"/>
+          </a:p>
+        </p:txBody>
+      </p:sp>
+      <p:sp>
+        <p:nvSpPr>
+          <p:cNvPr id="4" name="Slide Number Placeholder 3"/>
+          <p:cNvSpPr>
+            <a:spLocks noGrp="1"/>
+          </p:cNvSpPr>
+          <p:nvPr>
+            <p:ph type="sldNum" sz="quarter" idx="10"/>
+          </p:nvPr>
+        </p:nvSpPr>
+        <p:spPr/>
+        <p:txBody>
+          <a:bodyPr/>
+          <a:lstStyle/>
+          <a:p>
+            <a:fld id="{0FA91835-90FF-41E4-AF94-16E4E0C00F06}" type="slidenum">
+              <a:rPr lang="en-GB" smtClean="0"/>
+              <a:t>17</a:t>
+            </a:fld>
+            <a:endParaRPr lang="en-GB"/>
+          </a:p>
+        </p:txBody>
+      </p:sp>
+    </p:spTree>
+    <p:extLst>
+      <p:ext uri="{BB962C8B-B14F-4D97-AF65-F5344CB8AC3E}">
+        <p14:creationId xmlns:p14="http://schemas.microsoft.com/office/powerpoint/2010/main" val="3745858853"/>
       </p:ext>
     </p:extLst>
   </p:cSld>
@@ -616,9 +1158,10 @@
           <a:lstStyle/>
           <a:p>
             <a:r>
-              <a:rPr lang="en-GB" dirty="0"/>
-              <a:t>https://play.google.com/store/apps/details?id=com.shareddreams.twelveminibattles&amp;hl=en</a:t>
-            </a:r>
+              <a:rPr lang="en-GB" dirty="0" err="1"/>
+              <a:t>Petrut</a:t>
+            </a:r>
+            <a:endParaRPr lang="en-GB" dirty="0"/>
           </a:p>
         </p:txBody>
       </p:sp>
@@ -639,7 +1182,7 @@
           <a:p>
             <a:fld id="{0FA91835-90FF-41E4-AF94-16E4E0C00F06}" type="slidenum">
               <a:rPr lang="en-GB" smtClean="0"/>
-              <a:t>6</a:t>
+              <a:t>3</a:t>
             </a:fld>
             <a:endParaRPr lang="en-GB"/>
           </a:p>
@@ -648,7 +1191,7 @@
     </p:spTree>
     <p:extLst>
       <p:ext uri="{BB962C8B-B14F-4D97-AF65-F5344CB8AC3E}">
-        <p14:creationId xmlns:p14="http://schemas.microsoft.com/office/powerpoint/2010/main" val="805180551"/>
+        <p14:creationId xmlns:p14="http://schemas.microsoft.com/office/powerpoint/2010/main" val="1068557225"/>
       </p:ext>
     </p:extLst>
   </p:cSld>
@@ -702,7 +1245,10 @@
           <a:bodyPr/>
           <a:lstStyle/>
           <a:p>
-            <a:endParaRPr lang="en-GB" dirty="0"/>
+            <a:r>
+              <a:rPr lang="en-GB" dirty="0"/>
+              <a:t>Mircea</a:t>
+            </a:r>
           </a:p>
         </p:txBody>
       </p:sp>
@@ -723,7 +1269,7 @@
           <a:p>
             <a:fld id="{0FA91835-90FF-41E4-AF94-16E4E0C00F06}" type="slidenum">
               <a:rPr lang="en-GB" smtClean="0"/>
-              <a:t>8</a:t>
+              <a:t>4</a:t>
             </a:fld>
             <a:endParaRPr lang="en-GB"/>
           </a:p>
@@ -732,7 +1278,7 @@
     </p:spTree>
     <p:extLst>
       <p:ext uri="{BB962C8B-B14F-4D97-AF65-F5344CB8AC3E}">
-        <p14:creationId xmlns:p14="http://schemas.microsoft.com/office/powerpoint/2010/main" val="272035921"/>
+        <p14:creationId xmlns:p14="http://schemas.microsoft.com/office/powerpoint/2010/main" val="3540953826"/>
       </p:ext>
     </p:extLst>
   </p:cSld>
@@ -788,8 +1334,15 @@
           <a:p>
             <a:r>
               <a:rPr lang="en-GB" dirty="0"/>
-              <a:t>On some turns there will be wind that can affect the projectile. to make sure that this is fair for each player, the same force will be applied for both shots.</a:t>
-            </a:r>
+              <a:t>https://play.google.com/store/apps/details?id=com.shareddreams.twelveminibattles&amp;hl=en</a:t>
+            </a:r>
+          </a:p>
+          <a:p>
+            <a:r>
+              <a:rPr lang="en-GB" dirty="0" err="1"/>
+              <a:t>Petrut</a:t>
+            </a:r>
+            <a:endParaRPr lang="en-GB" dirty="0"/>
           </a:p>
         </p:txBody>
       </p:sp>
@@ -810,7 +1363,7 @@
           <a:p>
             <a:fld id="{0FA91835-90FF-41E4-AF94-16E4E0C00F06}" type="slidenum">
               <a:rPr lang="en-GB" smtClean="0"/>
-              <a:t>15</a:t>
+              <a:t>5</a:t>
             </a:fld>
             <a:endParaRPr lang="en-GB"/>
           </a:p>
@@ -819,7 +1372,7 @@
     </p:spTree>
     <p:extLst>
       <p:ext uri="{BB962C8B-B14F-4D97-AF65-F5344CB8AC3E}">
-        <p14:creationId xmlns:p14="http://schemas.microsoft.com/office/powerpoint/2010/main" val="280356946"/>
+        <p14:creationId xmlns:p14="http://schemas.microsoft.com/office/powerpoint/2010/main" val="3054193152"/>
       </p:ext>
     </p:extLst>
   </p:cSld>
@@ -875,8 +1428,35 @@
           <a:p>
             <a:r>
               <a:rPr lang="en-GB" dirty="0"/>
-              <a:t>The same force will be applied to each of the players turns to keep things symmetrical </a:t>
-            </a:r>
+              <a:t>https://play.google.com/store/apps/details?id=com.shareddreams.twelveminibattles&amp;hl=en</a:t>
+            </a:r>
+          </a:p>
+          <a:p>
+            <a:pPr marL="0" marR="0" lvl="0" indent="0" algn="l" defTabSz="914400" rtl="0" eaLnBrk="1" fontAlgn="auto" latinLnBrk="0" hangingPunct="1">
+              <a:lnSpc>
+                <a:spcPct val="100000"/>
+              </a:lnSpc>
+              <a:spcBef>
+                <a:spcPts val="0"/>
+              </a:spcBef>
+              <a:spcAft>
+                <a:spcPts val="0"/>
+              </a:spcAft>
+              <a:buClrTx/>
+              <a:buSzTx/>
+              <a:buFontTx/>
+              <a:buNone/>
+              <a:tabLst/>
+              <a:defRPr/>
+            </a:pPr>
+            <a:r>
+              <a:rPr lang="en-GB" dirty="0" err="1"/>
+              <a:t>Petrut</a:t>
+            </a:r>
+            <a:endParaRPr lang="en-GB" dirty="0"/>
+          </a:p>
+          <a:p>
+            <a:endParaRPr lang="en-GB" dirty="0"/>
           </a:p>
         </p:txBody>
       </p:sp>
@@ -897,7 +1477,7 @@
           <a:p>
             <a:fld id="{0FA91835-90FF-41E4-AF94-16E4E0C00F06}" type="slidenum">
               <a:rPr lang="en-GB" smtClean="0"/>
-              <a:t>16</a:t>
+              <a:t>6</a:t>
             </a:fld>
             <a:endParaRPr lang="en-GB"/>
           </a:p>
@@ -906,7 +1486,7 @@
     </p:spTree>
     <p:extLst>
       <p:ext uri="{BB962C8B-B14F-4D97-AF65-F5344CB8AC3E}">
-        <p14:creationId xmlns:p14="http://schemas.microsoft.com/office/powerpoint/2010/main" val="1484155728"/>
+        <p14:creationId xmlns:p14="http://schemas.microsoft.com/office/powerpoint/2010/main" val="805180551"/>
       </p:ext>
     </p:extLst>
   </p:cSld>
@@ -960,6 +1540,93 @@
           <a:bodyPr/>
           <a:lstStyle/>
           <a:p>
+            <a:r>
+              <a:rPr lang="en-GB" dirty="0"/>
+              <a:t>Toby</a:t>
+            </a:r>
+          </a:p>
+        </p:txBody>
+      </p:sp>
+      <p:sp>
+        <p:nvSpPr>
+          <p:cNvPr id="4" name="Slide Number Placeholder 3"/>
+          <p:cNvSpPr>
+            <a:spLocks noGrp="1"/>
+          </p:cNvSpPr>
+          <p:nvPr>
+            <p:ph type="sldNum" sz="quarter" idx="10"/>
+          </p:nvPr>
+        </p:nvSpPr>
+        <p:spPr/>
+        <p:txBody>
+          <a:bodyPr/>
+          <a:lstStyle/>
+          <a:p>
+            <a:fld id="{0FA91835-90FF-41E4-AF94-16E4E0C00F06}" type="slidenum">
+              <a:rPr lang="en-GB" smtClean="0"/>
+              <a:t>7</a:t>
+            </a:fld>
+            <a:endParaRPr lang="en-GB"/>
+          </a:p>
+        </p:txBody>
+      </p:sp>
+    </p:spTree>
+    <p:extLst>
+      <p:ext uri="{BB962C8B-B14F-4D97-AF65-F5344CB8AC3E}">
+        <p14:creationId xmlns:p14="http://schemas.microsoft.com/office/powerpoint/2010/main" val="1866813804"/>
+      </p:ext>
+    </p:extLst>
+  </p:cSld>
+  <p:clrMapOvr>
+    <a:masterClrMapping/>
+  </p:clrMapOvr>
+</p:notes>
+</file>
+
+<file path=ppt/notesSlides/notesSlide7.xml><?xml version="1.0" encoding="utf-8"?>
+<p:notes xmlns:a="http://schemas.openxmlformats.org/drawingml/2006/main" xmlns:r="http://schemas.openxmlformats.org/officeDocument/2006/relationships" xmlns:p="http://schemas.openxmlformats.org/presentationml/2006/main">
+  <p:cSld>
+    <p:spTree>
+      <p:nvGrpSpPr>
+        <p:cNvPr id="1" name=""/>
+        <p:cNvGrpSpPr/>
+        <p:nvPr/>
+      </p:nvGrpSpPr>
+      <p:grpSpPr>
+        <a:xfrm>
+          <a:off x="0" y="0"/>
+          <a:ext cx="0" cy="0"/>
+          <a:chOff x="0" y="0"/>
+          <a:chExt cx="0" cy="0"/>
+        </a:xfrm>
+      </p:grpSpPr>
+      <p:sp>
+        <p:nvSpPr>
+          <p:cNvPr id="2" name="Slide Image Placeholder 1"/>
+          <p:cNvSpPr>
+            <a:spLocks noGrp="1" noRot="1" noChangeAspect="1"/>
+          </p:cNvSpPr>
+          <p:nvPr>
+            <p:ph type="sldImg"/>
+          </p:nvPr>
+        </p:nvSpPr>
+        <p:spPr/>
+      </p:sp>
+      <p:sp>
+        <p:nvSpPr>
+          <p:cNvPr id="3" name="Notes Placeholder 2"/>
+          <p:cNvSpPr>
+            <a:spLocks noGrp="1"/>
+          </p:cNvSpPr>
+          <p:nvPr>
+            <p:ph type="body" idx="1"/>
+          </p:nvPr>
+        </p:nvSpPr>
+        <p:spPr/>
+        <p:txBody>
+          <a:bodyPr/>
+          <a:lstStyle/>
+          <a:p>
             <a:pPr marL="0" marR="0" lvl="0" indent="0" algn="l" defTabSz="914400" rtl="0" eaLnBrk="1" fontAlgn="auto" latinLnBrk="0" hangingPunct="1">
               <a:lnSpc>
                 <a:spcPct val="100000"/>
@@ -979,7 +1646,7 @@
             </a:pPr>
             <a:r>
               <a:rPr lang="en-GB" dirty="0"/>
-              <a:t>The same force will be applied to each of the players turns to keep things symmetrical </a:t>
+              <a:t>Mircea</a:t>
             </a:r>
           </a:p>
           <a:p>
@@ -1004,7 +1671,7 @@
           <a:p>
             <a:fld id="{0FA91835-90FF-41E4-AF94-16E4E0C00F06}" type="slidenum">
               <a:rPr lang="en-GB" smtClean="0"/>
-              <a:t>17</a:t>
+              <a:t>8</a:t>
             </a:fld>
             <a:endParaRPr lang="en-GB"/>
           </a:p>
@@ -1013,7 +1680,199 @@
     </p:spTree>
     <p:extLst>
       <p:ext uri="{BB962C8B-B14F-4D97-AF65-F5344CB8AC3E}">
-        <p14:creationId xmlns:p14="http://schemas.microsoft.com/office/powerpoint/2010/main" val="370727118"/>
+        <p14:creationId xmlns:p14="http://schemas.microsoft.com/office/powerpoint/2010/main" val="272035921"/>
+      </p:ext>
+    </p:extLst>
+  </p:cSld>
+  <p:clrMapOvr>
+    <a:masterClrMapping/>
+  </p:clrMapOvr>
+</p:notes>
+</file>
+
+<file path=ppt/notesSlides/notesSlide8.xml><?xml version="1.0" encoding="utf-8"?>
+<p:notes xmlns:a="http://schemas.openxmlformats.org/drawingml/2006/main" xmlns:r="http://schemas.openxmlformats.org/officeDocument/2006/relationships" xmlns:p="http://schemas.openxmlformats.org/presentationml/2006/main">
+  <p:cSld>
+    <p:spTree>
+      <p:nvGrpSpPr>
+        <p:cNvPr id="1" name=""/>
+        <p:cNvGrpSpPr/>
+        <p:nvPr/>
+      </p:nvGrpSpPr>
+      <p:grpSpPr>
+        <a:xfrm>
+          <a:off x="0" y="0"/>
+          <a:ext cx="0" cy="0"/>
+          <a:chOff x="0" y="0"/>
+          <a:chExt cx="0" cy="0"/>
+        </a:xfrm>
+      </p:grpSpPr>
+      <p:sp>
+        <p:nvSpPr>
+          <p:cNvPr id="2" name="Slide Image Placeholder 1"/>
+          <p:cNvSpPr>
+            <a:spLocks noGrp="1" noRot="1" noChangeAspect="1"/>
+          </p:cNvSpPr>
+          <p:nvPr>
+            <p:ph type="sldImg"/>
+          </p:nvPr>
+        </p:nvSpPr>
+        <p:spPr/>
+      </p:sp>
+      <p:sp>
+        <p:nvSpPr>
+          <p:cNvPr id="3" name="Notes Placeholder 2"/>
+          <p:cNvSpPr>
+            <a:spLocks noGrp="1"/>
+          </p:cNvSpPr>
+          <p:nvPr>
+            <p:ph type="body" idx="1"/>
+          </p:nvPr>
+        </p:nvSpPr>
+        <p:spPr/>
+        <p:txBody>
+          <a:bodyPr/>
+          <a:lstStyle/>
+          <a:p>
+            <a:pPr marL="0" marR="0" lvl="0" indent="0" algn="l" defTabSz="914400" rtl="0" eaLnBrk="1" fontAlgn="auto" latinLnBrk="0" hangingPunct="1">
+              <a:lnSpc>
+                <a:spcPct val="100000"/>
+              </a:lnSpc>
+              <a:spcBef>
+                <a:spcPts val="0"/>
+              </a:spcBef>
+              <a:spcAft>
+                <a:spcPts val="0"/>
+              </a:spcAft>
+              <a:buClrTx/>
+              <a:buSzTx/>
+              <a:buFontTx/>
+              <a:buNone/>
+              <a:tabLst/>
+              <a:defRPr/>
+            </a:pPr>
+            <a:r>
+              <a:rPr lang="en-GB" dirty="0" err="1"/>
+              <a:t>EThan</a:t>
+            </a:r>
+            <a:endParaRPr lang="en-GB" dirty="0"/>
+          </a:p>
+        </p:txBody>
+      </p:sp>
+      <p:sp>
+        <p:nvSpPr>
+          <p:cNvPr id="4" name="Slide Number Placeholder 3"/>
+          <p:cNvSpPr>
+            <a:spLocks noGrp="1"/>
+          </p:cNvSpPr>
+          <p:nvPr>
+            <p:ph type="sldNum" sz="quarter" idx="10"/>
+          </p:nvPr>
+        </p:nvSpPr>
+        <p:spPr/>
+        <p:txBody>
+          <a:bodyPr/>
+          <a:lstStyle/>
+          <a:p>
+            <a:fld id="{0FA91835-90FF-41E4-AF94-16E4E0C00F06}" type="slidenum">
+              <a:rPr lang="en-GB" smtClean="0"/>
+              <a:t>9</a:t>
+            </a:fld>
+            <a:endParaRPr lang="en-GB"/>
+          </a:p>
+        </p:txBody>
+      </p:sp>
+    </p:spTree>
+    <p:extLst>
+      <p:ext uri="{BB962C8B-B14F-4D97-AF65-F5344CB8AC3E}">
+        <p14:creationId xmlns:p14="http://schemas.microsoft.com/office/powerpoint/2010/main" val="795810138"/>
+      </p:ext>
+    </p:extLst>
+  </p:cSld>
+  <p:clrMapOvr>
+    <a:masterClrMapping/>
+  </p:clrMapOvr>
+</p:notes>
+</file>
+
+<file path=ppt/notesSlides/notesSlide9.xml><?xml version="1.0" encoding="utf-8"?>
+<p:notes xmlns:a="http://schemas.openxmlformats.org/drawingml/2006/main" xmlns:r="http://schemas.openxmlformats.org/officeDocument/2006/relationships" xmlns:p="http://schemas.openxmlformats.org/presentationml/2006/main">
+  <p:cSld>
+    <p:spTree>
+      <p:nvGrpSpPr>
+        <p:cNvPr id="1" name=""/>
+        <p:cNvGrpSpPr/>
+        <p:nvPr/>
+      </p:nvGrpSpPr>
+      <p:grpSpPr>
+        <a:xfrm>
+          <a:off x="0" y="0"/>
+          <a:ext cx="0" cy="0"/>
+          <a:chOff x="0" y="0"/>
+          <a:chExt cx="0" cy="0"/>
+        </a:xfrm>
+      </p:grpSpPr>
+      <p:sp>
+        <p:nvSpPr>
+          <p:cNvPr id="2" name="Slide Image Placeholder 1"/>
+          <p:cNvSpPr>
+            <a:spLocks noGrp="1" noRot="1" noChangeAspect="1"/>
+          </p:cNvSpPr>
+          <p:nvPr>
+            <p:ph type="sldImg"/>
+          </p:nvPr>
+        </p:nvSpPr>
+        <p:spPr/>
+      </p:sp>
+      <p:sp>
+        <p:nvSpPr>
+          <p:cNvPr id="3" name="Notes Placeholder 2"/>
+          <p:cNvSpPr>
+            <a:spLocks noGrp="1"/>
+          </p:cNvSpPr>
+          <p:nvPr>
+            <p:ph type="body" idx="1"/>
+          </p:nvPr>
+        </p:nvSpPr>
+        <p:spPr/>
+        <p:txBody>
+          <a:bodyPr/>
+          <a:lstStyle/>
+          <a:p>
+            <a:r>
+              <a:rPr lang="en-GB" dirty="0"/>
+              <a:t>Ethan</a:t>
+            </a:r>
+          </a:p>
+        </p:txBody>
+      </p:sp>
+      <p:sp>
+        <p:nvSpPr>
+          <p:cNvPr id="4" name="Slide Number Placeholder 3"/>
+          <p:cNvSpPr>
+            <a:spLocks noGrp="1"/>
+          </p:cNvSpPr>
+          <p:nvPr>
+            <p:ph type="sldNum" sz="quarter" idx="10"/>
+          </p:nvPr>
+        </p:nvSpPr>
+        <p:spPr/>
+        <p:txBody>
+          <a:bodyPr/>
+          <a:lstStyle/>
+          <a:p>
+            <a:fld id="{0FA91835-90FF-41E4-AF94-16E4E0C00F06}" type="slidenum">
+              <a:rPr lang="en-GB" smtClean="0"/>
+              <a:t>11</a:t>
+            </a:fld>
+            <a:endParaRPr lang="en-GB"/>
+          </a:p>
+        </p:txBody>
+      </p:sp>
+    </p:spTree>
+    <p:extLst>
+      <p:ext uri="{BB962C8B-B14F-4D97-AF65-F5344CB8AC3E}">
+        <p14:creationId xmlns:p14="http://schemas.microsoft.com/office/powerpoint/2010/main" val="2733958749"/>
       </p:ext>
     </p:extLst>
   </p:cSld>
@@ -8106,14 +8965,139 @@
         </p:blipFill>
         <p:spPr>
           <a:xfrm>
-            <a:off x="2379008" y="2081213"/>
-            <a:ext cx="7433984" cy="4195762"/>
+            <a:off x="619614" y="1229458"/>
+            <a:ext cx="4728858" cy="2668981"/>
           </a:xfrm>
           <a:prstGeom prst="rect">
             <a:avLst/>
           </a:prstGeom>
         </p:spPr>
       </p:pic>
+      <p:pic>
+        <p:nvPicPr>
+          <p:cNvPr id="5" name="Content Placeholder 3">
+            <a:extLst>
+              <a:ext uri="{FF2B5EF4-FFF2-40B4-BE49-F238E27FC236}">
+                <a16:creationId xmlns:a16="http://schemas.microsoft.com/office/drawing/2014/main" id="{A8AC8656-3B99-4ED0-9F7C-E2C678FF49E7}"/>
+              </a:ext>
+            </a:extLst>
+          </p:cNvPr>
+          <p:cNvPicPr>
+            <a:picLocks noChangeAspect="1"/>
+          </p:cNvPicPr>
+          <p:nvPr/>
+        </p:nvPicPr>
+        <p:blipFill>
+          <a:blip r:embed="rId3"/>
+          <a:stretch>
+            <a:fillRect/>
+          </a:stretch>
+        </p:blipFill>
+        <p:spPr>
+          <a:xfrm>
+            <a:off x="6744804" y="4105929"/>
+            <a:ext cx="4732822" cy="2661516"/>
+          </a:xfrm>
+          <a:prstGeom prst="rect">
+            <a:avLst/>
+          </a:prstGeom>
+        </p:spPr>
+      </p:pic>
+      <p:pic>
+        <p:nvPicPr>
+          <p:cNvPr id="6" name="Content Placeholder 3">
+            <a:extLst>
+              <a:ext uri="{FF2B5EF4-FFF2-40B4-BE49-F238E27FC236}">
+                <a16:creationId xmlns:a16="http://schemas.microsoft.com/office/drawing/2014/main" id="{E586A938-39D1-4934-A208-E2936737DE0C}"/>
+              </a:ext>
+            </a:extLst>
+          </p:cNvPr>
+          <p:cNvPicPr>
+            <a:picLocks noChangeAspect="1"/>
+          </p:cNvPicPr>
+          <p:nvPr/>
+        </p:nvPicPr>
+        <p:blipFill>
+          <a:blip r:embed="rId4"/>
+          <a:stretch>
+            <a:fillRect/>
+          </a:stretch>
+        </p:blipFill>
+        <p:spPr>
+          <a:xfrm>
+            <a:off x="657415" y="4105929"/>
+            <a:ext cx="4691057" cy="2626992"/>
+          </a:xfrm>
+          <a:prstGeom prst="rect">
+            <a:avLst/>
+          </a:prstGeom>
+        </p:spPr>
+      </p:pic>
+      <p:pic>
+        <p:nvPicPr>
+          <p:cNvPr id="7" name="Content Placeholder 3">
+            <a:extLst>
+              <a:ext uri="{FF2B5EF4-FFF2-40B4-BE49-F238E27FC236}">
+                <a16:creationId xmlns:a16="http://schemas.microsoft.com/office/drawing/2014/main" id="{29B3D841-9ECE-4544-8AFB-2F58D390E521}"/>
+              </a:ext>
+            </a:extLst>
+          </p:cNvPr>
+          <p:cNvPicPr>
+            <a:picLocks noChangeAspect="1"/>
+          </p:cNvPicPr>
+          <p:nvPr/>
+        </p:nvPicPr>
+        <p:blipFill>
+          <a:blip r:embed="rId5"/>
+          <a:stretch>
+            <a:fillRect/>
+          </a:stretch>
+        </p:blipFill>
+        <p:spPr>
+          <a:xfrm>
+            <a:off x="6718305" y="1223410"/>
+            <a:ext cx="4759321" cy="2675029"/>
+          </a:xfrm>
+          <a:prstGeom prst="rect">
+            <a:avLst/>
+          </a:prstGeom>
+        </p:spPr>
+      </p:pic>
+      <p:sp>
+        <p:nvSpPr>
+          <p:cNvPr id="8" name="TextBox 7">
+            <a:extLst>
+              <a:ext uri="{FF2B5EF4-FFF2-40B4-BE49-F238E27FC236}">
+                <a16:creationId xmlns:a16="http://schemas.microsoft.com/office/drawing/2014/main" id="{5F176211-7AF7-4E92-98D8-E07500765066}"/>
+              </a:ext>
+            </a:extLst>
+          </p:cNvPr>
+          <p:cNvSpPr txBox="1"/>
+          <p:nvPr/>
+        </p:nvSpPr>
+        <p:spPr>
+          <a:xfrm>
+            <a:off x="10610850" y="452718"/>
+            <a:ext cx="342900" cy="369332"/>
+          </a:xfrm>
+          <a:prstGeom prst="rect">
+            <a:avLst/>
+          </a:prstGeom>
+          <a:noFill/>
+        </p:spPr>
+        <p:txBody>
+          <a:bodyPr wrap="square" rtlCol="0">
+            <a:spAutoFit/>
+          </a:bodyPr>
+          <a:lstStyle/>
+          <a:p>
+            <a:r>
+              <a:rPr lang="en-GB" dirty="0"/>
+              <a:t>T</a:t>
+            </a:r>
+          </a:p>
+        </p:txBody>
+      </p:sp>
     </p:spTree>
     <p:extLst>
       <p:ext uri="{BB962C8B-B14F-4D97-AF65-F5344CB8AC3E}">
@@ -8149,7 +9133,7 @@
           <p:cNvPr id="2" name="Title 1">
             <a:extLst>
               <a:ext uri="{FF2B5EF4-FFF2-40B4-BE49-F238E27FC236}">
-                <a16:creationId xmlns:a16="http://schemas.microsoft.com/office/drawing/2014/main" id="{9EEAEEC4-2374-4C17-B795-21101D3DCD5C}"/>
+                <a16:creationId xmlns:a16="http://schemas.microsoft.com/office/drawing/2014/main" id="{B6FD9CEF-C4EB-4584-B49F-A02E873D6779}"/>
               </a:ext>
             </a:extLst>
           </p:cNvPr>
@@ -8167,47 +9151,96 @@
           <a:p>
             <a:r>
               <a:rPr lang="en-GB" dirty="0"/>
-              <a:t>Screen mock-up</a:t>
-            </a:r>
-          </a:p>
-        </p:txBody>
-      </p:sp>
-      <p:pic>
-        <p:nvPicPr>
-          <p:cNvPr id="4" name="Content Placeholder 3">
+              <a:t>First mechanic: Firing projectile</a:t>
+            </a:r>
+          </a:p>
+        </p:txBody>
+      </p:sp>
+      <p:sp>
+        <p:nvSpPr>
+          <p:cNvPr id="3" name="Content Placeholder 2">
             <a:extLst>
               <a:ext uri="{FF2B5EF4-FFF2-40B4-BE49-F238E27FC236}">
-                <a16:creationId xmlns:a16="http://schemas.microsoft.com/office/drawing/2014/main" id="{E5497657-B3DF-45BB-88DA-ADF7520E23D4}"/>
+                <a16:creationId xmlns:a16="http://schemas.microsoft.com/office/drawing/2014/main" id="{631A7050-10F3-4ED1-991E-B2AA17989DB6}"/>
               </a:ext>
             </a:extLst>
           </p:cNvPr>
-          <p:cNvPicPr>
-            <a:picLocks noGrp="1" noChangeAspect="1"/>
-          </p:cNvPicPr>
+          <p:cNvSpPr>
+            <a:spLocks noGrp="1"/>
+          </p:cNvSpPr>
           <p:nvPr>
             <p:ph idx="1"/>
           </p:nvPr>
-        </p:nvPicPr>
-        <p:blipFill>
-          <a:blip r:embed="rId2"/>
-          <a:stretch>
-            <a:fillRect/>
-          </a:stretch>
-        </p:blipFill>
+        </p:nvSpPr>
+        <p:spPr/>
+        <p:txBody>
+          <a:bodyPr/>
+          <a:lstStyle/>
+          <a:p>
+            <a:r>
+              <a:rPr lang="en-GB" dirty="0"/>
+              <a:t>The player will tap to set the position of the launcher</a:t>
+            </a:r>
+          </a:p>
+          <a:p>
+            <a:r>
+              <a:rPr lang="en-GB" dirty="0"/>
+              <a:t>The player will tap again to set the power of the shot</a:t>
+            </a:r>
+          </a:p>
+          <a:p>
+            <a:r>
+              <a:rPr lang="en-GB" dirty="0"/>
+              <a:t>The shot will lock in and then the other player will have their go</a:t>
+            </a:r>
+          </a:p>
+          <a:p>
+            <a:r>
+              <a:rPr lang="en-GB" dirty="0"/>
+              <a:t>When both players have aimed and set the power, both shots will go at the same time.</a:t>
+            </a:r>
+          </a:p>
+        </p:txBody>
+      </p:sp>
+      <p:sp>
+        <p:nvSpPr>
+          <p:cNvPr id="4" name="TextBox 3">
+            <a:extLst>
+              <a:ext uri="{FF2B5EF4-FFF2-40B4-BE49-F238E27FC236}">
+                <a16:creationId xmlns:a16="http://schemas.microsoft.com/office/drawing/2014/main" id="{F6E057A5-D628-4E7B-B7C3-E0DBA1EC1350}"/>
+              </a:ext>
+            </a:extLst>
+          </p:cNvPr>
+          <p:cNvSpPr txBox="1"/>
+          <p:nvPr/>
+        </p:nvSpPr>
         <p:spPr>
           <a:xfrm>
-            <a:off x="2365458" y="2081213"/>
-            <a:ext cx="7461083" cy="4195762"/>
+            <a:off x="10610850" y="452718"/>
+            <a:ext cx="342900" cy="369332"/>
           </a:xfrm>
           <a:prstGeom prst="rect">
             <a:avLst/>
           </a:prstGeom>
+          <a:noFill/>
         </p:spPr>
-      </p:pic>
+        <p:txBody>
+          <a:bodyPr wrap="square" rtlCol="0">
+            <a:spAutoFit/>
+          </a:bodyPr>
+          <a:lstStyle/>
+          <a:p>
+            <a:r>
+              <a:rPr lang="en-GB" dirty="0"/>
+              <a:t>M</a:t>
+            </a:r>
+          </a:p>
+        </p:txBody>
+      </p:sp>
     </p:spTree>
     <p:extLst>
       <p:ext uri="{BB962C8B-B14F-4D97-AF65-F5344CB8AC3E}">
-        <p14:creationId xmlns:p14="http://schemas.microsoft.com/office/powerpoint/2010/main" val="497770595"/>
+        <p14:creationId xmlns:p14="http://schemas.microsoft.com/office/powerpoint/2010/main" val="345086452"/>
       </p:ext>
     </p:extLst>
   </p:cSld>
@@ -8239,7 +9272,7 @@
           <p:cNvPr id="2" name="Title 1">
             <a:extLst>
               <a:ext uri="{FF2B5EF4-FFF2-40B4-BE49-F238E27FC236}">
-                <a16:creationId xmlns:a16="http://schemas.microsoft.com/office/drawing/2014/main" id="{F2FD2EC3-B22B-4B00-A4EB-A404B3A3C4B6}"/>
+                <a16:creationId xmlns:a16="http://schemas.microsoft.com/office/drawing/2014/main" id="{35615569-7527-4024-836A-239B8A2E3958}"/>
               </a:ext>
             </a:extLst>
           </p:cNvPr>
@@ -8257,47 +9290,84 @@
           <a:p>
             <a:r>
               <a:rPr lang="en-GB" dirty="0"/>
-              <a:t>Screen mock-up</a:t>
-            </a:r>
-          </a:p>
-        </p:txBody>
-      </p:sp>
-      <p:pic>
-        <p:nvPicPr>
-          <p:cNvPr id="4" name="Content Placeholder 3">
+              <a:t>Second mechanic: Wind</a:t>
+            </a:r>
+          </a:p>
+        </p:txBody>
+      </p:sp>
+      <p:sp>
+        <p:nvSpPr>
+          <p:cNvPr id="3" name="Content Placeholder 2">
             <a:extLst>
               <a:ext uri="{FF2B5EF4-FFF2-40B4-BE49-F238E27FC236}">
-                <a16:creationId xmlns:a16="http://schemas.microsoft.com/office/drawing/2014/main" id="{7BABCD96-C056-4C62-A05E-02FA804B599F}"/>
+                <a16:creationId xmlns:a16="http://schemas.microsoft.com/office/drawing/2014/main" id="{99B53FEC-9E9A-4924-B6E3-24FF878B896D}"/>
               </a:ext>
             </a:extLst>
           </p:cNvPr>
-          <p:cNvPicPr>
-            <a:picLocks noGrp="1" noChangeAspect="1"/>
-          </p:cNvPicPr>
+          <p:cNvSpPr>
+            <a:spLocks noGrp="1"/>
+          </p:cNvSpPr>
           <p:nvPr>
             <p:ph idx="1"/>
           </p:nvPr>
-        </p:nvPicPr>
-        <p:blipFill>
-          <a:blip r:embed="rId2"/>
-          <a:stretch>
-            <a:fillRect/>
-          </a:stretch>
-        </p:blipFill>
+        </p:nvSpPr>
+        <p:spPr/>
+        <p:txBody>
+          <a:bodyPr/>
+          <a:lstStyle/>
+          <a:p>
+            <a:r>
+              <a:rPr lang="en-GB" dirty="0"/>
+              <a:t>There will be a force (wind) that effects the projectile when it is launched.</a:t>
+            </a:r>
+          </a:p>
+          <a:p>
+            <a:r>
+              <a:rPr lang="en-GB" dirty="0"/>
+              <a:t>This will be the same force for each player</a:t>
+            </a:r>
+          </a:p>
+        </p:txBody>
+      </p:sp>
+      <p:sp>
+        <p:nvSpPr>
+          <p:cNvPr id="4" name="TextBox 3">
+            <a:extLst>
+              <a:ext uri="{FF2B5EF4-FFF2-40B4-BE49-F238E27FC236}">
+                <a16:creationId xmlns:a16="http://schemas.microsoft.com/office/drawing/2014/main" id="{3ED33715-2F47-4C92-A3F1-DAE40009E5C6}"/>
+              </a:ext>
+            </a:extLst>
+          </p:cNvPr>
+          <p:cNvSpPr txBox="1"/>
+          <p:nvPr/>
+        </p:nvSpPr>
         <p:spPr>
           <a:xfrm>
-            <a:off x="2349784" y="2081213"/>
-            <a:ext cx="7492432" cy="4195762"/>
+            <a:off x="10610850" y="452718"/>
+            <a:ext cx="342900" cy="369332"/>
           </a:xfrm>
           <a:prstGeom prst="rect">
             <a:avLst/>
           </a:prstGeom>
+          <a:noFill/>
         </p:spPr>
-      </p:pic>
+        <p:txBody>
+          <a:bodyPr wrap="square" rtlCol="0">
+            <a:spAutoFit/>
+          </a:bodyPr>
+          <a:lstStyle/>
+          <a:p>
+            <a:r>
+              <a:rPr lang="en-GB" dirty="0"/>
+              <a:t>E</a:t>
+            </a:r>
+          </a:p>
+        </p:txBody>
+      </p:sp>
     </p:spTree>
     <p:extLst>
       <p:ext uri="{BB962C8B-B14F-4D97-AF65-F5344CB8AC3E}">
-        <p14:creationId xmlns:p14="http://schemas.microsoft.com/office/powerpoint/2010/main" val="10835353"/>
+        <p14:creationId xmlns:p14="http://schemas.microsoft.com/office/powerpoint/2010/main" val="3873638211"/>
       </p:ext>
     </p:extLst>
   </p:cSld>
@@ -8329,7 +9399,7 @@
           <p:cNvPr id="2" name="Title 1">
             <a:extLst>
               <a:ext uri="{FF2B5EF4-FFF2-40B4-BE49-F238E27FC236}">
-                <a16:creationId xmlns:a16="http://schemas.microsoft.com/office/drawing/2014/main" id="{74886A99-D5C8-4103-AB7B-AD0EFE873504}"/>
+                <a16:creationId xmlns:a16="http://schemas.microsoft.com/office/drawing/2014/main" id="{672EBB02-FCB7-449D-9D6A-64ED9C5983DF}"/>
               </a:ext>
             </a:extLst>
           </p:cNvPr>
@@ -8347,7 +9417,7 @@
           <a:p>
             <a:r>
               <a:rPr lang="en-GB" dirty="0"/>
-              <a:t>Screen mock-up</a:t>
+              <a:t>To keep things Symmetrical </a:t>
             </a:r>
           </a:p>
         </p:txBody>
@@ -8357,7 +9427,7 @@
           <p:cNvPr id="4" name="Content Placeholder 3">
             <a:extLst>
               <a:ext uri="{FF2B5EF4-FFF2-40B4-BE49-F238E27FC236}">
-                <a16:creationId xmlns:a16="http://schemas.microsoft.com/office/drawing/2014/main" id="{E967FF72-1194-4D1F-83BD-6C15E67812F2}"/>
+                <a16:creationId xmlns:a16="http://schemas.microsoft.com/office/drawing/2014/main" id="{28892EEA-ED28-49F1-8732-616C7DFC3093}"/>
               </a:ext>
             </a:extLst>
           </p:cNvPr>
@@ -8369,25 +9439,121 @@
           </p:nvPr>
         </p:nvPicPr>
         <p:blipFill>
-          <a:blip r:embed="rId2"/>
+          <a:blip r:embed="rId3"/>
           <a:stretch>
             <a:fillRect/>
           </a:stretch>
         </p:blipFill>
         <p:spPr>
           <a:xfrm>
-            <a:off x="2363520" y="2052638"/>
-            <a:ext cx="7464959" cy="4195762"/>
+            <a:off x="2802552" y="1792784"/>
+            <a:ext cx="6586895" cy="4195762"/>
           </a:xfrm>
           <a:prstGeom prst="rect">
             <a:avLst/>
           </a:prstGeom>
         </p:spPr>
       </p:pic>
+      <p:sp>
+        <p:nvSpPr>
+          <p:cNvPr id="5" name="Rectangle 4">
+            <a:extLst>
+              <a:ext uri="{FF2B5EF4-FFF2-40B4-BE49-F238E27FC236}">
+                <a16:creationId xmlns:a16="http://schemas.microsoft.com/office/drawing/2014/main" id="{432E7842-52B2-456C-8D0A-BC10CCCEAFDE}"/>
+              </a:ext>
+            </a:extLst>
+          </p:cNvPr>
+          <p:cNvSpPr/>
+          <p:nvPr/>
+        </p:nvSpPr>
+        <p:spPr>
+          <a:xfrm>
+            <a:off x="147853" y="2967335"/>
+            <a:ext cx="2420406" cy="923330"/>
+          </a:xfrm>
+          <a:prstGeom prst="rect">
+            <a:avLst/>
+          </a:prstGeom>
+          <a:noFill/>
+        </p:spPr>
+        <p:txBody>
+          <a:bodyPr wrap="none" lIns="91440" tIns="45720" rIns="91440" bIns="45720">
+            <a:spAutoFit/>
+          </a:bodyPr>
+          <a:lstStyle/>
+          <a:p>
+            <a:pPr algn="ctr"/>
+            <a:r>
+              <a:rPr lang="en-US" sz="5400" b="0" cap="none" spc="0" dirty="0">
+                <a:ln w="0"/>
+                <a:solidFill>
+                  <a:schemeClr val="tx1"/>
+                </a:solidFill>
+                <a:effectLst>
+                  <a:outerShdw blurRad="38100" dist="19050" dir="2700000" algn="tl" rotWithShape="0">
+                    <a:schemeClr val="dk1">
+                      <a:alpha val="40000"/>
+                    </a:schemeClr>
+                  </a:outerShdw>
+                </a:effectLst>
+              </a:rPr>
+              <a:t>Player 1</a:t>
+            </a:r>
+          </a:p>
+        </p:txBody>
+      </p:sp>
+      <p:sp>
+        <p:nvSpPr>
+          <p:cNvPr id="6" name="Rectangle 5">
+            <a:extLst>
+              <a:ext uri="{FF2B5EF4-FFF2-40B4-BE49-F238E27FC236}">
+                <a16:creationId xmlns:a16="http://schemas.microsoft.com/office/drawing/2014/main" id="{BA4DA330-4127-4639-AF23-007D271219CB}"/>
+              </a:ext>
+            </a:extLst>
+          </p:cNvPr>
+          <p:cNvSpPr/>
+          <p:nvPr/>
+        </p:nvSpPr>
+        <p:spPr>
+          <a:xfrm>
+            <a:off x="9598002" y="2872085"/>
+            <a:ext cx="2420406" cy="923330"/>
+          </a:xfrm>
+          <a:prstGeom prst="rect">
+            <a:avLst/>
+          </a:prstGeom>
+          <a:noFill/>
+        </p:spPr>
+        <p:txBody>
+          <a:bodyPr wrap="none" lIns="91440" tIns="45720" rIns="91440" bIns="45720">
+            <a:spAutoFit/>
+          </a:bodyPr>
+          <a:lstStyle/>
+          <a:p>
+            <a:pPr algn="ctr"/>
+            <a:r>
+              <a:rPr lang="en-US" sz="5400" b="0" cap="none" spc="0" dirty="0">
+                <a:ln w="0"/>
+                <a:solidFill>
+                  <a:schemeClr val="tx1"/>
+                </a:solidFill>
+                <a:effectLst>
+                  <a:outerShdw blurRad="38100" dist="19050" dir="2700000" algn="tl" rotWithShape="0">
+                    <a:schemeClr val="dk1">
+                      <a:alpha val="40000"/>
+                    </a:schemeClr>
+                  </a:outerShdw>
+                </a:effectLst>
+              </a:rPr>
+              <a:t>Player 2</a:t>
+            </a:r>
+          </a:p>
+        </p:txBody>
+      </p:sp>
     </p:spTree>
     <p:extLst>
       <p:ext uri="{BB962C8B-B14F-4D97-AF65-F5344CB8AC3E}">
-        <p14:creationId xmlns:p14="http://schemas.microsoft.com/office/powerpoint/2010/main" val="565845685"/>
+        <p14:creationId xmlns:p14="http://schemas.microsoft.com/office/powerpoint/2010/main" val="1943397596"/>
       </p:ext>
     </p:extLst>
   </p:cSld>
@@ -8419,7 +9585,7 @@
           <p:cNvPr id="2" name="Title 1">
             <a:extLst>
               <a:ext uri="{FF2B5EF4-FFF2-40B4-BE49-F238E27FC236}">
-                <a16:creationId xmlns:a16="http://schemas.microsoft.com/office/drawing/2014/main" id="{B6FD9CEF-C4EB-4584-B49F-A02E873D6779}"/>
+                <a16:creationId xmlns:a16="http://schemas.microsoft.com/office/drawing/2014/main" id="{672EBB02-FCB7-449D-9D6A-64ED9C5983DF}"/>
               </a:ext>
             </a:extLst>
           </p:cNvPr>
@@ -8437,20 +9603,146 @@
           <a:p>
             <a:r>
               <a:rPr lang="en-GB" dirty="0"/>
-              <a:t>First mechanic: shooting/launching</a:t>
-            </a:r>
-          </a:p>
-        </p:txBody>
-      </p:sp>
-      <p:sp>
-        <p:nvSpPr>
-          <p:cNvPr id="3" name="Content Placeholder 2">
+              <a:t>To keep things Symmetrical </a:t>
+            </a:r>
+          </a:p>
+        </p:txBody>
+      </p:sp>
+      <p:sp>
+        <p:nvSpPr>
+          <p:cNvPr id="5" name="Rectangle 4">
             <a:extLst>
               <a:ext uri="{FF2B5EF4-FFF2-40B4-BE49-F238E27FC236}">
-                <a16:creationId xmlns:a16="http://schemas.microsoft.com/office/drawing/2014/main" id="{631A7050-10F3-4ED1-991E-B2AA17989DB6}"/>
+                <a16:creationId xmlns:a16="http://schemas.microsoft.com/office/drawing/2014/main" id="{432E7842-52B2-456C-8D0A-BC10CCCEAFDE}"/>
               </a:ext>
             </a:extLst>
           </p:cNvPr>
+          <p:cNvSpPr/>
+          <p:nvPr/>
+        </p:nvSpPr>
+        <p:spPr>
+          <a:xfrm>
+            <a:off x="157378" y="2967335"/>
+            <a:ext cx="2420406" cy="923330"/>
+          </a:xfrm>
+          <a:prstGeom prst="rect">
+            <a:avLst/>
+          </a:prstGeom>
+          <a:noFill/>
+        </p:spPr>
+        <p:txBody>
+          <a:bodyPr wrap="none" lIns="91440" tIns="45720" rIns="91440" bIns="45720">
+            <a:spAutoFit/>
+          </a:bodyPr>
+          <a:lstStyle/>
+          <a:p>
+            <a:pPr algn="ctr"/>
+            <a:r>
+              <a:rPr lang="en-US" sz="5400" b="0" cap="none" spc="0" dirty="0">
+                <a:ln w="0"/>
+                <a:solidFill>
+                  <a:schemeClr val="tx1"/>
+                </a:solidFill>
+                <a:effectLst>
+                  <a:outerShdw blurRad="38100" dist="19050" dir="2700000" algn="tl" rotWithShape="0">
+                    <a:schemeClr val="dk1">
+                      <a:alpha val="40000"/>
+                    </a:schemeClr>
+                  </a:outerShdw>
+                </a:effectLst>
+              </a:rPr>
+              <a:t>Player 1</a:t>
+            </a:r>
+          </a:p>
+        </p:txBody>
+      </p:sp>
+      <p:sp>
+        <p:nvSpPr>
+          <p:cNvPr id="6" name="Rectangle 5">
+            <a:extLst>
+              <a:ext uri="{FF2B5EF4-FFF2-40B4-BE49-F238E27FC236}">
+                <a16:creationId xmlns:a16="http://schemas.microsoft.com/office/drawing/2014/main" id="{BA4DA330-4127-4639-AF23-007D271219CB}"/>
+              </a:ext>
+            </a:extLst>
+          </p:cNvPr>
+          <p:cNvSpPr/>
+          <p:nvPr/>
+        </p:nvSpPr>
+        <p:spPr>
+          <a:xfrm>
+            <a:off x="9617052" y="2967335"/>
+            <a:ext cx="2420406" cy="923330"/>
+          </a:xfrm>
+          <a:prstGeom prst="rect">
+            <a:avLst/>
+          </a:prstGeom>
+          <a:noFill/>
+        </p:spPr>
+        <p:txBody>
+          <a:bodyPr wrap="none" lIns="91440" tIns="45720" rIns="91440" bIns="45720">
+            <a:spAutoFit/>
+          </a:bodyPr>
+          <a:lstStyle/>
+          <a:p>
+            <a:pPr algn="ctr"/>
+            <a:r>
+              <a:rPr lang="en-US" sz="5400" b="0" cap="none" spc="0" dirty="0">
+                <a:ln w="0"/>
+                <a:solidFill>
+                  <a:schemeClr val="tx1"/>
+                </a:solidFill>
+                <a:effectLst>
+                  <a:outerShdw blurRad="38100" dist="19050" dir="2700000" algn="tl" rotWithShape="0">
+                    <a:schemeClr val="dk1">
+                      <a:alpha val="40000"/>
+                    </a:schemeClr>
+                  </a:outerShdw>
+                </a:effectLst>
+              </a:rPr>
+              <a:t>Player 2</a:t>
+            </a:r>
+          </a:p>
+        </p:txBody>
+      </p:sp>
+      <p:pic>
+        <p:nvPicPr>
+          <p:cNvPr id="3" name="Picture 2">
+            <a:extLst>
+              <a:ext uri="{FF2B5EF4-FFF2-40B4-BE49-F238E27FC236}">
+                <a16:creationId xmlns:a16="http://schemas.microsoft.com/office/drawing/2014/main" id="{0B674979-E287-4874-8E03-541581916E28}"/>
+              </a:ext>
+            </a:extLst>
+          </p:cNvPr>
+          <p:cNvPicPr>
+            <a:picLocks noChangeAspect="1"/>
+          </p:cNvPicPr>
+          <p:nvPr/>
+        </p:nvPicPr>
+        <p:blipFill>
+          <a:blip r:embed="rId3"/>
+          <a:stretch>
+            <a:fillRect/>
+          </a:stretch>
+        </p:blipFill>
+        <p:spPr>
+          <a:xfrm>
+            <a:off x="2838450" y="1824037"/>
+            <a:ext cx="6515100" cy="4143375"/>
+          </a:xfrm>
+          <a:prstGeom prst="rect">
+            <a:avLst/>
+          </a:prstGeom>
+        </p:spPr>
+      </p:pic>
+      <p:sp>
+        <p:nvSpPr>
+          <p:cNvPr id="7" name="Content Placeholder 6">
+            <a:extLst>
+              <a:ext uri="{FF2B5EF4-FFF2-40B4-BE49-F238E27FC236}">
+                <a16:creationId xmlns:a16="http://schemas.microsoft.com/office/drawing/2014/main" id="{20F3856F-244C-4405-B04F-3ED5B8082E70}"/>
+              </a:ext>
+            </a:extLst>
+          </p:cNvPr>
           <p:cNvSpPr>
             <a:spLocks noGrp="1"/>
           </p:cNvSpPr>
@@ -8463,35 +9755,14 @@
           <a:bodyPr/>
           <a:lstStyle/>
           <a:p>
-            <a:r>
-              <a:rPr lang="en-GB" dirty="0"/>
-              <a:t>The player will tap to set the position of the launcher</a:t>
-            </a:r>
-          </a:p>
-          <a:p>
-            <a:r>
-              <a:rPr lang="en-GB" dirty="0"/>
-              <a:t>The player will tap again to set the power of the shot</a:t>
-            </a:r>
-          </a:p>
-          <a:p>
-            <a:r>
-              <a:rPr lang="en-GB" dirty="0"/>
-              <a:t>The shot will lock in and then the other player will have their go</a:t>
-            </a:r>
-          </a:p>
-          <a:p>
-            <a:r>
-              <a:rPr lang="en-GB" dirty="0"/>
-              <a:t>When both players have aimed and set the power, both shots will go at the same time.</a:t>
-            </a:r>
+            <a:endParaRPr lang="en-GB"/>
           </a:p>
         </p:txBody>
       </p:sp>
     </p:spTree>
     <p:extLst>
       <p:ext uri="{BB962C8B-B14F-4D97-AF65-F5344CB8AC3E}">
-        <p14:creationId xmlns:p14="http://schemas.microsoft.com/office/powerpoint/2010/main" val="345086452"/>
+        <p14:creationId xmlns:p14="http://schemas.microsoft.com/office/powerpoint/2010/main" val="276089555"/>
       </p:ext>
     </p:extLst>
   </p:cSld>
@@ -8523,7 +9794,7 @@
           <p:cNvPr id="2" name="Title 1">
             <a:extLst>
               <a:ext uri="{FF2B5EF4-FFF2-40B4-BE49-F238E27FC236}">
-                <a16:creationId xmlns:a16="http://schemas.microsoft.com/office/drawing/2014/main" id="{35615569-7527-4024-836A-239B8A2E3958}"/>
+                <a16:creationId xmlns:a16="http://schemas.microsoft.com/office/drawing/2014/main" id="{FE35A943-83D0-4753-AA1C-4A6833FF9B39}"/>
               </a:ext>
             </a:extLst>
           </p:cNvPr>
@@ -8541,7 +9812,7 @@
           <a:p>
             <a:r>
               <a:rPr lang="en-GB" dirty="0"/>
-              <a:t>Second mechanic: Wind</a:t>
+              <a:t>The player experience</a:t>
             </a:r>
           </a:p>
         </p:txBody>
@@ -8551,7 +9822,7 @@
           <p:cNvPr id="3" name="Content Placeholder 2">
             <a:extLst>
               <a:ext uri="{FF2B5EF4-FFF2-40B4-BE49-F238E27FC236}">
-                <a16:creationId xmlns:a16="http://schemas.microsoft.com/office/drawing/2014/main" id="{99B53FEC-9E9A-4924-B6E3-24FF878B896D}"/>
+                <a16:creationId xmlns:a16="http://schemas.microsoft.com/office/drawing/2014/main" id="{5E33382E-A521-4D39-8DD5-E2DC47E4FE22}"/>
               </a:ext>
             </a:extLst>
           </p:cNvPr>
@@ -8569,13 +9840,66 @@
           <a:p>
             <a:r>
               <a:rPr lang="en-GB" dirty="0"/>
-              <a:t>There will be a force (wind) that effects the projectile when it is launched.</a:t>
-            </a:r>
-          </a:p>
-          <a:p>
+              <a:t>We want both of the players to experience a sense of hard fun</a:t>
+            </a:r>
+          </a:p>
+          <a:p>
+            <a:pPr lvl="1"/>
+            <a:r>
+              <a:rPr lang="en-GB" dirty="0" err="1"/>
+              <a:t>Fiero</a:t>
+            </a:r>
             <a:r>
               <a:rPr lang="en-GB" dirty="0"/>
-              <a:t>This will be the same force for each player</a:t>
+              <a:t>, strategy and obstacles</a:t>
+            </a:r>
+          </a:p>
+          <a:p>
+            <a:r>
+              <a:rPr lang="en-GB" dirty="0"/>
+              <a:t>A sense of people fun</a:t>
+            </a:r>
+          </a:p>
+          <a:p>
+            <a:pPr lvl="1"/>
+            <a:r>
+              <a:rPr lang="en-GB" dirty="0"/>
+              <a:t>Amusement and player interaction</a:t>
+            </a:r>
+          </a:p>
+        </p:txBody>
+      </p:sp>
+      <p:sp>
+        <p:nvSpPr>
+          <p:cNvPr id="4" name="TextBox 3">
+            <a:extLst>
+              <a:ext uri="{FF2B5EF4-FFF2-40B4-BE49-F238E27FC236}">
+                <a16:creationId xmlns:a16="http://schemas.microsoft.com/office/drawing/2014/main" id="{DDFE9877-5324-4066-8155-BB7140AE1EB4}"/>
+              </a:ext>
+            </a:extLst>
+          </p:cNvPr>
+          <p:cNvSpPr txBox="1"/>
+          <p:nvPr/>
+        </p:nvSpPr>
+        <p:spPr>
+          <a:xfrm>
+            <a:off x="10610850" y="452718"/>
+            <a:ext cx="342900" cy="369332"/>
+          </a:xfrm>
+          <a:prstGeom prst="rect">
+            <a:avLst/>
+          </a:prstGeom>
+          <a:noFill/>
+        </p:spPr>
+        <p:txBody>
+          <a:bodyPr wrap="square" rtlCol="0">
+            <a:spAutoFit/>
+          </a:bodyPr>
+          <a:lstStyle/>
+          <a:p>
+            <a:r>
+              <a:rPr lang="en-GB" dirty="0"/>
+              <a:t>T</a:t>
             </a:r>
           </a:p>
         </p:txBody>
@@ -8583,7 +9907,7 @@
     </p:spTree>
     <p:extLst>
       <p:ext uri="{BB962C8B-B14F-4D97-AF65-F5344CB8AC3E}">
-        <p14:creationId xmlns:p14="http://schemas.microsoft.com/office/powerpoint/2010/main" val="3873638211"/>
+        <p14:creationId xmlns:p14="http://schemas.microsoft.com/office/powerpoint/2010/main" val="1822042671"/>
       </p:ext>
     </p:extLst>
   </p:cSld>
@@ -8615,7 +9939,7 @@
           <p:cNvPr id="2" name="Title 1">
             <a:extLst>
               <a:ext uri="{FF2B5EF4-FFF2-40B4-BE49-F238E27FC236}">
-                <a16:creationId xmlns:a16="http://schemas.microsoft.com/office/drawing/2014/main" id="{672EBB02-FCB7-449D-9D6A-64ED9C5983DF}"/>
+                <a16:creationId xmlns:a16="http://schemas.microsoft.com/office/drawing/2014/main" id="{884D9554-1741-4629-B62D-1C02996DE221}"/>
               </a:ext>
             </a:extLst>
           </p:cNvPr>
@@ -8633,59 +9957,67 @@
           <a:p>
             <a:r>
               <a:rPr lang="en-GB" dirty="0"/>
-              <a:t>To keep things Symmetrical </a:t>
-            </a:r>
-          </a:p>
-        </p:txBody>
-      </p:sp>
-      <p:pic>
-        <p:nvPicPr>
-          <p:cNvPr id="4" name="Content Placeholder 3">
+              <a:t>The following week</a:t>
+            </a:r>
+          </a:p>
+        </p:txBody>
+      </p:sp>
+      <p:sp>
+        <p:nvSpPr>
+          <p:cNvPr id="3" name="Content Placeholder 2">
             <a:extLst>
               <a:ext uri="{FF2B5EF4-FFF2-40B4-BE49-F238E27FC236}">
-                <a16:creationId xmlns:a16="http://schemas.microsoft.com/office/drawing/2014/main" id="{28892EEA-ED28-49F1-8732-616C7DFC3093}"/>
+                <a16:creationId xmlns:a16="http://schemas.microsoft.com/office/drawing/2014/main" id="{5B90EE24-1240-4B7B-8D92-EA4B79F1A4B4}"/>
               </a:ext>
             </a:extLst>
           </p:cNvPr>
-          <p:cNvPicPr>
-            <a:picLocks noGrp="1" noChangeAspect="1"/>
-          </p:cNvPicPr>
+          <p:cNvSpPr>
+            <a:spLocks noGrp="1"/>
+          </p:cNvSpPr>
           <p:nvPr>
             <p:ph idx="1"/>
           </p:nvPr>
-        </p:nvPicPr>
-        <p:blipFill>
-          <a:blip r:embed="rId3"/>
-          <a:stretch>
-            <a:fillRect/>
-          </a:stretch>
-        </p:blipFill>
-        <p:spPr>
-          <a:xfrm>
-            <a:off x="2802552" y="1792784"/>
-            <a:ext cx="6586895" cy="4195762"/>
-          </a:xfrm>
-          <a:prstGeom prst="rect">
-            <a:avLst/>
-          </a:prstGeom>
-        </p:spPr>
-      </p:pic>
-      <p:sp>
-        <p:nvSpPr>
-          <p:cNvPr id="5" name="Rectangle 4">
+        </p:nvSpPr>
+        <p:spPr/>
+        <p:txBody>
+          <a:bodyPr/>
+          <a:lstStyle/>
+          <a:p>
+            <a:r>
+              <a:rPr lang="en-GB" dirty="0"/>
+              <a:t>Picking a theme</a:t>
+            </a:r>
+          </a:p>
+          <a:p>
+            <a:r>
+              <a:rPr lang="en-GB" dirty="0"/>
+              <a:t>Art assets for the theme</a:t>
+            </a:r>
+          </a:p>
+          <a:p>
+            <a:r>
+              <a:rPr lang="en-GB" dirty="0"/>
+              <a:t>Building a prototype to get first mechanic working</a:t>
+            </a:r>
+          </a:p>
+        </p:txBody>
+      </p:sp>
+      <p:sp>
+        <p:nvSpPr>
+          <p:cNvPr id="4" name="TextBox 3">
             <a:extLst>
               <a:ext uri="{FF2B5EF4-FFF2-40B4-BE49-F238E27FC236}">
-                <a16:creationId xmlns:a16="http://schemas.microsoft.com/office/drawing/2014/main" id="{432E7842-52B2-456C-8D0A-BC10CCCEAFDE}"/>
+                <a16:creationId xmlns:a16="http://schemas.microsoft.com/office/drawing/2014/main" id="{800B2F8C-C1FD-4B10-9A2A-8DE613366DEC}"/>
               </a:ext>
             </a:extLst>
           </p:cNvPr>
-          <p:cNvSpPr/>
+          <p:cNvSpPr txBox="1"/>
           <p:nvPr/>
         </p:nvSpPr>
         <p:spPr>
           <a:xfrm>
-            <a:off x="147853" y="2967335"/>
-            <a:ext cx="2420406" cy="923330"/>
+            <a:off x="10610850" y="452718"/>
+            <a:ext cx="342900" cy="369332"/>
           </a:xfrm>
           <a:prstGeom prst="rect">
             <a:avLst/>
@@ -8693,75 +10025,14 @@
           <a:noFill/>
         </p:spPr>
         <p:txBody>
-          <a:bodyPr wrap="none" lIns="91440" tIns="45720" rIns="91440" bIns="45720">
+          <a:bodyPr wrap="square" rtlCol="0">
             <a:spAutoFit/>
           </a:bodyPr>
           <a:lstStyle/>
           <a:p>
-            <a:pPr algn="ctr"/>
-            <a:r>
-              <a:rPr lang="en-US" sz="5400" b="0" cap="none" spc="0" dirty="0">
-                <a:ln w="0"/>
-                <a:solidFill>
-                  <a:schemeClr val="tx1"/>
-                </a:solidFill>
-                <a:effectLst>
-                  <a:outerShdw blurRad="38100" dist="19050" dir="2700000" algn="tl" rotWithShape="0">
-                    <a:schemeClr val="dk1">
-                      <a:alpha val="40000"/>
-                    </a:schemeClr>
-                  </a:outerShdw>
-                </a:effectLst>
-              </a:rPr>
-              <a:t>Player 1</a:t>
-            </a:r>
-          </a:p>
-        </p:txBody>
-      </p:sp>
-      <p:sp>
-        <p:nvSpPr>
-          <p:cNvPr id="6" name="Rectangle 5">
-            <a:extLst>
-              <a:ext uri="{FF2B5EF4-FFF2-40B4-BE49-F238E27FC236}">
-                <a16:creationId xmlns:a16="http://schemas.microsoft.com/office/drawing/2014/main" id="{BA4DA330-4127-4639-AF23-007D271219CB}"/>
-              </a:ext>
-            </a:extLst>
-          </p:cNvPr>
-          <p:cNvSpPr/>
-          <p:nvPr/>
-        </p:nvSpPr>
-        <p:spPr>
-          <a:xfrm>
-            <a:off x="9598002" y="2872085"/>
-            <a:ext cx="2420406" cy="923330"/>
-          </a:xfrm>
-          <a:prstGeom prst="rect">
-            <a:avLst/>
-          </a:prstGeom>
-          <a:noFill/>
-        </p:spPr>
-        <p:txBody>
-          <a:bodyPr wrap="none" lIns="91440" tIns="45720" rIns="91440" bIns="45720">
-            <a:spAutoFit/>
-          </a:bodyPr>
-          <a:lstStyle/>
-          <a:p>
-            <a:pPr algn="ctr"/>
-            <a:r>
-              <a:rPr lang="en-US" sz="5400" b="0" cap="none" spc="0" dirty="0">
-                <a:ln w="0"/>
-                <a:solidFill>
-                  <a:schemeClr val="tx1"/>
-                </a:solidFill>
-                <a:effectLst>
-                  <a:outerShdw blurRad="38100" dist="19050" dir="2700000" algn="tl" rotWithShape="0">
-                    <a:schemeClr val="dk1">
-                      <a:alpha val="40000"/>
-                    </a:schemeClr>
-                  </a:outerShdw>
-                </a:effectLst>
-              </a:rPr>
-              <a:t>Player 2</a:t>
+            <a:r>
+              <a:rPr lang="en-GB" dirty="0"/>
+              <a:t>E</a:t>
             </a:r>
           </a:p>
         </p:txBody>
@@ -8769,7 +10040,7 @@
     </p:spTree>
     <p:extLst>
       <p:ext uri="{BB962C8B-B14F-4D97-AF65-F5344CB8AC3E}">
-        <p14:creationId xmlns:p14="http://schemas.microsoft.com/office/powerpoint/2010/main" val="1943397596"/>
+        <p14:creationId xmlns:p14="http://schemas.microsoft.com/office/powerpoint/2010/main" val="855245935"/>
       </p:ext>
     </p:extLst>
   </p:cSld>
@@ -8801,7 +10072,7 @@
           <p:cNvPr id="2" name="Title 1">
             <a:extLst>
               <a:ext uri="{FF2B5EF4-FFF2-40B4-BE49-F238E27FC236}">
-                <a16:creationId xmlns:a16="http://schemas.microsoft.com/office/drawing/2014/main" id="{672EBB02-FCB7-449D-9D6A-64ED9C5983DF}"/>
+                <a16:creationId xmlns:a16="http://schemas.microsoft.com/office/drawing/2014/main" id="{2AE1F416-5594-4C07-ADDF-FE02BFFE75D1}"/>
               </a:ext>
             </a:extLst>
           </p:cNvPr>
@@ -8812,142 +10083,20 @@
             <p:ph type="title"/>
           </p:nvPr>
         </p:nvSpPr>
-        <p:spPr/>
-        <p:txBody>
-          <a:bodyPr/>
-          <a:lstStyle/>
-          <a:p>
-            <a:r>
-              <a:rPr lang="en-GB" dirty="0"/>
-              <a:t>To keep things Symmetrical </a:t>
-            </a:r>
-          </a:p>
-        </p:txBody>
-      </p:sp>
-      <p:pic>
-        <p:nvPicPr>
-          <p:cNvPr id="9" name="Content Placeholder 8">
-            <a:extLst>
-              <a:ext uri="{FF2B5EF4-FFF2-40B4-BE49-F238E27FC236}">
-                <a16:creationId xmlns:a16="http://schemas.microsoft.com/office/drawing/2014/main" id="{45A73B88-1535-4E04-AF47-20EB656284D6}"/>
-              </a:ext>
-            </a:extLst>
-          </p:cNvPr>
-          <p:cNvPicPr>
-            <a:picLocks noGrp="1" noChangeAspect="1"/>
-          </p:cNvPicPr>
-          <p:nvPr>
-            <p:ph idx="1"/>
-          </p:nvPr>
-        </p:nvPicPr>
-        <p:blipFill>
-          <a:blip r:embed="rId3"/>
-          <a:stretch>
-            <a:fillRect/>
-          </a:stretch>
-        </p:blipFill>
         <p:spPr>
           <a:xfrm>
-            <a:off x="2751809" y="1792784"/>
-            <a:ext cx="6688381" cy="4195762"/>
+            <a:off x="1393638" y="2728735"/>
+            <a:ext cx="9404723" cy="1400530"/>
           </a:xfrm>
-          <a:prstGeom prst="rect">
-            <a:avLst/>
-          </a:prstGeom>
         </p:spPr>
-      </p:pic>
-      <p:sp>
-        <p:nvSpPr>
-          <p:cNvPr id="5" name="Rectangle 4">
-            <a:extLst>
-              <a:ext uri="{FF2B5EF4-FFF2-40B4-BE49-F238E27FC236}">
-                <a16:creationId xmlns:a16="http://schemas.microsoft.com/office/drawing/2014/main" id="{432E7842-52B2-456C-8D0A-BC10CCCEAFDE}"/>
-              </a:ext>
-            </a:extLst>
-          </p:cNvPr>
-          <p:cNvSpPr/>
-          <p:nvPr/>
-        </p:nvSpPr>
-        <p:spPr>
-          <a:xfrm>
-            <a:off x="157378" y="2967335"/>
-            <a:ext cx="2420406" cy="923330"/>
-          </a:xfrm>
-          <a:prstGeom prst="rect">
-            <a:avLst/>
-          </a:prstGeom>
-          <a:noFill/>
-        </p:spPr>
-        <p:txBody>
-          <a:bodyPr wrap="none" lIns="91440" tIns="45720" rIns="91440" bIns="45720">
-            <a:spAutoFit/>
-          </a:bodyPr>
+        <p:txBody>
+          <a:bodyPr/>
           <a:lstStyle/>
           <a:p>
             <a:pPr algn="ctr"/>
             <a:r>
-              <a:rPr lang="en-US" sz="5400" b="0" cap="none" spc="0" dirty="0">
-                <a:ln w="0"/>
-                <a:solidFill>
-                  <a:schemeClr val="tx1"/>
-                </a:solidFill>
-                <a:effectLst>
-                  <a:outerShdw blurRad="38100" dist="19050" dir="2700000" algn="tl" rotWithShape="0">
-                    <a:schemeClr val="dk1">
-                      <a:alpha val="40000"/>
-                    </a:schemeClr>
-                  </a:outerShdw>
-                </a:effectLst>
-              </a:rPr>
-              <a:t>Player 1</a:t>
-            </a:r>
-          </a:p>
-        </p:txBody>
-      </p:sp>
-      <p:sp>
-        <p:nvSpPr>
-          <p:cNvPr id="6" name="Rectangle 5">
-            <a:extLst>
-              <a:ext uri="{FF2B5EF4-FFF2-40B4-BE49-F238E27FC236}">
-                <a16:creationId xmlns:a16="http://schemas.microsoft.com/office/drawing/2014/main" id="{BA4DA330-4127-4639-AF23-007D271219CB}"/>
-              </a:ext>
-            </a:extLst>
-          </p:cNvPr>
-          <p:cNvSpPr/>
-          <p:nvPr/>
-        </p:nvSpPr>
-        <p:spPr>
-          <a:xfrm>
-            <a:off x="9617052" y="2967335"/>
-            <a:ext cx="2420406" cy="923330"/>
-          </a:xfrm>
-          <a:prstGeom prst="rect">
-            <a:avLst/>
-          </a:prstGeom>
-          <a:noFill/>
-        </p:spPr>
-        <p:txBody>
-          <a:bodyPr wrap="none" lIns="91440" tIns="45720" rIns="91440" bIns="45720">
-            <a:spAutoFit/>
-          </a:bodyPr>
-          <a:lstStyle/>
-          <a:p>
-            <a:pPr algn="ctr"/>
-            <a:r>
-              <a:rPr lang="en-US" sz="5400" b="0" cap="none" spc="0" dirty="0">
-                <a:ln w="0"/>
-                <a:solidFill>
-                  <a:schemeClr val="tx1"/>
-                </a:solidFill>
-                <a:effectLst>
-                  <a:outerShdw blurRad="38100" dist="19050" dir="2700000" algn="tl" rotWithShape="0">
-                    <a:schemeClr val="dk1">
-                      <a:alpha val="40000"/>
-                    </a:schemeClr>
-                  </a:outerShdw>
-                </a:effectLst>
-              </a:rPr>
-              <a:t>Player 2</a:t>
+              <a:rPr lang="en-GB" dirty="0"/>
+              <a:t>Any Questions?</a:t>
             </a:r>
           </a:p>
         </p:txBody>
@@ -8955,214 +10104,7 @@
     </p:spTree>
     <p:extLst>
       <p:ext uri="{BB962C8B-B14F-4D97-AF65-F5344CB8AC3E}">
-        <p14:creationId xmlns:p14="http://schemas.microsoft.com/office/powerpoint/2010/main" val="276089555"/>
-      </p:ext>
-    </p:extLst>
-  </p:cSld>
-  <p:clrMapOvr>
-    <a:masterClrMapping/>
-  </p:clrMapOvr>
-</p:sld>
-</file>
-
-<file path=ppt/slides/slide18.xml><?xml version="1.0" encoding="utf-8"?>
-<p:sld xmlns:a="http://schemas.openxmlformats.org/drawingml/2006/main" xmlns:r="http://schemas.openxmlformats.org/officeDocument/2006/relationships" xmlns:p="http://schemas.openxmlformats.org/presentationml/2006/main">
-  <p:cSld>
-    <p:spTree>
-      <p:nvGrpSpPr>
-        <p:cNvPr id="1" name=""/>
-        <p:cNvGrpSpPr/>
-        <p:nvPr/>
-      </p:nvGrpSpPr>
-      <p:grpSpPr>
-        <a:xfrm>
-          <a:off x="0" y="0"/>
-          <a:ext cx="0" cy="0"/>
-          <a:chOff x="0" y="0"/>
-          <a:chExt cx="0" cy="0"/>
-        </a:xfrm>
-      </p:grpSpPr>
-      <p:sp>
-        <p:nvSpPr>
-          <p:cNvPr id="2" name="Title 1">
-            <a:extLst>
-              <a:ext uri="{FF2B5EF4-FFF2-40B4-BE49-F238E27FC236}">
-                <a16:creationId xmlns:a16="http://schemas.microsoft.com/office/drawing/2014/main" id="{FE35A943-83D0-4753-AA1C-4A6833FF9B39}"/>
-              </a:ext>
-            </a:extLst>
-          </p:cNvPr>
-          <p:cNvSpPr>
-            <a:spLocks noGrp="1"/>
-          </p:cNvSpPr>
-          <p:nvPr>
-            <p:ph type="title"/>
-          </p:nvPr>
-        </p:nvSpPr>
-        <p:spPr/>
-        <p:txBody>
-          <a:bodyPr/>
-          <a:lstStyle/>
-          <a:p>
-            <a:r>
-              <a:rPr lang="en-GB" dirty="0"/>
-              <a:t>The player experience</a:t>
-            </a:r>
-          </a:p>
-        </p:txBody>
-      </p:sp>
-      <p:sp>
-        <p:nvSpPr>
-          <p:cNvPr id="3" name="Content Placeholder 2">
-            <a:extLst>
-              <a:ext uri="{FF2B5EF4-FFF2-40B4-BE49-F238E27FC236}">
-                <a16:creationId xmlns:a16="http://schemas.microsoft.com/office/drawing/2014/main" id="{5E33382E-A521-4D39-8DD5-E2DC47E4FE22}"/>
-              </a:ext>
-            </a:extLst>
-          </p:cNvPr>
-          <p:cNvSpPr>
-            <a:spLocks noGrp="1"/>
-          </p:cNvSpPr>
-          <p:nvPr>
-            <p:ph idx="1"/>
-          </p:nvPr>
-        </p:nvSpPr>
-        <p:spPr/>
-        <p:txBody>
-          <a:bodyPr/>
-          <a:lstStyle/>
-          <a:p>
-            <a:r>
-              <a:rPr lang="en-GB" dirty="0"/>
-              <a:t>We want both of the players to experience a sense of hard fun</a:t>
-            </a:r>
-          </a:p>
-          <a:p>
-            <a:pPr lvl="1"/>
-            <a:r>
-              <a:rPr lang="en-GB" dirty="0" err="1"/>
-              <a:t>Fiero</a:t>
-            </a:r>
-            <a:r>
-              <a:rPr lang="en-GB" dirty="0"/>
-              <a:t>, strategy and obstacles</a:t>
-            </a:r>
-          </a:p>
-          <a:p>
-            <a:r>
-              <a:rPr lang="en-GB" dirty="0"/>
-              <a:t>A sense of people fun</a:t>
-            </a:r>
-          </a:p>
-          <a:p>
-            <a:pPr lvl="1"/>
-            <a:r>
-              <a:rPr lang="en-GB" dirty="0"/>
-              <a:t>Amusement and player interaction</a:t>
-            </a:r>
-          </a:p>
-        </p:txBody>
-      </p:sp>
-    </p:spTree>
-    <p:extLst>
-      <p:ext uri="{BB962C8B-B14F-4D97-AF65-F5344CB8AC3E}">
-        <p14:creationId xmlns:p14="http://schemas.microsoft.com/office/powerpoint/2010/main" val="1822042671"/>
-      </p:ext>
-    </p:extLst>
-  </p:cSld>
-  <p:clrMapOvr>
-    <a:masterClrMapping/>
-  </p:clrMapOvr>
-</p:sld>
-</file>
-
-<file path=ppt/slides/slide19.xml><?xml version="1.0" encoding="utf-8"?>
-<p:sld xmlns:a="http://schemas.openxmlformats.org/drawingml/2006/main" xmlns:r="http://schemas.openxmlformats.org/officeDocument/2006/relationships" xmlns:p="http://schemas.openxmlformats.org/presentationml/2006/main">
-  <p:cSld>
-    <p:spTree>
-      <p:nvGrpSpPr>
-        <p:cNvPr id="1" name=""/>
-        <p:cNvGrpSpPr/>
-        <p:nvPr/>
-      </p:nvGrpSpPr>
-      <p:grpSpPr>
-        <a:xfrm>
-          <a:off x="0" y="0"/>
-          <a:ext cx="0" cy="0"/>
-          <a:chOff x="0" y="0"/>
-          <a:chExt cx="0" cy="0"/>
-        </a:xfrm>
-      </p:grpSpPr>
-      <p:sp>
-        <p:nvSpPr>
-          <p:cNvPr id="2" name="Title 1">
-            <a:extLst>
-              <a:ext uri="{FF2B5EF4-FFF2-40B4-BE49-F238E27FC236}">
-                <a16:creationId xmlns:a16="http://schemas.microsoft.com/office/drawing/2014/main" id="{884D9554-1741-4629-B62D-1C02996DE221}"/>
-              </a:ext>
-            </a:extLst>
-          </p:cNvPr>
-          <p:cNvSpPr>
-            <a:spLocks noGrp="1"/>
-          </p:cNvSpPr>
-          <p:nvPr>
-            <p:ph type="title"/>
-          </p:nvPr>
-        </p:nvSpPr>
-        <p:spPr/>
-        <p:txBody>
-          <a:bodyPr/>
-          <a:lstStyle/>
-          <a:p>
-            <a:r>
-              <a:rPr lang="en-GB" dirty="0"/>
-              <a:t>The following week</a:t>
-            </a:r>
-          </a:p>
-        </p:txBody>
-      </p:sp>
-      <p:sp>
-        <p:nvSpPr>
-          <p:cNvPr id="3" name="Content Placeholder 2">
-            <a:extLst>
-              <a:ext uri="{FF2B5EF4-FFF2-40B4-BE49-F238E27FC236}">
-                <a16:creationId xmlns:a16="http://schemas.microsoft.com/office/drawing/2014/main" id="{5B90EE24-1240-4B7B-8D92-EA4B79F1A4B4}"/>
-              </a:ext>
-            </a:extLst>
-          </p:cNvPr>
-          <p:cNvSpPr>
-            <a:spLocks noGrp="1"/>
-          </p:cNvSpPr>
-          <p:nvPr>
-            <p:ph idx="1"/>
-          </p:nvPr>
-        </p:nvSpPr>
-        <p:spPr/>
-        <p:txBody>
-          <a:bodyPr/>
-          <a:lstStyle/>
-          <a:p>
-            <a:r>
-              <a:rPr lang="en-GB" dirty="0"/>
-              <a:t>Picking a theme</a:t>
-            </a:r>
-          </a:p>
-          <a:p>
-            <a:r>
-              <a:rPr lang="en-GB" dirty="0"/>
-              <a:t>Building a </a:t>
-            </a:r>
-            <a:r>
-              <a:rPr lang="en-GB" dirty="0" err="1"/>
-              <a:t>prtotype</a:t>
-            </a:r>
-            <a:endParaRPr lang="en-GB" dirty="0"/>
-          </a:p>
-        </p:txBody>
-      </p:sp>
-    </p:spTree>
-    <p:extLst>
-      <p:ext uri="{BB962C8B-B14F-4D97-AF65-F5344CB8AC3E}">
-        <p14:creationId xmlns:p14="http://schemas.microsoft.com/office/powerpoint/2010/main" val="855245935"/>
+        <p14:creationId xmlns:p14="http://schemas.microsoft.com/office/powerpoint/2010/main" val="4207036878"/>
       </p:ext>
     </p:extLst>
   </p:cSld>
@@ -9252,7 +10194,7 @@
           <a:p>
             <a:r>
               <a:rPr lang="en-GB" dirty="0"/>
-              <a:t>Each player has a turn</a:t>
+              <a:t>Each player has a turn within one round</a:t>
             </a:r>
           </a:p>
           <a:p>
@@ -9270,7 +10212,42 @@
           <a:p>
             <a:r>
               <a:rPr lang="en-GB" dirty="0"/>
-              <a:t>There are two controls which make the game simple and intuitive</a:t>
+              <a:t>There are two mechanics which make the game simple and intuitive</a:t>
+            </a:r>
+          </a:p>
+        </p:txBody>
+      </p:sp>
+      <p:sp>
+        <p:nvSpPr>
+          <p:cNvPr id="4" name="TextBox 3">
+            <a:extLst>
+              <a:ext uri="{FF2B5EF4-FFF2-40B4-BE49-F238E27FC236}">
+                <a16:creationId xmlns:a16="http://schemas.microsoft.com/office/drawing/2014/main" id="{8932EE29-F110-4E89-92B3-FCDFBAEA9BB0}"/>
+              </a:ext>
+            </a:extLst>
+          </p:cNvPr>
+          <p:cNvSpPr txBox="1"/>
+          <p:nvPr/>
+        </p:nvSpPr>
+        <p:spPr>
+          <a:xfrm>
+            <a:off x="10610850" y="452718"/>
+            <a:ext cx="342900" cy="369332"/>
+          </a:xfrm>
+          <a:prstGeom prst="rect">
+            <a:avLst/>
+          </a:prstGeom>
+          <a:noFill/>
+        </p:spPr>
+        <p:txBody>
+          <a:bodyPr wrap="square" rtlCol="0">
+            <a:spAutoFit/>
+          </a:bodyPr>
+          <a:lstStyle/>
+          <a:p>
+            <a:r>
+              <a:rPr lang="en-GB" dirty="0"/>
+              <a:t>E</a:t>
             </a:r>
           </a:p>
         </p:txBody>
@@ -9279,70 +10256,6 @@
     <p:extLst>
       <p:ext uri="{BB962C8B-B14F-4D97-AF65-F5344CB8AC3E}">
         <p14:creationId xmlns:p14="http://schemas.microsoft.com/office/powerpoint/2010/main" val="2225047168"/>
-      </p:ext>
-    </p:extLst>
-  </p:cSld>
-  <p:clrMapOvr>
-    <a:masterClrMapping/>
-  </p:clrMapOvr>
-</p:sld>
-</file>
-
-<file path=ppt/slides/slide20.xml><?xml version="1.0" encoding="utf-8"?>
-<p:sld xmlns:a="http://schemas.openxmlformats.org/drawingml/2006/main" xmlns:r="http://schemas.openxmlformats.org/officeDocument/2006/relationships" xmlns:p="http://schemas.openxmlformats.org/presentationml/2006/main">
-  <p:cSld>
-    <p:spTree>
-      <p:nvGrpSpPr>
-        <p:cNvPr id="1" name=""/>
-        <p:cNvGrpSpPr/>
-        <p:nvPr/>
-      </p:nvGrpSpPr>
-      <p:grpSpPr>
-        <a:xfrm>
-          <a:off x="0" y="0"/>
-          <a:ext cx="0" cy="0"/>
-          <a:chOff x="0" y="0"/>
-          <a:chExt cx="0" cy="0"/>
-        </a:xfrm>
-      </p:grpSpPr>
-      <p:sp>
-        <p:nvSpPr>
-          <p:cNvPr id="2" name="Title 1">
-            <a:extLst>
-              <a:ext uri="{FF2B5EF4-FFF2-40B4-BE49-F238E27FC236}">
-                <a16:creationId xmlns:a16="http://schemas.microsoft.com/office/drawing/2014/main" id="{2AE1F416-5594-4C07-ADDF-FE02BFFE75D1}"/>
-              </a:ext>
-            </a:extLst>
-          </p:cNvPr>
-          <p:cNvSpPr>
-            <a:spLocks noGrp="1"/>
-          </p:cNvSpPr>
-          <p:nvPr>
-            <p:ph type="title"/>
-          </p:nvPr>
-        </p:nvSpPr>
-        <p:spPr>
-          <a:xfrm>
-            <a:off x="1393638" y="2728735"/>
-            <a:ext cx="9404723" cy="1400530"/>
-          </a:xfrm>
-        </p:spPr>
-        <p:txBody>
-          <a:bodyPr/>
-          <a:lstStyle/>
-          <a:p>
-            <a:pPr algn="ctr"/>
-            <a:r>
-              <a:rPr lang="en-GB" dirty="0"/>
-              <a:t>Any Questions?</a:t>
-            </a:r>
-          </a:p>
-        </p:txBody>
-      </p:sp>
-    </p:spTree>
-    <p:extLst>
-      <p:ext uri="{BB962C8B-B14F-4D97-AF65-F5344CB8AC3E}">
-        <p14:creationId xmlns:p14="http://schemas.microsoft.com/office/powerpoint/2010/main" val="4207036878"/>
       </p:ext>
     </p:extLst>
   </p:cSld>
@@ -9358,7 +10271,7 @@
     <p:bg>
       <p:bgPr>
         <a:blipFill rotWithShape="1">
-          <a:blip r:embed="rId2">
+          <a:blip r:embed="rId3">
             <a:duotone>
               <a:schemeClr val="bg2">
                 <a:shade val="69000"/>
@@ -9409,13 +10322,13 @@
           <p:nvPr/>
         </p:nvPicPr>
         <p:blipFill>
-          <a:blip r:embed="rId3">
+          <a:blip r:embed="rId4">
             <a:extLst>
               <a:ext uri="{28A0092B-C50C-407E-A947-70E740481C1C}">
                 <a14:useLocalDpi xmlns:a14="http://schemas.microsoft.com/office/drawing/2010/main" val="0"/>
               </a:ext>
               <a:ext uri="{837473B0-CC2E-450A-ABE3-18F120FF3D39}">
-                <a1611:picAttrSrcUrl xmlns:a1611="http://schemas.microsoft.com/office/drawing/2016/11/main" r:id="rId4"/>
+                <a1611:picAttrSrcUrl xmlns:a1611="http://schemas.microsoft.com/office/drawing/2016/11/main" r:id="rId5"/>
               </a:ext>
             </a:extLst>
           </a:blip>
@@ -9531,6 +10444,41 @@
           </a:p>
         </p:txBody>
       </p:sp>
+      <p:sp>
+        <p:nvSpPr>
+          <p:cNvPr id="6" name="TextBox 5">
+            <a:extLst>
+              <a:ext uri="{FF2B5EF4-FFF2-40B4-BE49-F238E27FC236}">
+                <a16:creationId xmlns:a16="http://schemas.microsoft.com/office/drawing/2014/main" id="{B06531AE-598C-44AE-B6E8-136B853BC0DB}"/>
+              </a:ext>
+            </a:extLst>
+          </p:cNvPr>
+          <p:cNvSpPr txBox="1"/>
+          <p:nvPr/>
+        </p:nvSpPr>
+        <p:spPr>
+          <a:xfrm>
+            <a:off x="10610850" y="452718"/>
+            <a:ext cx="342900" cy="369332"/>
+          </a:xfrm>
+          <a:prstGeom prst="rect">
+            <a:avLst/>
+          </a:prstGeom>
+          <a:noFill/>
+        </p:spPr>
+        <p:txBody>
+          <a:bodyPr wrap="square" rtlCol="0">
+            <a:spAutoFit/>
+          </a:bodyPr>
+          <a:lstStyle/>
+          <a:p>
+            <a:r>
+              <a:rPr lang="en-GB" dirty="0"/>
+              <a:t>P</a:t>
+            </a:r>
+          </a:p>
+        </p:txBody>
+      </p:sp>
     </p:spTree>
     <p:extLst>
       <p:ext uri="{BB962C8B-B14F-4D97-AF65-F5344CB8AC3E}">
@@ -9550,7 +10498,7 @@
     <p:bg>
       <p:bgPr>
         <a:blipFill rotWithShape="1">
-          <a:blip r:embed="rId2">
+          <a:blip r:embed="rId3">
             <a:duotone>
               <a:schemeClr val="bg2">
                 <a:shade val="62000"/>
@@ -9601,7 +10549,7 @@
           <p:nvPr/>
         </p:nvPicPr>
         <p:blipFill rotWithShape="1">
-          <a:blip r:embed="rId3">
+          <a:blip r:embed="rId4">
             <a:extLst>
               <a:ext uri="{28A0092B-C50C-407E-A947-70E740481C1C}">
                 <a14:useLocalDpi xmlns:a14="http://schemas.microsoft.com/office/drawing/2010/main" val="0"/>
@@ -9647,7 +10595,7 @@
           <p:nvPr/>
         </p:nvPicPr>
         <p:blipFill rotWithShape="1">
-          <a:blip r:embed="rId4">
+          <a:blip r:embed="rId5">
             <a:extLst>
               <a:ext uri="{28A0092B-C50C-407E-A947-70E740481C1C}">
                 <a14:useLocalDpi xmlns:a14="http://schemas.microsoft.com/office/drawing/2010/main" val="0"/>
@@ -9693,7 +10641,7 @@
           <p:nvPr/>
         </p:nvPicPr>
         <p:blipFill rotWithShape="1">
-          <a:blip r:embed="rId5">
+          <a:blip r:embed="rId6">
             <a:extLst>
               <a:ext uri="{28A0092B-C50C-407E-A947-70E740481C1C}">
                 <a14:useLocalDpi xmlns:a14="http://schemas.microsoft.com/office/drawing/2010/main" val="0"/>
@@ -9739,7 +10687,7 @@
           <p:nvPr/>
         </p:nvPicPr>
         <p:blipFill rotWithShape="1">
-          <a:blip r:embed="rId6">
+          <a:blip r:embed="rId7">
             <a:extLst>
               <a:ext uri="{28A0092B-C50C-407E-A947-70E740481C1C}">
                 <a14:useLocalDpi xmlns:a14="http://schemas.microsoft.com/office/drawing/2010/main" val="0"/>
@@ -9834,14 +10782,14 @@
           <a:lstStyle/>
           <a:p>
             <a:r>
-              <a:rPr lang="en-GB"/>
+              <a:rPr lang="en-GB" dirty="0"/>
               <a:t>Platform</a:t>
             </a:r>
           </a:p>
           <a:p>
             <a:pPr lvl="1"/>
             <a:r>
-              <a:rPr lang="en-GB"/>
+              <a:rPr lang="en-GB" dirty="0"/>
               <a:t>Mobile phones</a:t>
             </a:r>
           </a:p>
@@ -9860,14 +10808,14 @@
           </a:p>
           <a:p>
             <a:r>
-              <a:rPr lang="en-GB"/>
+              <a:rPr lang="en-GB" dirty="0"/>
               <a:t>Markets</a:t>
             </a:r>
           </a:p>
           <a:p>
             <a:pPr lvl="1"/>
             <a:r>
-              <a:rPr lang="en-GB"/>
+              <a:rPr lang="en-GB" dirty="0"/>
               <a:t>Smartphone markets</a:t>
             </a:r>
           </a:p>
@@ -9886,10 +10834,52 @@
             </a:r>
           </a:p>
           <a:p>
+            <a:pPr lvl="2"/>
+            <a:r>
+              <a:rPr lang="en-GB" dirty="0"/>
+              <a:t>Amazon app store</a:t>
+            </a:r>
+          </a:p>
+          <a:p>
             <a:pPr marL="914400" lvl="2" indent="0">
               <a:buNone/>
             </a:pPr>
             <a:endParaRPr lang="en-GB" dirty="0"/>
+          </a:p>
+        </p:txBody>
+      </p:sp>
+      <p:sp>
+        <p:nvSpPr>
+          <p:cNvPr id="8" name="TextBox 7">
+            <a:extLst>
+              <a:ext uri="{FF2B5EF4-FFF2-40B4-BE49-F238E27FC236}">
+                <a16:creationId xmlns:a16="http://schemas.microsoft.com/office/drawing/2014/main" id="{C2F54B06-E447-4292-998D-15EE5EDB3C8E}"/>
+              </a:ext>
+            </a:extLst>
+          </p:cNvPr>
+          <p:cNvSpPr txBox="1"/>
+          <p:nvPr/>
+        </p:nvSpPr>
+        <p:spPr>
+          <a:xfrm>
+            <a:off x="10610850" y="452718"/>
+            <a:ext cx="342900" cy="369332"/>
+          </a:xfrm>
+          <a:prstGeom prst="rect">
+            <a:avLst/>
+          </a:prstGeom>
+          <a:noFill/>
+        </p:spPr>
+        <p:txBody>
+          <a:bodyPr wrap="square" rtlCol="0">
+            <a:spAutoFit/>
+          </a:bodyPr>
+          <a:lstStyle/>
+          <a:p>
+            <a:r>
+              <a:rPr lang="en-GB" dirty="0"/>
+              <a:t>M</a:t>
+            </a:r>
           </a:p>
         </p:txBody>
       </p:sp>
@@ -10071,6 +11061,41 @@
           </a:p>
         </p:txBody>
       </p:sp>
+      <p:sp>
+        <p:nvSpPr>
+          <p:cNvPr id="5" name="TextBox 4">
+            <a:extLst>
+              <a:ext uri="{FF2B5EF4-FFF2-40B4-BE49-F238E27FC236}">
+                <a16:creationId xmlns:a16="http://schemas.microsoft.com/office/drawing/2014/main" id="{AFD0DA3C-F2E0-4942-9B5E-C70B0F98219F}"/>
+              </a:ext>
+            </a:extLst>
+          </p:cNvPr>
+          <p:cNvSpPr txBox="1"/>
+          <p:nvPr/>
+        </p:nvSpPr>
+        <p:spPr>
+          <a:xfrm>
+            <a:off x="10610850" y="452718"/>
+            <a:ext cx="342900" cy="369332"/>
+          </a:xfrm>
+          <a:prstGeom prst="rect">
+            <a:avLst/>
+          </a:prstGeom>
+          <a:noFill/>
+        </p:spPr>
+        <p:txBody>
+          <a:bodyPr wrap="square" rtlCol="0">
+            <a:spAutoFit/>
+          </a:bodyPr>
+          <a:lstStyle/>
+          <a:p>
+            <a:r>
+              <a:rPr lang="en-GB" dirty="0"/>
+              <a:t>P</a:t>
+            </a:r>
+          </a:p>
+        </p:txBody>
+      </p:sp>
     </p:spTree>
     <p:extLst>
       <p:ext uri="{BB962C8B-B14F-4D97-AF65-F5344CB8AC3E}">
@@ -10259,6 +11284,41 @@
           </a:p>
         </p:txBody>
       </p:sp>
+      <p:sp>
+        <p:nvSpPr>
+          <p:cNvPr id="5" name="TextBox 4">
+            <a:extLst>
+              <a:ext uri="{FF2B5EF4-FFF2-40B4-BE49-F238E27FC236}">
+                <a16:creationId xmlns:a16="http://schemas.microsoft.com/office/drawing/2014/main" id="{AE5D704E-1C03-49EE-BB53-20628186633B}"/>
+              </a:ext>
+            </a:extLst>
+          </p:cNvPr>
+          <p:cNvSpPr txBox="1"/>
+          <p:nvPr/>
+        </p:nvSpPr>
+        <p:spPr>
+          <a:xfrm>
+            <a:off x="10610850" y="452718"/>
+            <a:ext cx="342900" cy="369332"/>
+          </a:xfrm>
+          <a:prstGeom prst="rect">
+            <a:avLst/>
+          </a:prstGeom>
+          <a:noFill/>
+        </p:spPr>
+        <p:txBody>
+          <a:bodyPr wrap="square" rtlCol="0">
+            <a:spAutoFit/>
+          </a:bodyPr>
+          <a:lstStyle/>
+          <a:p>
+            <a:r>
+              <a:rPr lang="en-GB" dirty="0"/>
+              <a:t>P</a:t>
+            </a:r>
+          </a:p>
+        </p:txBody>
+      </p:sp>
     </p:spTree>
     <p:extLst>
       <p:ext uri="{BB962C8B-B14F-4D97-AF65-F5344CB8AC3E}">
@@ -10363,6 +11423,41 @@
           </a:p>
         </p:txBody>
       </p:sp>
+      <p:sp>
+        <p:nvSpPr>
+          <p:cNvPr id="4" name="TextBox 3">
+            <a:extLst>
+              <a:ext uri="{FF2B5EF4-FFF2-40B4-BE49-F238E27FC236}">
+                <a16:creationId xmlns:a16="http://schemas.microsoft.com/office/drawing/2014/main" id="{92D77B54-0290-4018-9D3E-40407F07D633}"/>
+              </a:ext>
+            </a:extLst>
+          </p:cNvPr>
+          <p:cNvSpPr txBox="1"/>
+          <p:nvPr/>
+        </p:nvSpPr>
+        <p:spPr>
+          <a:xfrm>
+            <a:off x="10610850" y="452718"/>
+            <a:ext cx="342900" cy="369332"/>
+          </a:xfrm>
+          <a:prstGeom prst="rect">
+            <a:avLst/>
+          </a:prstGeom>
+          <a:noFill/>
+        </p:spPr>
+        <p:txBody>
+          <a:bodyPr wrap="square" rtlCol="0">
+            <a:spAutoFit/>
+          </a:bodyPr>
+          <a:lstStyle/>
+          <a:p>
+            <a:r>
+              <a:rPr lang="en-GB" dirty="0"/>
+              <a:t>T</a:t>
+            </a:r>
+          </a:p>
+        </p:txBody>
+      </p:sp>
     </p:spTree>
     <p:extLst>
       <p:ext uri="{BB962C8B-B14F-4D97-AF65-F5344CB8AC3E}">
@@ -10497,7 +11592,7 @@
             <a:pPr algn="ctr"/>
             <a:r>
               <a:rPr lang="en-GB" dirty="0"/>
-              <a:t>Wait for the shot to be in the right position, tap to set.</a:t>
+              <a:t>Wait for the shot to be at the right angle, tap to set.</a:t>
             </a:r>
           </a:p>
         </p:txBody>
@@ -10959,6 +12054,41 @@
           </a:fontRef>
         </p:style>
       </p:cxnSp>
+      <p:sp>
+        <p:nvSpPr>
+          <p:cNvPr id="14" name="TextBox 13">
+            <a:extLst>
+              <a:ext uri="{FF2B5EF4-FFF2-40B4-BE49-F238E27FC236}">
+                <a16:creationId xmlns:a16="http://schemas.microsoft.com/office/drawing/2014/main" id="{9C4E556B-4DD6-40B8-95EE-ACB04CAD8877}"/>
+              </a:ext>
+            </a:extLst>
+          </p:cNvPr>
+          <p:cNvSpPr txBox="1"/>
+          <p:nvPr/>
+        </p:nvSpPr>
+        <p:spPr>
+          <a:xfrm>
+            <a:off x="10610850" y="452718"/>
+            <a:ext cx="342900" cy="369332"/>
+          </a:xfrm>
+          <a:prstGeom prst="rect">
+            <a:avLst/>
+          </a:prstGeom>
+          <a:noFill/>
+        </p:spPr>
+        <p:txBody>
+          <a:bodyPr wrap="square" rtlCol="0">
+            <a:spAutoFit/>
+          </a:bodyPr>
+          <a:lstStyle/>
+          <a:p>
+            <a:r>
+              <a:rPr lang="en-GB" dirty="0"/>
+              <a:t>M</a:t>
+            </a:r>
+          </a:p>
+        </p:txBody>
+      </p:sp>
     </p:spTree>
     <p:extLst>
       <p:ext uri="{BB962C8B-B14F-4D97-AF65-F5344CB8AC3E}">
@@ -11067,6 +12197,41 @@
             <a:r>
               <a:rPr lang="en-GB" dirty="0"/>
               <a:t>The end goal will be for one player to get the other persons health to zero. </a:t>
+            </a:r>
+          </a:p>
+        </p:txBody>
+      </p:sp>
+      <p:sp>
+        <p:nvSpPr>
+          <p:cNvPr id="4" name="TextBox 3">
+            <a:extLst>
+              <a:ext uri="{FF2B5EF4-FFF2-40B4-BE49-F238E27FC236}">
+                <a16:creationId xmlns:a16="http://schemas.microsoft.com/office/drawing/2014/main" id="{5C89ADB2-DB96-4FDA-909F-906186794C7E}"/>
+              </a:ext>
+            </a:extLst>
+          </p:cNvPr>
+          <p:cNvSpPr txBox="1"/>
+          <p:nvPr/>
+        </p:nvSpPr>
+        <p:spPr>
+          <a:xfrm>
+            <a:off x="10610850" y="452718"/>
+            <a:ext cx="342900" cy="369332"/>
+          </a:xfrm>
+          <a:prstGeom prst="rect">
+            <a:avLst/>
+          </a:prstGeom>
+          <a:noFill/>
+        </p:spPr>
+        <p:txBody>
+          <a:bodyPr wrap="square" rtlCol="0">
+            <a:spAutoFit/>
+          </a:bodyPr>
+          <a:lstStyle/>
+          <a:p>
+            <a:r>
+              <a:rPr lang="en-GB" dirty="0"/>
+              <a:t>E</a:t>
             </a:r>
           </a:p>
         </p:txBody>

</xml_diff>